<commit_message>
Add Frederick uncle Anniversary
</commit_message>
<xml_diff>
--- a/stosc_services/PPT/Birthday & Anniversaries.pptx
+++ b/stosc_services/PPT/Birthday & Anniversaries.pptx
@@ -284,7 +284,7 @@
           <a:p>
             <a:fld id="{48A87A34-81AB-432B-8DAE-1953F412C126}" type="datetimeFigureOut">
               <a:rPr lang="en-US" smtClean="0"/>
-              <a:t>8/15/2020</a:t>
+              <a:t>8/16/2020</a:t>
             </a:fld>
             <a:endParaRPr lang="en-US" dirty="0"/>
           </a:p>
@@ -597,7 +597,7 @@
             <a:fld id="{48A87A34-81AB-432B-8DAE-1953F412C126}" type="datetimeFigureOut">
               <a:rPr lang="en-US" smtClean="0"/>
               <a:pPr/>
-              <a:t>8/15/2020</a:t>
+              <a:t>8/16/2020</a:t>
             </a:fld>
             <a:endParaRPr lang="en-US" dirty="0"/>
           </a:p>
@@ -821,7 +821,7 @@
             <a:fld id="{48A87A34-81AB-432B-8DAE-1953F412C126}" type="datetimeFigureOut">
               <a:rPr lang="en-US" smtClean="0"/>
               <a:pPr/>
-              <a:t>8/15/2020</a:t>
+              <a:t>8/16/2020</a:t>
             </a:fld>
             <a:endParaRPr lang="en-US" dirty="0"/>
           </a:p>
@@ -1114,7 +1114,7 @@
             <a:fld id="{48A87A34-81AB-432B-8DAE-1953F412C126}" type="datetimeFigureOut">
               <a:rPr lang="en-US" smtClean="0"/>
               <a:pPr/>
-              <a:t>8/15/2020</a:t>
+              <a:t>8/16/2020</a:t>
             </a:fld>
             <a:endParaRPr lang="en-US" dirty="0"/>
           </a:p>
@@ -1570,7 +1570,7 @@
             <a:fld id="{48A87A34-81AB-432B-8DAE-1953F412C126}" type="datetimeFigureOut">
               <a:rPr lang="en-US" smtClean="0"/>
               <a:pPr/>
-              <a:t>8/15/2020</a:t>
+              <a:t>8/16/2020</a:t>
             </a:fld>
             <a:endParaRPr lang="en-US" dirty="0"/>
           </a:p>
@@ -2148,7 +2148,7 @@
             <a:fld id="{48A87A34-81AB-432B-8DAE-1953F412C126}" type="datetimeFigureOut">
               <a:rPr lang="en-US" smtClean="0"/>
               <a:pPr/>
-              <a:t>8/15/2020</a:t>
+              <a:t>8/16/2020</a:t>
             </a:fld>
             <a:endParaRPr lang="en-US" dirty="0"/>
           </a:p>
@@ -3002,7 +3002,7 @@
             <a:fld id="{48A87A34-81AB-432B-8DAE-1953F412C126}" type="datetimeFigureOut">
               <a:rPr lang="en-US" smtClean="0"/>
               <a:pPr/>
-              <a:t>8/15/2020</a:t>
+              <a:t>8/16/2020</a:t>
             </a:fld>
             <a:endParaRPr lang="en-US" dirty="0"/>
           </a:p>
@@ -3209,7 +3209,7 @@
             <a:fld id="{48A87A34-81AB-432B-8DAE-1953F412C126}" type="datetimeFigureOut">
               <a:rPr lang="en-US" smtClean="0"/>
               <a:pPr/>
-              <a:t>8/15/2020</a:t>
+              <a:t>8/16/2020</a:t>
             </a:fld>
             <a:endParaRPr lang="en-US" dirty="0"/>
           </a:p>
@@ -3425,7 +3425,7 @@
             <a:fld id="{48A87A34-81AB-432B-8DAE-1953F412C126}" type="datetimeFigureOut">
               <a:rPr lang="en-US" smtClean="0"/>
               <a:pPr/>
-              <a:t>8/15/2020</a:t>
+              <a:t>8/16/2020</a:t>
             </a:fld>
             <a:endParaRPr lang="en-US" dirty="0"/>
           </a:p>
@@ -3663,7 +3663,7 @@
           <a:p>
             <a:fld id="{48A87A34-81AB-432B-8DAE-1953F412C126}" type="datetimeFigureOut">
               <a:rPr lang="en-US" smtClean="0"/>
-              <a:t>8/15/2020</a:t>
+              <a:t>8/16/2020</a:t>
             </a:fld>
             <a:endParaRPr lang="en-US" dirty="0"/>
           </a:p>
@@ -3833,7 +3833,7 @@
           <a:p>
             <a:fld id="{48A87A34-81AB-432B-8DAE-1953F412C126}" type="datetimeFigureOut">
               <a:rPr lang="en-US" smtClean="0"/>
-              <a:t>8/15/2020</a:t>
+              <a:t>8/16/2020</a:t>
             </a:fld>
             <a:endParaRPr lang="en-US" dirty="0"/>
           </a:p>
@@ -4039,7 +4039,7 @@
             <a:fld id="{48A87A34-81AB-432B-8DAE-1953F412C126}" type="datetimeFigureOut">
               <a:rPr lang="en-US" smtClean="0"/>
               <a:pPr/>
-              <a:t>8/15/2020</a:t>
+              <a:t>8/16/2020</a:t>
             </a:fld>
             <a:endParaRPr lang="en-US" dirty="0"/>
           </a:p>
@@ -4320,7 +4320,7 @@
           <a:p>
             <a:fld id="{48A87A34-81AB-432B-8DAE-1953F412C126}" type="datetimeFigureOut">
               <a:rPr lang="en-US" smtClean="0"/>
-              <a:t>8/15/2020</a:t>
+              <a:t>8/16/2020</a:t>
             </a:fld>
             <a:endParaRPr lang="en-US" dirty="0"/>
           </a:p>
@@ -4588,7 +4588,7 @@
             <a:fld id="{48A87A34-81AB-432B-8DAE-1953F412C126}" type="datetimeFigureOut">
               <a:rPr lang="en-US" smtClean="0"/>
               <a:pPr/>
-              <a:t>8/15/2020</a:t>
+              <a:t>8/16/2020</a:t>
             </a:fld>
             <a:endParaRPr lang="en-US" dirty="0"/>
           </a:p>
@@ -5005,7 +5005,7 @@
             <a:fld id="{48A87A34-81AB-432B-8DAE-1953F412C126}" type="datetimeFigureOut">
               <a:rPr lang="en-US" smtClean="0"/>
               <a:pPr/>
-              <a:t>8/15/2020</a:t>
+              <a:t>8/16/2020</a:t>
             </a:fld>
             <a:endParaRPr lang="en-US" dirty="0"/>
           </a:p>
@@ -5154,7 +5154,7 @@
           <a:p>
             <a:fld id="{48A87A34-81AB-432B-8DAE-1953F412C126}" type="datetimeFigureOut">
               <a:rPr lang="en-US" smtClean="0"/>
-              <a:t>8/15/2020</a:t>
+              <a:t>8/16/2020</a:t>
             </a:fld>
             <a:endParaRPr lang="en-US" dirty="0"/>
           </a:p>
@@ -5279,7 +5279,7 @@
           <a:p>
             <a:fld id="{48A87A34-81AB-432B-8DAE-1953F412C126}" type="datetimeFigureOut">
               <a:rPr lang="en-US" smtClean="0"/>
-              <a:t>8/15/2020</a:t>
+              <a:t>8/16/2020</a:t>
             </a:fld>
             <a:endParaRPr lang="en-US" dirty="0"/>
           </a:p>
@@ -5559,7 +5559,7 @@
             <a:fld id="{48A87A34-81AB-432B-8DAE-1953F412C126}" type="datetimeFigureOut">
               <a:rPr lang="en-US" smtClean="0"/>
               <a:pPr/>
-              <a:t>8/15/2020</a:t>
+              <a:t>8/16/2020</a:t>
             </a:fld>
             <a:endParaRPr lang="en-US" dirty="0"/>
           </a:p>
@@ -5872,7 +5872,7 @@
           <a:p>
             <a:fld id="{48A87A34-81AB-432B-8DAE-1953F412C126}" type="datetimeFigureOut">
               <a:rPr lang="en-US" smtClean="0"/>
-              <a:t>8/15/2020</a:t>
+              <a:t>8/16/2020</a:t>
             </a:fld>
             <a:endParaRPr lang="en-US" dirty="0"/>
           </a:p>
@@ -6126,7 +6126,7 @@
             <a:fld id="{48A87A34-81AB-432B-8DAE-1953F412C126}" type="datetimeFigureOut">
               <a:rPr lang="en-US" smtClean="0"/>
               <a:pPr/>
-              <a:t>8/15/2020</a:t>
+              <a:t>8/16/2020</a:t>
             </a:fld>
             <a:endParaRPr lang="en-US" dirty="0"/>
           </a:p>
@@ -7011,7 +7011,7 @@
             </a:pPr>
             <a:r>
               <a:rPr lang="en-US" sz="2800" dirty="0"/>
-              <a:t>Mr. Koshy George AND Mrs. </a:t>
+              <a:t>Mr. Koshy George &amp; Mrs. </a:t>
             </a:r>
             <a:r>
               <a:rPr lang="en-US" sz="2800" dirty="0" err="1"/>
@@ -7042,7 +7042,7 @@
             </a:r>
             <a:r>
               <a:rPr lang="en-US" sz="2800" dirty="0"/>
-              <a:t> Varghese Joyce AND Mrs. Leena Mathew</a:t>
+              <a:t> Varghese Joyce &amp; Mrs. Leena Mathew</a:t>
             </a:r>
           </a:p>
           <a:p>
@@ -7057,7 +7057,7 @@
             </a:pPr>
             <a:r>
               <a:rPr lang="en-US" sz="2800" dirty="0"/>
-              <a:t>Mr. Anson George Alexander AND Mrs. </a:t>
+              <a:t>Mr. Anson George Alexander &amp; Mrs. </a:t>
             </a:r>
             <a:r>
               <a:rPr lang="en-US" sz="2800" dirty="0" err="1"/>
@@ -7067,6 +7067,34 @@
               <a:rPr lang="en-US" sz="2800" dirty="0"/>
               <a:t> Mary Augustine</a:t>
             </a:r>
+          </a:p>
+          <a:p>
+            <a:pPr marL="0" indent="0">
+              <a:lnSpc>
+                <a:spcPct val="110000"/>
+              </a:lnSpc>
+              <a:spcBef>
+                <a:spcPts val="600"/>
+              </a:spcBef>
+              <a:buNone/>
+            </a:pPr>
+            <a:r>
+              <a:rPr lang="en-US" sz="2800" dirty="0"/>
+              <a:t>MR. </a:t>
+            </a:r>
+            <a:r>
+              <a:rPr lang="en-US" sz="2800" dirty="0" err="1"/>
+              <a:t>FredErick</a:t>
+            </a:r>
+            <a:r>
+              <a:rPr lang="en-US" sz="2800" dirty="0"/>
+              <a:t> Thomas &amp; Susie </a:t>
+            </a:r>
+            <a:r>
+              <a:rPr lang="en-US" sz="2800"/>
+              <a:t>FredErick</a:t>
+            </a:r>
+            <a:endParaRPr lang="en-US" sz="2800" dirty="0"/>
           </a:p>
         </p:txBody>
       </p:sp>

</xml_diff>

<commit_message>
Update Bday & Ann
</commit_message>
<xml_diff>
--- a/stosc_services/PPT/Birthday & Anniversaries.pptx
+++ b/stosc_services/PPT/Birthday & Anniversaries.pptx
@@ -284,7 +284,7 @@
           <a:p>
             <a:fld id="{48A87A34-81AB-432B-8DAE-1953F412C126}" type="datetimeFigureOut">
               <a:rPr lang="en-US" smtClean="0"/>
-              <a:t>8/16/2020</a:t>
+              <a:t>8/22/2020</a:t>
             </a:fld>
             <a:endParaRPr lang="en-US" dirty="0"/>
           </a:p>
@@ -597,7 +597,7 @@
             <a:fld id="{48A87A34-81AB-432B-8DAE-1953F412C126}" type="datetimeFigureOut">
               <a:rPr lang="en-US" smtClean="0"/>
               <a:pPr/>
-              <a:t>8/16/2020</a:t>
+              <a:t>8/22/2020</a:t>
             </a:fld>
             <a:endParaRPr lang="en-US" dirty="0"/>
           </a:p>
@@ -821,7 +821,7 @@
             <a:fld id="{48A87A34-81AB-432B-8DAE-1953F412C126}" type="datetimeFigureOut">
               <a:rPr lang="en-US" smtClean="0"/>
               <a:pPr/>
-              <a:t>8/16/2020</a:t>
+              <a:t>8/22/2020</a:t>
             </a:fld>
             <a:endParaRPr lang="en-US" dirty="0"/>
           </a:p>
@@ -1114,7 +1114,7 @@
             <a:fld id="{48A87A34-81AB-432B-8DAE-1953F412C126}" type="datetimeFigureOut">
               <a:rPr lang="en-US" smtClean="0"/>
               <a:pPr/>
-              <a:t>8/16/2020</a:t>
+              <a:t>8/22/2020</a:t>
             </a:fld>
             <a:endParaRPr lang="en-US" dirty="0"/>
           </a:p>
@@ -1570,7 +1570,7 @@
             <a:fld id="{48A87A34-81AB-432B-8DAE-1953F412C126}" type="datetimeFigureOut">
               <a:rPr lang="en-US" smtClean="0"/>
               <a:pPr/>
-              <a:t>8/16/2020</a:t>
+              <a:t>8/22/2020</a:t>
             </a:fld>
             <a:endParaRPr lang="en-US" dirty="0"/>
           </a:p>
@@ -2148,7 +2148,7 @@
             <a:fld id="{48A87A34-81AB-432B-8DAE-1953F412C126}" type="datetimeFigureOut">
               <a:rPr lang="en-US" smtClean="0"/>
               <a:pPr/>
-              <a:t>8/16/2020</a:t>
+              <a:t>8/22/2020</a:t>
             </a:fld>
             <a:endParaRPr lang="en-US" dirty="0"/>
           </a:p>
@@ -3002,7 +3002,7 @@
             <a:fld id="{48A87A34-81AB-432B-8DAE-1953F412C126}" type="datetimeFigureOut">
               <a:rPr lang="en-US" smtClean="0"/>
               <a:pPr/>
-              <a:t>8/16/2020</a:t>
+              <a:t>8/22/2020</a:t>
             </a:fld>
             <a:endParaRPr lang="en-US" dirty="0"/>
           </a:p>
@@ -3209,7 +3209,7 @@
             <a:fld id="{48A87A34-81AB-432B-8DAE-1953F412C126}" type="datetimeFigureOut">
               <a:rPr lang="en-US" smtClean="0"/>
               <a:pPr/>
-              <a:t>8/16/2020</a:t>
+              <a:t>8/22/2020</a:t>
             </a:fld>
             <a:endParaRPr lang="en-US" dirty="0"/>
           </a:p>
@@ -3425,7 +3425,7 @@
             <a:fld id="{48A87A34-81AB-432B-8DAE-1953F412C126}" type="datetimeFigureOut">
               <a:rPr lang="en-US" smtClean="0"/>
               <a:pPr/>
-              <a:t>8/16/2020</a:t>
+              <a:t>8/22/2020</a:t>
             </a:fld>
             <a:endParaRPr lang="en-US" dirty="0"/>
           </a:p>
@@ -3663,7 +3663,7 @@
           <a:p>
             <a:fld id="{48A87A34-81AB-432B-8DAE-1953F412C126}" type="datetimeFigureOut">
               <a:rPr lang="en-US" smtClean="0"/>
-              <a:t>8/16/2020</a:t>
+              <a:t>8/22/2020</a:t>
             </a:fld>
             <a:endParaRPr lang="en-US" dirty="0"/>
           </a:p>
@@ -3833,7 +3833,7 @@
           <a:p>
             <a:fld id="{48A87A34-81AB-432B-8DAE-1953F412C126}" type="datetimeFigureOut">
               <a:rPr lang="en-US" smtClean="0"/>
-              <a:t>8/16/2020</a:t>
+              <a:t>8/22/2020</a:t>
             </a:fld>
             <a:endParaRPr lang="en-US" dirty="0"/>
           </a:p>
@@ -4039,7 +4039,7 @@
             <a:fld id="{48A87A34-81AB-432B-8DAE-1953F412C126}" type="datetimeFigureOut">
               <a:rPr lang="en-US" smtClean="0"/>
               <a:pPr/>
-              <a:t>8/16/2020</a:t>
+              <a:t>8/22/2020</a:t>
             </a:fld>
             <a:endParaRPr lang="en-US" dirty="0"/>
           </a:p>
@@ -4320,7 +4320,7 @@
           <a:p>
             <a:fld id="{48A87A34-81AB-432B-8DAE-1953F412C126}" type="datetimeFigureOut">
               <a:rPr lang="en-US" smtClean="0"/>
-              <a:t>8/16/2020</a:t>
+              <a:t>8/22/2020</a:t>
             </a:fld>
             <a:endParaRPr lang="en-US" dirty="0"/>
           </a:p>
@@ -4588,7 +4588,7 @@
             <a:fld id="{48A87A34-81AB-432B-8DAE-1953F412C126}" type="datetimeFigureOut">
               <a:rPr lang="en-US" smtClean="0"/>
               <a:pPr/>
-              <a:t>8/16/2020</a:t>
+              <a:t>8/22/2020</a:t>
             </a:fld>
             <a:endParaRPr lang="en-US" dirty="0"/>
           </a:p>
@@ -5005,7 +5005,7 @@
             <a:fld id="{48A87A34-81AB-432B-8DAE-1953F412C126}" type="datetimeFigureOut">
               <a:rPr lang="en-US" smtClean="0"/>
               <a:pPr/>
-              <a:t>8/16/2020</a:t>
+              <a:t>8/22/2020</a:t>
             </a:fld>
             <a:endParaRPr lang="en-US" dirty="0"/>
           </a:p>
@@ -5154,7 +5154,7 @@
           <a:p>
             <a:fld id="{48A87A34-81AB-432B-8DAE-1953F412C126}" type="datetimeFigureOut">
               <a:rPr lang="en-US" smtClean="0"/>
-              <a:t>8/16/2020</a:t>
+              <a:t>8/22/2020</a:t>
             </a:fld>
             <a:endParaRPr lang="en-US" dirty="0"/>
           </a:p>
@@ -5279,7 +5279,7 @@
           <a:p>
             <a:fld id="{48A87A34-81AB-432B-8DAE-1953F412C126}" type="datetimeFigureOut">
               <a:rPr lang="en-US" smtClean="0"/>
-              <a:t>8/16/2020</a:t>
+              <a:t>8/22/2020</a:t>
             </a:fld>
             <a:endParaRPr lang="en-US" dirty="0"/>
           </a:p>
@@ -5559,7 +5559,7 @@
             <a:fld id="{48A87A34-81AB-432B-8DAE-1953F412C126}" type="datetimeFigureOut">
               <a:rPr lang="en-US" smtClean="0"/>
               <a:pPr/>
-              <a:t>8/16/2020</a:t>
+              <a:t>8/22/2020</a:t>
             </a:fld>
             <a:endParaRPr lang="en-US" dirty="0"/>
           </a:p>
@@ -5872,7 +5872,7 @@
           <a:p>
             <a:fld id="{48A87A34-81AB-432B-8DAE-1953F412C126}" type="datetimeFigureOut">
               <a:rPr lang="en-US" smtClean="0"/>
-              <a:t>8/16/2020</a:t>
+              <a:t>8/22/2020</a:t>
             </a:fld>
             <a:endParaRPr lang="en-US" dirty="0"/>
           </a:p>
@@ -6126,7 +6126,7 @@
             <a:fld id="{48A87A34-81AB-432B-8DAE-1953F412C126}" type="datetimeFigureOut">
               <a:rPr lang="en-US" smtClean="0"/>
               <a:pPr/>
-              <a:t>8/16/2020</a:t>
+              <a:t>8/22/2020</a:t>
             </a:fld>
             <a:endParaRPr lang="en-US" dirty="0"/>
           </a:p>
@@ -6612,7 +6612,7 @@
             </a:pPr>
             <a:r>
               <a:rPr lang="en-US" sz="2800" dirty="0"/>
-              <a:t>Mr. Jubin Thomas Kuriakose</a:t>
+              <a:t>Adin Joshua Philip</a:t>
             </a:r>
           </a:p>
           <a:p>
@@ -6627,21 +6627,8 @@
             </a:pPr>
             <a:r>
               <a:rPr lang="en-US" sz="2800" dirty="0"/>
-              <a:t>Ephraim </a:t>
-            </a:r>
-            <a:r>
-              <a:rPr lang="en-US" sz="2800" dirty="0" err="1"/>
-              <a:t>Toji</a:t>
-            </a:r>
-            <a:r>
-              <a:rPr lang="en-US" sz="2800" dirty="0"/>
-              <a:t> </a:t>
-            </a:r>
-            <a:r>
-              <a:rPr lang="en-US" sz="2800" dirty="0" err="1"/>
-              <a:t>Kochuveettil</a:t>
-            </a:r>
-            <a:endParaRPr lang="en-US" sz="2800" dirty="0"/>
+              <a:t>Mrs. Gini Thomas Koshy</a:t>
+            </a:r>
           </a:p>
           <a:p>
             <a:pPr marL="0" indent="0">
@@ -6655,7 +6642,7 @@
             </a:pPr>
             <a:r>
               <a:rPr lang="en-US" sz="2800" dirty="0"/>
-              <a:t>Deborah Anna Anish</a:t>
+              <a:t>Eva Mary Arun</a:t>
             </a:r>
           </a:p>
           <a:p>
@@ -6670,7 +6657,15 @@
             </a:pPr>
             <a:r>
               <a:rPr lang="en-US" sz="2800" dirty="0"/>
-              <a:t>Joshua Mathew</a:t>
+              <a:t>Mrs. </a:t>
+            </a:r>
+            <a:r>
+              <a:rPr lang="en-US" sz="2800" dirty="0" err="1"/>
+              <a:t>Aleyamma</a:t>
+            </a:r>
+            <a:r>
+              <a:rPr lang="en-US" sz="2800" dirty="0"/>
+              <a:t> Kurian</a:t>
             </a:r>
           </a:p>
           <a:p>
@@ -6685,13 +6680,8 @@
             </a:pPr>
             <a:r>
               <a:rPr lang="en-US" sz="2800" dirty="0"/>
-              <a:t>Mrs. Annamma </a:t>
-            </a:r>
-            <a:r>
-              <a:rPr lang="en-US" sz="2800" dirty="0" err="1"/>
-              <a:t>Shajan</a:t>
-            </a:r>
-            <a:endParaRPr lang="en-US" sz="2800" dirty="0"/>
+              <a:t>John M Varghese</a:t>
+            </a:r>
           </a:p>
           <a:p>
             <a:pPr marL="0" indent="0">
@@ -6705,9 +6695,32 @@
             </a:pPr>
             <a:r>
               <a:rPr lang="en-US" sz="2800" dirty="0"/>
-              <a:t>Ms. Anne Varghese</a:t>
-            </a:r>
-          </a:p>
+              <a:t>Joel Kuriakose Jubin</a:t>
+            </a:r>
+          </a:p>
+        </p:txBody>
+      </p:sp>
+      <p:sp>
+        <p:nvSpPr>
+          <p:cNvPr id="4" name="Content Placeholder 3"/>
+          <p:cNvSpPr>
+            <a:spLocks noGrp="1"/>
+          </p:cNvSpPr>
+          <p:nvPr>
+            <p:ph sz="half" idx="2"/>
+          </p:nvPr>
+        </p:nvSpPr>
+        <p:spPr>
+          <a:xfrm>
+            <a:off x="7042420" y="2019056"/>
+            <a:ext cx="4787629" cy="3441520"/>
+          </a:xfrm>
+        </p:spPr>
+        <p:txBody>
+          <a:bodyPr>
+            <a:noAutofit/>
+          </a:bodyPr>
+          <a:lstStyle/>
           <a:p>
             <a:pPr marL="0" indent="0">
               <a:lnSpc>
@@ -6719,46 +6732,19 @@
               <a:buNone/>
             </a:pPr>
             <a:r>
+              <a:rPr lang="en-US" sz="2800" dirty="0" err="1"/>
+              <a:t>Jerrin</a:t>
+            </a:r>
+            <a:r>
               <a:rPr lang="en-US" sz="2800" dirty="0"/>
-              <a:t>Dr. </a:t>
+              <a:t> </a:t>
             </a:r>
             <a:r>
               <a:rPr lang="en-US" sz="2800" dirty="0" err="1"/>
-              <a:t>Leji</a:t>
-            </a:r>
-            <a:r>
-              <a:rPr lang="en-US" sz="2800" dirty="0"/>
-              <a:t> John Joy </a:t>
-            </a:r>
-            <a:r>
-              <a:rPr lang="en-US" sz="2800" dirty="0" err="1"/>
-              <a:t>Thundyil</a:t>
+              <a:t>Shaji</a:t>
             </a:r>
             <a:endParaRPr lang="en-US" sz="2800" dirty="0"/>
           </a:p>
-        </p:txBody>
-      </p:sp>
-      <p:sp>
-        <p:nvSpPr>
-          <p:cNvPr id="4" name="Content Placeholder 3"/>
-          <p:cNvSpPr>
-            <a:spLocks noGrp="1"/>
-          </p:cNvSpPr>
-          <p:nvPr>
-            <p:ph sz="half" idx="2"/>
-          </p:nvPr>
-        </p:nvSpPr>
-        <p:spPr>
-          <a:xfrm>
-            <a:off x="7042420" y="2019056"/>
-            <a:ext cx="4787629" cy="3441520"/>
-          </a:xfrm>
-        </p:spPr>
-        <p:txBody>
-          <a:bodyPr>
-            <a:noAutofit/>
-          </a:bodyPr>
-          <a:lstStyle/>
           <a:p>
             <a:pPr marL="0" indent="0">
               <a:lnSpc>
@@ -6770,8 +6756,12 @@
               <a:buNone/>
             </a:pPr>
             <a:r>
+              <a:rPr lang="en-US" sz="2800" dirty="0" err="1"/>
+              <a:t>Abin</a:t>
+            </a:r>
+            <a:r>
               <a:rPr lang="en-US" sz="2800" dirty="0"/>
-              <a:t>Mrs. Mary Jacob</a:t>
+              <a:t> P Vincent</a:t>
             </a:r>
           </a:p>
           <a:p>
@@ -6785,18 +6775,9 @@
               <a:buNone/>
             </a:pPr>
             <a:r>
-              <a:rPr lang="en-US" sz="2800" dirty="0" err="1"/>
-              <a:t>Juvan</a:t>
-            </a:r>
-            <a:r>
               <a:rPr lang="en-US" sz="2800" dirty="0"/>
-              <a:t> </a:t>
-            </a:r>
-            <a:r>
-              <a:rPr lang="en-US" sz="2800" dirty="0" err="1"/>
-              <a:t>Liju</a:t>
-            </a:r>
-            <a:endParaRPr lang="en-US" sz="2800" dirty="0"/>
+              <a:t>Ria Grace Koshy</a:t>
+            </a:r>
           </a:p>
           <a:p>
             <a:pPr marL="0" indent="0">
@@ -6810,7 +6791,15 @@
             </a:pPr>
             <a:r>
               <a:rPr lang="en-US" sz="2800" dirty="0"/>
-              <a:t>Mr. Mathew T Thomas</a:t>
+              <a:t>Mrs. </a:t>
+            </a:r>
+            <a:r>
+              <a:rPr lang="en-US" sz="2800" dirty="0" err="1"/>
+              <a:t>Chinnamma</a:t>
+            </a:r>
+            <a:r>
+              <a:rPr lang="en-US" sz="2800" dirty="0"/>
+              <a:t> M K</a:t>
             </a:r>
           </a:p>
           <a:p>
@@ -6825,8 +6814,67 @@
             </a:pPr>
             <a:r>
               <a:rPr lang="en-US" sz="2800" dirty="0"/>
-              <a:t>Daniel Cyril Joseph</a:t>
-            </a:r>
+              <a:t>Mr. </a:t>
+            </a:r>
+            <a:r>
+              <a:rPr lang="en-US" sz="2800" dirty="0" err="1"/>
+              <a:t>Jikku</a:t>
+            </a:r>
+            <a:r>
+              <a:rPr lang="en-US" sz="2800" dirty="0"/>
+              <a:t> </a:t>
+            </a:r>
+            <a:r>
+              <a:rPr lang="en-US" sz="2800" dirty="0" err="1"/>
+              <a:t>Eapen</a:t>
+            </a:r>
+            <a:r>
+              <a:rPr lang="en-US" sz="2800" dirty="0"/>
+              <a:t> Abraham</a:t>
+            </a:r>
+          </a:p>
+          <a:p>
+            <a:pPr marL="0" indent="0">
+              <a:lnSpc>
+                <a:spcPct val="110000"/>
+              </a:lnSpc>
+              <a:spcBef>
+                <a:spcPts val="600"/>
+              </a:spcBef>
+              <a:buNone/>
+            </a:pPr>
+            <a:r>
+              <a:rPr lang="en-US" sz="2800" dirty="0"/>
+              <a:t>Mr. </a:t>
+            </a:r>
+            <a:r>
+              <a:rPr lang="en-US" sz="2800" dirty="0" err="1"/>
+              <a:t>Jobu</a:t>
+            </a:r>
+            <a:r>
+              <a:rPr lang="en-US" sz="2800" dirty="0"/>
+              <a:t> K Babu</a:t>
+            </a:r>
+          </a:p>
+          <a:p>
+            <a:pPr marL="0" indent="0">
+              <a:lnSpc>
+                <a:spcPct val="110000"/>
+              </a:lnSpc>
+              <a:spcBef>
+                <a:spcPts val="600"/>
+              </a:spcBef>
+              <a:buNone/>
+            </a:pPr>
+            <a:r>
+              <a:rPr lang="en-US" sz="2800" dirty="0"/>
+              <a:t>Mr. Naveen </a:t>
+            </a:r>
+            <a:r>
+              <a:rPr lang="en-US" sz="2800" dirty="0" err="1"/>
+              <a:t>Verghese</a:t>
+            </a:r>
+            <a:endParaRPr lang="en-US" sz="2800" dirty="0"/>
           </a:p>
         </p:txBody>
       </p:sp>
@@ -6912,7 +6960,7 @@
               <a:rPr lang="en-US" sz="1800" b="1" dirty="0">
                 <a:latin typeface="+mn-lt"/>
               </a:rPr>
-              <a:t>(Aug 10</a:t>
+              <a:t>(Aug 17</a:t>
             </a:r>
             <a:r>
               <a:rPr lang="en-US" sz="1800" b="1" baseline="30000" dirty="0">
@@ -6924,13 +6972,13 @@
               <a:rPr lang="en-US" sz="1800" b="1" dirty="0">
                 <a:latin typeface="+mn-lt"/>
               </a:rPr>
-              <a:t>– 16</a:t>
+              <a:t>– 23</a:t>
             </a:r>
             <a:r>
               <a:rPr lang="en-US" sz="1800" b="1" baseline="30000" dirty="0">
                 <a:latin typeface="+mn-lt"/>
               </a:rPr>
-              <a:t>th</a:t>
+              <a:t>rd</a:t>
             </a:r>
             <a:r>
               <a:rPr lang="en-US" sz="1800" b="1" dirty="0">
@@ -7011,16 +7059,29 @@
             </a:pPr>
             <a:r>
               <a:rPr lang="en-US" sz="2800" dirty="0"/>
-              <a:t>Mr. Koshy George &amp; Mrs. </a:t>
+              <a:t>Mr. Joseph </a:t>
+            </a:r>
+            <a:r>
+              <a:rPr lang="en-US" sz="2800"/>
+              <a:t>KANDathil</a:t>
+            </a:r>
+            <a:r>
+              <a:rPr lang="en-US" sz="2800" dirty="0"/>
+              <a:t> </a:t>
             </a:r>
             <a:r>
               <a:rPr lang="en-US" sz="2800" dirty="0" err="1"/>
-              <a:t>Bensy</a:t>
+              <a:t>Mammen</a:t>
             </a:r>
             <a:r>
               <a:rPr lang="en-US" sz="2800" dirty="0"/>
-              <a:t> Denson</a:t>
-            </a:r>
+              <a:t> &amp; Mrs. Sara </a:t>
+            </a:r>
+            <a:r>
+              <a:rPr lang="en-US" sz="2800" dirty="0" err="1"/>
+              <a:t>Mammen</a:t>
+            </a:r>
+            <a:endParaRPr lang="en-US" sz="2800" dirty="0"/>
           </a:p>
           <a:p>
             <a:pPr marL="0" indent="0">
@@ -7038,11 +7099,11 @@
             </a:r>
             <a:r>
               <a:rPr lang="en-US" sz="2800" dirty="0" err="1"/>
-              <a:t>Shiju</a:t>
+              <a:t>Verghese</a:t>
             </a:r>
             <a:r>
               <a:rPr lang="en-US" sz="2800" dirty="0"/>
-              <a:t> Varghese Joyce &amp; Mrs. Leena Mathew</a:t>
+              <a:t> George &amp; Mrs. Mariam John</a:t>
             </a:r>
           </a:p>
           <a:p>
@@ -7057,15 +7118,15 @@
             </a:pPr>
             <a:r>
               <a:rPr lang="en-US" sz="2800" dirty="0"/>
-              <a:t>Mr. Anson George Alexander &amp; Mrs. </a:t>
+              <a:t>Mr. Deepak Thomas &amp; Mrs. </a:t>
             </a:r>
             <a:r>
               <a:rPr lang="en-US" sz="2800" dirty="0" err="1"/>
-              <a:t>Ammu</a:t>
+              <a:t>Lini</a:t>
             </a:r>
             <a:r>
               <a:rPr lang="en-US" sz="2800" dirty="0"/>
-              <a:t> Mary Augustine</a:t>
+              <a:t> Elizabeth Varghese</a:t>
             </a:r>
           </a:p>
           <a:p>
@@ -7080,21 +7141,54 @@
             </a:pPr>
             <a:r>
               <a:rPr lang="en-US" sz="2800" dirty="0"/>
-              <a:t>MR. </a:t>
+              <a:t>Mr. Reni Varghese Thomas &amp; Mrs. </a:t>
             </a:r>
             <a:r>
               <a:rPr lang="en-US" sz="2800" dirty="0" err="1"/>
-              <a:t>FredErick</a:t>
+              <a:t>Sherine</a:t>
             </a:r>
             <a:r>
               <a:rPr lang="en-US" sz="2800" dirty="0"/>
-              <a:t> Thomas &amp; Susie </a:t>
-            </a:r>
-            <a:r>
-              <a:rPr lang="en-US" sz="2800"/>
-              <a:t>FredErick</a:t>
-            </a:r>
-            <a:endParaRPr lang="en-US" sz="2800" dirty="0"/>
+              <a:t> Reni</a:t>
+            </a:r>
+          </a:p>
+          <a:p>
+            <a:pPr marL="0" indent="0">
+              <a:lnSpc>
+                <a:spcPct val="110000"/>
+              </a:lnSpc>
+              <a:spcBef>
+                <a:spcPts val="600"/>
+              </a:spcBef>
+              <a:buNone/>
+            </a:pPr>
+            <a:r>
+              <a:rPr lang="en-US" sz="2800" dirty="0"/>
+              <a:t>Mr. Robin Kuriakose Thomas &amp; Mrs. </a:t>
+            </a:r>
+            <a:r>
+              <a:rPr lang="en-US" sz="2800" dirty="0" err="1"/>
+              <a:t>Remya</a:t>
+            </a:r>
+            <a:r>
+              <a:rPr lang="en-US" sz="2800" dirty="0"/>
+              <a:t> Joseph</a:t>
+            </a:r>
+          </a:p>
+          <a:p>
+            <a:pPr marL="0" indent="0">
+              <a:lnSpc>
+                <a:spcPct val="110000"/>
+              </a:lnSpc>
+              <a:spcBef>
+                <a:spcPts val="600"/>
+              </a:spcBef>
+              <a:buNone/>
+            </a:pPr>
+            <a:r>
+              <a:rPr lang="en-US" sz="2800" dirty="0"/>
+              <a:t>Mr. Gregory Rajan George &amp; Mrs. Aksa Susan Koshy</a:t>
+            </a:r>
           </a:p>
         </p:txBody>
       </p:sp>
@@ -7207,36 +7301,25 @@
           </a:lstStyle>
           <a:p>
             <a:r>
-              <a:rPr lang="en-US" sz="1800" b="1" dirty="0">
-                <a:latin typeface="+mn-lt"/>
-              </a:rPr>
-              <a:t>(Aug 10</a:t>
-            </a:r>
-            <a:r>
-              <a:rPr lang="en-US" sz="1800" b="1" baseline="30000" dirty="0">
-                <a:latin typeface="+mn-lt"/>
-              </a:rPr>
+              <a:rPr lang="en-US" sz="1800" b="1" dirty="0"/>
+              <a:t>(Aug 17</a:t>
+            </a:r>
+            <a:r>
+              <a:rPr lang="en-US" sz="1800" b="1" baseline="30000" dirty="0"/>
               <a:t>th </a:t>
             </a:r>
             <a:r>
-              <a:rPr lang="en-US" sz="1800" b="1" dirty="0">
-                <a:latin typeface="+mn-lt"/>
-              </a:rPr>
-              <a:t>– 16</a:t>
-            </a:r>
-            <a:r>
-              <a:rPr lang="en-US" sz="1800" b="1" baseline="30000" dirty="0">
-                <a:latin typeface="+mn-lt"/>
-              </a:rPr>
-              <a:t>th</a:t>
-            </a:r>
-            <a:r>
-              <a:rPr lang="en-US" sz="1800" b="1" dirty="0">
-                <a:latin typeface="+mn-lt"/>
-              </a:rPr>
+              <a:rPr lang="en-US" sz="1800" b="1" dirty="0"/>
+              <a:t>– 23</a:t>
+            </a:r>
+            <a:r>
+              <a:rPr lang="en-US" sz="1800" b="1" baseline="30000" dirty="0"/>
+              <a:t>rd</a:t>
+            </a:r>
+            <a:r>
+              <a:rPr lang="en-US" sz="1800" b="1" dirty="0"/>
               <a:t> 2020)</a:t>
             </a:r>
-            <a:endParaRPr lang="en-US" sz="1800" b="1" dirty="0"/>
           </a:p>
         </p:txBody>
       </p:sp>

</xml_diff>

<commit_message>
Update Bava Thirumeni Birthday
</commit_message>
<xml_diff>
--- a/stosc_services/PPT/Birthday & Anniversaries.pptx
+++ b/stosc_services/PPT/Birthday & Anniversaries.pptx
@@ -6,7 +6,8 @@
   </p:sldMasterIdLst>
   <p:sldIdLst>
     <p:sldId id="257" r:id="rId2"/>
-    <p:sldId id="258" r:id="rId3"/>
+    <p:sldId id="259" r:id="rId3"/>
+    <p:sldId id="258" r:id="rId4"/>
   </p:sldIdLst>
   <p:sldSz cx="12192000" cy="6858000"/>
   <p:notesSz cx="6858000" cy="9144000"/>
@@ -284,7 +285,7 @@
           <a:p>
             <a:fld id="{48A87A34-81AB-432B-8DAE-1953F412C126}" type="datetimeFigureOut">
               <a:rPr lang="en-US" smtClean="0"/>
-              <a:t>8/29/2020</a:t>
+              <a:t>8/30/2020</a:t>
             </a:fld>
             <a:endParaRPr lang="en-US" dirty="0"/>
           </a:p>
@@ -597,7 +598,7 @@
             <a:fld id="{48A87A34-81AB-432B-8DAE-1953F412C126}" type="datetimeFigureOut">
               <a:rPr lang="en-US" smtClean="0"/>
               <a:pPr/>
-              <a:t>8/29/2020</a:t>
+              <a:t>8/30/2020</a:t>
             </a:fld>
             <a:endParaRPr lang="en-US" dirty="0"/>
           </a:p>
@@ -821,7 +822,7 @@
             <a:fld id="{48A87A34-81AB-432B-8DAE-1953F412C126}" type="datetimeFigureOut">
               <a:rPr lang="en-US" smtClean="0"/>
               <a:pPr/>
-              <a:t>8/29/2020</a:t>
+              <a:t>8/30/2020</a:t>
             </a:fld>
             <a:endParaRPr lang="en-US" dirty="0"/>
           </a:p>
@@ -1114,7 +1115,7 @@
             <a:fld id="{48A87A34-81AB-432B-8DAE-1953F412C126}" type="datetimeFigureOut">
               <a:rPr lang="en-US" smtClean="0"/>
               <a:pPr/>
-              <a:t>8/29/2020</a:t>
+              <a:t>8/30/2020</a:t>
             </a:fld>
             <a:endParaRPr lang="en-US" dirty="0"/>
           </a:p>
@@ -1570,7 +1571,7 @@
             <a:fld id="{48A87A34-81AB-432B-8DAE-1953F412C126}" type="datetimeFigureOut">
               <a:rPr lang="en-US" smtClean="0"/>
               <a:pPr/>
-              <a:t>8/29/2020</a:t>
+              <a:t>8/30/2020</a:t>
             </a:fld>
             <a:endParaRPr lang="en-US" dirty="0"/>
           </a:p>
@@ -2148,7 +2149,7 @@
             <a:fld id="{48A87A34-81AB-432B-8DAE-1953F412C126}" type="datetimeFigureOut">
               <a:rPr lang="en-US" smtClean="0"/>
               <a:pPr/>
-              <a:t>8/29/2020</a:t>
+              <a:t>8/30/2020</a:t>
             </a:fld>
             <a:endParaRPr lang="en-US" dirty="0"/>
           </a:p>
@@ -3002,7 +3003,7 @@
             <a:fld id="{48A87A34-81AB-432B-8DAE-1953F412C126}" type="datetimeFigureOut">
               <a:rPr lang="en-US" smtClean="0"/>
               <a:pPr/>
-              <a:t>8/29/2020</a:t>
+              <a:t>8/30/2020</a:t>
             </a:fld>
             <a:endParaRPr lang="en-US" dirty="0"/>
           </a:p>
@@ -3209,7 +3210,7 @@
             <a:fld id="{48A87A34-81AB-432B-8DAE-1953F412C126}" type="datetimeFigureOut">
               <a:rPr lang="en-US" smtClean="0"/>
               <a:pPr/>
-              <a:t>8/29/2020</a:t>
+              <a:t>8/30/2020</a:t>
             </a:fld>
             <a:endParaRPr lang="en-US" dirty="0"/>
           </a:p>
@@ -3425,7 +3426,7 @@
             <a:fld id="{48A87A34-81AB-432B-8DAE-1953F412C126}" type="datetimeFigureOut">
               <a:rPr lang="en-US" smtClean="0"/>
               <a:pPr/>
-              <a:t>8/29/2020</a:t>
+              <a:t>8/30/2020</a:t>
             </a:fld>
             <a:endParaRPr lang="en-US" dirty="0"/>
           </a:p>
@@ -3663,7 +3664,7 @@
           <a:p>
             <a:fld id="{48A87A34-81AB-432B-8DAE-1953F412C126}" type="datetimeFigureOut">
               <a:rPr lang="en-US" smtClean="0"/>
-              <a:t>8/29/2020</a:t>
+              <a:t>8/30/2020</a:t>
             </a:fld>
             <a:endParaRPr lang="en-US" dirty="0"/>
           </a:p>
@@ -3833,7 +3834,7 @@
           <a:p>
             <a:fld id="{48A87A34-81AB-432B-8DAE-1953F412C126}" type="datetimeFigureOut">
               <a:rPr lang="en-US" smtClean="0"/>
-              <a:t>8/29/2020</a:t>
+              <a:t>8/30/2020</a:t>
             </a:fld>
             <a:endParaRPr lang="en-US" dirty="0"/>
           </a:p>
@@ -4039,7 +4040,7 @@
             <a:fld id="{48A87A34-81AB-432B-8DAE-1953F412C126}" type="datetimeFigureOut">
               <a:rPr lang="en-US" smtClean="0"/>
               <a:pPr/>
-              <a:t>8/29/2020</a:t>
+              <a:t>8/30/2020</a:t>
             </a:fld>
             <a:endParaRPr lang="en-US" dirty="0"/>
           </a:p>
@@ -4320,7 +4321,7 @@
           <a:p>
             <a:fld id="{48A87A34-81AB-432B-8DAE-1953F412C126}" type="datetimeFigureOut">
               <a:rPr lang="en-US" smtClean="0"/>
-              <a:t>8/29/2020</a:t>
+              <a:t>8/30/2020</a:t>
             </a:fld>
             <a:endParaRPr lang="en-US" dirty="0"/>
           </a:p>
@@ -4588,7 +4589,7 @@
             <a:fld id="{48A87A34-81AB-432B-8DAE-1953F412C126}" type="datetimeFigureOut">
               <a:rPr lang="en-US" smtClean="0"/>
               <a:pPr/>
-              <a:t>8/29/2020</a:t>
+              <a:t>8/30/2020</a:t>
             </a:fld>
             <a:endParaRPr lang="en-US" dirty="0"/>
           </a:p>
@@ -5005,7 +5006,7 @@
             <a:fld id="{48A87A34-81AB-432B-8DAE-1953F412C126}" type="datetimeFigureOut">
               <a:rPr lang="en-US" smtClean="0"/>
               <a:pPr/>
-              <a:t>8/29/2020</a:t>
+              <a:t>8/30/2020</a:t>
             </a:fld>
             <a:endParaRPr lang="en-US" dirty="0"/>
           </a:p>
@@ -5154,7 +5155,7 @@
           <a:p>
             <a:fld id="{48A87A34-81AB-432B-8DAE-1953F412C126}" type="datetimeFigureOut">
               <a:rPr lang="en-US" smtClean="0"/>
-              <a:t>8/29/2020</a:t>
+              <a:t>8/30/2020</a:t>
             </a:fld>
             <a:endParaRPr lang="en-US" dirty="0"/>
           </a:p>
@@ -5279,7 +5280,7 @@
           <a:p>
             <a:fld id="{48A87A34-81AB-432B-8DAE-1953F412C126}" type="datetimeFigureOut">
               <a:rPr lang="en-US" smtClean="0"/>
-              <a:t>8/29/2020</a:t>
+              <a:t>8/30/2020</a:t>
             </a:fld>
             <a:endParaRPr lang="en-US" dirty="0"/>
           </a:p>
@@ -5559,7 +5560,7 @@
             <a:fld id="{48A87A34-81AB-432B-8DAE-1953F412C126}" type="datetimeFigureOut">
               <a:rPr lang="en-US" smtClean="0"/>
               <a:pPr/>
-              <a:t>8/29/2020</a:t>
+              <a:t>8/30/2020</a:t>
             </a:fld>
             <a:endParaRPr lang="en-US" dirty="0"/>
           </a:p>
@@ -5872,7 +5873,7 @@
           <a:p>
             <a:fld id="{48A87A34-81AB-432B-8DAE-1953F412C126}" type="datetimeFigureOut">
               <a:rPr lang="en-US" smtClean="0"/>
-              <a:t>8/29/2020</a:t>
+              <a:t>8/30/2020</a:t>
             </a:fld>
             <a:endParaRPr lang="en-US" dirty="0"/>
           </a:p>
@@ -6126,7 +6127,7 @@
             <a:fld id="{48A87A34-81AB-432B-8DAE-1953F412C126}" type="datetimeFigureOut">
               <a:rPr lang="en-US" smtClean="0"/>
               <a:pPr/>
-              <a:t>8/29/2020</a:t>
+              <a:t>8/30/2020</a:t>
             </a:fld>
             <a:endParaRPr lang="en-US" dirty="0"/>
           </a:p>
@@ -6983,6 +6984,508 @@
 <file path=ppt/slides/slide2.xml><?xml version="1.0" encoding="utf-8"?>
 <p:sld xmlns:a="http://schemas.openxmlformats.org/drawingml/2006/main" xmlns:r="http://schemas.openxmlformats.org/officeDocument/2006/relationships" xmlns:p="http://schemas.openxmlformats.org/presentationml/2006/main">
   <p:cSld>
+    <p:bg>
+      <p:bgPr>
+        <a:gradFill rotWithShape="1">
+          <a:gsLst>
+            <a:gs pos="0">
+              <a:schemeClr val="bg1">
+                <a:tint val="90000"/>
+                <a:lumMod val="110000"/>
+              </a:schemeClr>
+            </a:gs>
+            <a:gs pos="100000">
+              <a:schemeClr val="bg1">
+                <a:shade val="64000"/>
+                <a:lumMod val="88000"/>
+              </a:schemeClr>
+            </a:gs>
+          </a:gsLst>
+          <a:lin ang="5400000" scaled="0"/>
+        </a:gradFill>
+        <a:effectLst/>
+      </p:bgPr>
+    </p:bg>
+    <p:spTree>
+      <p:nvGrpSpPr>
+        <p:cNvPr id="1" name=""/>
+        <p:cNvGrpSpPr/>
+        <p:nvPr/>
+      </p:nvGrpSpPr>
+      <p:grpSpPr>
+        <a:xfrm>
+          <a:off x="0" y="0"/>
+          <a:ext cx="0" cy="0"/>
+          <a:chOff x="0" y="0"/>
+          <a:chExt cx="0" cy="0"/>
+        </a:xfrm>
+      </p:grpSpPr>
+      <p:pic>
+        <p:nvPicPr>
+          <p:cNvPr id="14" name="Picture 2">
+            <a:extLst>
+              <a:ext uri="{FF2B5EF4-FFF2-40B4-BE49-F238E27FC236}">
+                <a16:creationId xmlns:a16="http://schemas.microsoft.com/office/drawing/2014/main" id="{22790EC5-ACA7-4536-8066-B60199F3C6DF}"/>
+              </a:ext>
+              <a:ext uri="{C183D7F6-B498-43B3-948B-1728B52AA6E4}">
+                <adec:decorative xmlns:adec="http://schemas.microsoft.com/office/drawing/2017/decorative" val="1"/>
+              </a:ext>
+            </a:extLst>
+          </p:cNvPr>
+          <p:cNvPicPr>
+            <a:picLocks noGrp="1" noRot="1" noChangeAspect="1" noMove="1" noResize="1" noEditPoints="1" noAdjustHandles="1" noChangeArrowheads="1" noChangeShapeType="1" noCrop="1"/>
+          </p:cNvPicPr>
+          <p:nvPr>
+            <p:extLst>
+              <p:ext uri="{386F3935-93C4-4BCD-93E2-E3B085C9AB24}">
+                <p16:designElem xmlns:p16="http://schemas.microsoft.com/office/powerpoint/2015/main" val="1"/>
+              </p:ext>
+            </p:extLst>
+          </p:nvPr>
+        </p:nvPicPr>
+        <p:blipFill>
+          <a:blip r:embed="rId2">
+            <a:alphaModFix/>
+            <a:extLst>
+              <a:ext uri="{28A0092B-C50C-407E-A947-70E740481C1C}">
+                <a14:useLocalDpi xmlns:a14="http://schemas.microsoft.com/office/drawing/2010/main" val="0"/>
+              </a:ext>
+            </a:extLst>
+          </a:blip>
+          <a:srcRect/>
+          <a:stretch>
+            <a:fillRect/>
+          </a:stretch>
+        </p:blipFill>
+        <p:spPr bwMode="auto">
+          <a:xfrm>
+            <a:off x="0" y="-1"/>
+            <a:ext cx="12192003" cy="6858001"/>
+          </a:xfrm>
+          <a:prstGeom prst="rect">
+            <a:avLst/>
+          </a:prstGeom>
+          <a:noFill/>
+          <a:extLst>
+            <a:ext uri="{909E8E84-426E-40DD-AFC4-6F175D3DCCD1}">
+              <a14:hiddenFill xmlns:a14="http://schemas.microsoft.com/office/drawing/2010/main">
+                <a:solidFill>
+                  <a:srgbClr val="FFFFFF"/>
+                </a:solidFill>
+              </a14:hiddenFill>
+            </a:ext>
+          </a:extLst>
+        </p:spPr>
+      </p:pic>
+      <p:pic>
+        <p:nvPicPr>
+          <p:cNvPr id="16" name="Picture 15">
+            <a:extLst>
+              <a:ext uri="{FF2B5EF4-FFF2-40B4-BE49-F238E27FC236}">
+                <a16:creationId xmlns:a16="http://schemas.microsoft.com/office/drawing/2014/main" id="{CAD20AEA-7CAF-4A83-BE2E-EAF010B8B7FC}"/>
+              </a:ext>
+              <a:ext uri="{C183D7F6-B498-43B3-948B-1728B52AA6E4}">
+                <adec:decorative xmlns:adec="http://schemas.microsoft.com/office/drawing/2017/decorative" val="1"/>
+              </a:ext>
+            </a:extLst>
+          </p:cNvPr>
+          <p:cNvPicPr>
+            <a:picLocks noGrp="1" noRot="1" noChangeAspect="1" noMove="1" noResize="1" noEditPoints="1" noAdjustHandles="1" noChangeArrowheads="1" noChangeShapeType="1" noCrop="1"/>
+          </p:cNvPicPr>
+          <p:nvPr>
+            <p:extLst>
+              <p:ext uri="{386F3935-93C4-4BCD-93E2-E3B085C9AB24}">
+                <p16:designElem xmlns:p16="http://schemas.microsoft.com/office/powerpoint/2015/main" val="1"/>
+              </p:ext>
+            </p:extLst>
+          </p:nvPr>
+        </p:nvPicPr>
+        <p:blipFill>
+          <a:blip r:embed="rId3">
+            <a:extLst>
+              <a:ext uri="{28A0092B-C50C-407E-A947-70E740481C1C}">
+                <a14:useLocalDpi xmlns:a14="http://schemas.microsoft.com/office/drawing/2010/main" val="0"/>
+              </a:ext>
+            </a:extLst>
+          </a:blip>
+          <a:stretch>
+            <a:fillRect/>
+          </a:stretch>
+        </p:blipFill>
+        <p:spPr>
+          <a:xfrm>
+            <a:off x="0" y="0"/>
+            <a:ext cx="12192000" cy="6858000"/>
+          </a:xfrm>
+          <a:prstGeom prst="rect">
+            <a:avLst/>
+          </a:prstGeom>
+        </p:spPr>
+      </p:pic>
+      <p:sp useBgFill="1">
+        <p:nvSpPr>
+          <p:cNvPr id="18" name="Rectangle 17">
+            <a:extLst>
+              <a:ext uri="{FF2B5EF4-FFF2-40B4-BE49-F238E27FC236}">
+                <a16:creationId xmlns:a16="http://schemas.microsoft.com/office/drawing/2014/main" id="{2255CADE-DCE0-447F-B290-2AE78E5E5598}"/>
+              </a:ext>
+              <a:ext uri="{C183D7F6-B498-43B3-948B-1728B52AA6E4}">
+                <adec:decorative xmlns:adec="http://schemas.microsoft.com/office/drawing/2017/decorative" val="1"/>
+              </a:ext>
+            </a:extLst>
+          </p:cNvPr>
+          <p:cNvSpPr>
+            <a:spLocks noGrp="1" noRot="1" noChangeAspect="1" noMove="1" noResize="1" noEditPoints="1" noAdjustHandles="1" noChangeArrowheads="1" noChangeShapeType="1" noTextEdit="1"/>
+          </p:cNvSpPr>
+          <p:nvPr>
+            <p:extLst>
+              <p:ext uri="{386F3935-93C4-4BCD-93E2-E3B085C9AB24}">
+                <p16:designElem xmlns:p16="http://schemas.microsoft.com/office/powerpoint/2015/main" val="1"/>
+              </p:ext>
+            </p:extLst>
+          </p:nvPr>
+        </p:nvSpPr>
+        <p:spPr>
+          <a:xfrm>
+            <a:off x="0" y="0"/>
+            <a:ext cx="12192000" cy="6858000"/>
+          </a:xfrm>
+          <a:prstGeom prst="rect">
+            <a:avLst/>
+          </a:prstGeom>
+          <a:ln>
+            <a:noFill/>
+          </a:ln>
+        </p:spPr>
+        <p:style>
+          <a:lnRef idx="2">
+            <a:schemeClr val="accent1">
+              <a:shade val="50000"/>
+            </a:schemeClr>
+          </a:lnRef>
+          <a:fillRef idx="1">
+            <a:schemeClr val="accent1"/>
+          </a:fillRef>
+          <a:effectRef idx="0">
+            <a:schemeClr val="accent1"/>
+          </a:effectRef>
+          <a:fontRef idx="minor">
+            <a:schemeClr val="lt1"/>
+          </a:fontRef>
+        </p:style>
+        <p:txBody>
+          <a:bodyPr rtlCol="0" anchor="ctr"/>
+          <a:lstStyle/>
+          <a:p>
+            <a:pPr algn="ctr"/>
+            <a:endParaRPr lang="en-US"/>
+          </a:p>
+        </p:txBody>
+      </p:sp>
+      <p:sp>
+        <p:nvSpPr>
+          <p:cNvPr id="20" name="Rectangle 19">
+            <a:extLst>
+              <a:ext uri="{FF2B5EF4-FFF2-40B4-BE49-F238E27FC236}">
+                <a16:creationId xmlns:a16="http://schemas.microsoft.com/office/drawing/2014/main" id="{4245587C-701C-48A1-9B6B-10C3DF81A876}"/>
+              </a:ext>
+              <a:ext uri="{C183D7F6-B498-43B3-948B-1728B52AA6E4}">
+                <adec:decorative xmlns:adec="http://schemas.microsoft.com/office/drawing/2017/decorative" val="1"/>
+              </a:ext>
+            </a:extLst>
+          </p:cNvPr>
+          <p:cNvSpPr>
+            <a:spLocks noGrp="1" noRot="1" noChangeAspect="1" noMove="1" noResize="1" noEditPoints="1" noAdjustHandles="1" noChangeArrowheads="1" noChangeShapeType="1" noTextEdit="1"/>
+          </p:cNvSpPr>
+          <p:nvPr>
+            <p:extLst>
+              <p:ext uri="{386F3935-93C4-4BCD-93E2-E3B085C9AB24}">
+                <p16:designElem xmlns:p16="http://schemas.microsoft.com/office/powerpoint/2015/main" val="1"/>
+              </p:ext>
+            </p:extLst>
+          </p:nvPr>
+        </p:nvSpPr>
+        <p:spPr>
+          <a:xfrm>
+            <a:off x="6933061" y="-2"/>
+            <a:ext cx="81313" cy="6858002"/>
+          </a:xfrm>
+          <a:prstGeom prst="rect">
+            <a:avLst/>
+          </a:prstGeom>
+          <a:gradFill flip="none" rotWithShape="1">
+            <a:gsLst>
+              <a:gs pos="84000">
+                <a:srgbClr val="B5B5B5"/>
+              </a:gs>
+              <a:gs pos="60159">
+                <a:srgbClr val="D5D5D5"/>
+              </a:gs>
+              <a:gs pos="50447">
+                <a:srgbClr val="E6E6E6"/>
+              </a:gs>
+              <a:gs pos="44260">
+                <a:srgbClr val="D5D5D5"/>
+              </a:gs>
+              <a:gs pos="15928">
+                <a:srgbClr val="B5B5B5"/>
+              </a:gs>
+              <a:gs pos="7000">
+                <a:srgbClr val="8A8A8A"/>
+              </a:gs>
+              <a:gs pos="0">
+                <a:srgbClr val="BBBBBB"/>
+              </a:gs>
+              <a:gs pos="93000">
+                <a:srgbClr val="8A8A8A"/>
+              </a:gs>
+              <a:gs pos="100000">
+                <a:srgbClr val="BBBBBB"/>
+              </a:gs>
+            </a:gsLst>
+            <a:lin ang="0" scaled="1"/>
+            <a:tileRect/>
+          </a:gradFill>
+          <a:ln>
+            <a:noFill/>
+          </a:ln>
+        </p:spPr>
+        <p:style>
+          <a:lnRef idx="2">
+            <a:schemeClr val="accent1">
+              <a:shade val="50000"/>
+            </a:schemeClr>
+          </a:lnRef>
+          <a:fillRef idx="1">
+            <a:schemeClr val="accent1"/>
+          </a:fillRef>
+          <a:effectRef idx="0">
+            <a:schemeClr val="accent1"/>
+          </a:effectRef>
+          <a:fontRef idx="minor">
+            <a:schemeClr val="lt1"/>
+          </a:fontRef>
+        </p:style>
+        <p:txBody>
+          <a:bodyPr rtlCol="0" anchor="ctr"/>
+          <a:lstStyle/>
+          <a:p>
+            <a:pPr algn="ctr"/>
+            <a:endParaRPr lang="en-US"/>
+          </a:p>
+        </p:txBody>
+      </p:sp>
+      <p:pic>
+        <p:nvPicPr>
+          <p:cNvPr id="22" name="Picture 21">
+            <a:extLst>
+              <a:ext uri="{FF2B5EF4-FFF2-40B4-BE49-F238E27FC236}">
+                <a16:creationId xmlns:a16="http://schemas.microsoft.com/office/drawing/2014/main" id="{2E5CF545-7AAF-4A13-8871-089E929E850A}"/>
+              </a:ext>
+              <a:ext uri="{C183D7F6-B498-43B3-948B-1728B52AA6E4}">
+                <adec:decorative xmlns:adec="http://schemas.microsoft.com/office/drawing/2017/decorative" val="1"/>
+              </a:ext>
+            </a:extLst>
+          </p:cNvPr>
+          <p:cNvPicPr>
+            <a:picLocks noGrp="1" noRot="1" noChangeAspect="1" noMove="1" noResize="1" noEditPoints="1" noAdjustHandles="1" noChangeArrowheads="1" noChangeShapeType="1" noCrop="1"/>
+          </p:cNvPicPr>
+          <p:nvPr>
+            <p:extLst>
+              <p:ext uri="{386F3935-93C4-4BCD-93E2-E3B085C9AB24}">
+                <p16:designElem xmlns:p16="http://schemas.microsoft.com/office/powerpoint/2015/main" val="1"/>
+              </p:ext>
+            </p:extLst>
+          </p:nvPr>
+        </p:nvPicPr>
+        <p:blipFill>
+          <a:blip r:embed="rId3">
+            <a:extLst>
+              <a:ext uri="{28A0092B-C50C-407E-A947-70E740481C1C}">
+                <a14:useLocalDpi xmlns:a14="http://schemas.microsoft.com/office/drawing/2010/main" val="0"/>
+              </a:ext>
+            </a:extLst>
+          </a:blip>
+          <a:stretch>
+            <a:fillRect/>
+          </a:stretch>
+        </p:blipFill>
+        <p:spPr>
+          <a:xfrm>
+            <a:off x="0" y="0"/>
+            <a:ext cx="12192000" cy="6858000"/>
+          </a:xfrm>
+          <a:prstGeom prst="rect">
+            <a:avLst/>
+          </a:prstGeom>
+        </p:spPr>
+      </p:pic>
+      <p:pic>
+        <p:nvPicPr>
+          <p:cNvPr id="9" name="Content Placeholder 8" descr="A person wearing a costume&#10;&#10;Description automatically generated">
+            <a:extLst>
+              <a:ext uri="{FF2B5EF4-FFF2-40B4-BE49-F238E27FC236}">
+                <a16:creationId xmlns:a16="http://schemas.microsoft.com/office/drawing/2014/main" id="{1159A5BD-3C1A-407C-B9DD-10FB9EE5C99D}"/>
+              </a:ext>
+            </a:extLst>
+          </p:cNvPr>
+          <p:cNvPicPr>
+            <a:picLocks noGrp="1" noChangeAspect="1"/>
+          </p:cNvPicPr>
+          <p:nvPr>
+            <p:ph sz="half" idx="1"/>
+          </p:nvPr>
+        </p:nvPicPr>
+        <p:blipFill rotWithShape="1">
+          <a:blip r:embed="rId4"/>
+          <a:srcRect r="-1" b="20765"/>
+          <a:stretch/>
+        </p:blipFill>
+        <p:spPr>
+          <a:xfrm>
+            <a:off x="8860" y="10"/>
+            <a:ext cx="6924201" cy="6857990"/>
+          </a:xfrm>
+          <a:prstGeom prst="rect">
+            <a:avLst/>
+          </a:prstGeom>
+        </p:spPr>
+      </p:pic>
+      <p:sp>
+        <p:nvSpPr>
+          <p:cNvPr id="6" name="Title 1">
+            <a:extLst>
+              <a:ext uri="{FF2B5EF4-FFF2-40B4-BE49-F238E27FC236}">
+                <a16:creationId xmlns:a16="http://schemas.microsoft.com/office/drawing/2014/main" id="{32E17793-2CD9-4E5B-BE1F-E6CC5B2A4622}"/>
+              </a:ext>
+            </a:extLst>
+          </p:cNvPr>
+          <p:cNvSpPr txBox="1">
+            <a:spLocks/>
+          </p:cNvSpPr>
+          <p:nvPr/>
+        </p:nvSpPr>
+        <p:spPr>
+          <a:xfrm>
+            <a:off x="7014374" y="444500"/>
+            <a:ext cx="5168766" cy="3546475"/>
+          </a:xfrm>
+          <a:prstGeom prst="rect">
+            <a:avLst/>
+          </a:prstGeom>
+        </p:spPr>
+        <p:txBody>
+          <a:bodyPr vert="horz" lIns="91440" tIns="45720" rIns="91440" bIns="45720" rtlCol="0" anchor="b">
+            <a:normAutofit/>
+          </a:bodyPr>
+          <a:lstStyle>
+            <a:lvl1pPr algn="ctr" defTabSz="914400" rtl="0" eaLnBrk="1" latinLnBrk="0" hangingPunct="1">
+              <a:lnSpc>
+                <a:spcPct val="90000"/>
+              </a:lnSpc>
+              <a:spcBef>
+                <a:spcPct val="0"/>
+              </a:spcBef>
+              <a:buNone/>
+              <a:defRPr sz="3600" kern="1200" cap="all" baseline="0">
+                <a:solidFill>
+                  <a:schemeClr val="tx1"/>
+                </a:solidFill>
+                <a:effectLst/>
+                <a:latin typeface="+mj-lt"/>
+                <a:ea typeface="+mj-ea"/>
+                <a:cs typeface="+mj-cs"/>
+              </a:defRPr>
+            </a:lvl1pPr>
+          </a:lstStyle>
+          <a:p>
+            <a:pPr>
+              <a:spcAft>
+                <a:spcPts val="600"/>
+              </a:spcAft>
+            </a:pPr>
+            <a:r>
+              <a:rPr lang="en-US" sz="4800" b="1" dirty="0">
+                <a:solidFill>
+                  <a:schemeClr val="accent5">
+                    <a:lumMod val="75000"/>
+                  </a:schemeClr>
+                </a:solidFill>
+              </a:rPr>
+              <a:t>74</a:t>
+            </a:r>
+            <a:r>
+              <a:rPr lang="en-US" sz="4800" b="1" baseline="30000" dirty="0">
+                <a:solidFill>
+                  <a:schemeClr val="accent5">
+                    <a:lumMod val="75000"/>
+                  </a:schemeClr>
+                </a:solidFill>
+              </a:rPr>
+              <a:t>th</a:t>
+            </a:r>
+            <a:r>
+              <a:rPr lang="en-US" sz="4800" b="1" dirty="0">
+                <a:solidFill>
+                  <a:schemeClr val="accent5">
+                    <a:lumMod val="75000"/>
+                  </a:schemeClr>
+                </a:solidFill>
+              </a:rPr>
+              <a:t> Birthday</a:t>
+            </a:r>
+            <a:br>
+              <a:rPr lang="en-US" sz="4800" b="1" dirty="0">
+                <a:solidFill>
+                  <a:schemeClr val="accent5">
+                    <a:lumMod val="75000"/>
+                  </a:schemeClr>
+                </a:solidFill>
+              </a:rPr>
+            </a:br>
+            <a:br>
+              <a:rPr lang="en-US" sz="4800" b="1" dirty="0"/>
+            </a:br>
+            <a:r>
+              <a:rPr lang="en-SG" b="1" dirty="0"/>
+              <a:t>H.H. Moran </a:t>
+            </a:r>
+            <a:r>
+              <a:rPr lang="en-SG" b="1" dirty="0" err="1"/>
+              <a:t>Mor</a:t>
+            </a:r>
+            <a:r>
+              <a:rPr lang="en-SG" b="1" dirty="0"/>
+              <a:t> Baselios </a:t>
+            </a:r>
+            <a:r>
+              <a:rPr lang="en-SG" b="1" dirty="0" err="1"/>
+              <a:t>Marthoma</a:t>
+            </a:r>
+            <a:r>
+              <a:rPr lang="en-SG" b="1" dirty="0"/>
+              <a:t> Paulose II</a:t>
+            </a:r>
+            <a:endParaRPr lang="en-US" sz="4800" b="1" dirty="0"/>
+          </a:p>
+        </p:txBody>
+      </p:sp>
+    </p:spTree>
+    <p:extLst>
+      <p:ext uri="{BB962C8B-B14F-4D97-AF65-F5344CB8AC3E}">
+        <p14:creationId xmlns:p14="http://schemas.microsoft.com/office/powerpoint/2010/main" val="179302800"/>
+      </p:ext>
+    </p:extLst>
+  </p:cSld>
+  <p:clrMapOvr>
+    <a:masterClrMapping/>
+  </p:clrMapOvr>
+</p:sld>
+</file>
+
+<file path=ppt/slides/slide3.xml><?xml version="1.0" encoding="utf-8"?>
+<p:sld xmlns:a="http://schemas.openxmlformats.org/drawingml/2006/main" xmlns:r="http://schemas.openxmlformats.org/officeDocument/2006/relationships" xmlns:p="http://schemas.openxmlformats.org/presentationml/2006/main">
+  <p:cSld>
     <p:spTree>
       <p:nvGrpSpPr>
         <p:cNvPr id="1" name=""/>

</xml_diff>

<commit_message>
Updates for Sunday Service
Also removed unused theme
</commit_message>
<xml_diff>
--- a/stosc_services/PPT/Birthday & Anniversaries.pptx
+++ b/stosc_services/PPT/Birthday & Anniversaries.pptx
@@ -7,7 +7,6 @@
   <p:sldIdLst>
     <p:sldId id="257" r:id="rId2"/>
     <p:sldId id="258" r:id="rId3"/>
-    <p:sldId id="260" r:id="rId4"/>
   </p:sldIdLst>
   <p:sldSz cx="12192000" cy="6858000"/>
   <p:notesSz cx="6858000" cy="9144000"/>
@@ -285,7 +284,7 @@
           <a:p>
             <a:fld id="{48A87A34-81AB-432B-8DAE-1953F412C126}" type="datetimeFigureOut">
               <a:rPr lang="en-US" smtClean="0"/>
-              <a:t>9/12/2020</a:t>
+              <a:t>9/19/2020</a:t>
             </a:fld>
             <a:endParaRPr lang="en-US" dirty="0"/>
           </a:p>
@@ -598,7 +597,7 @@
             <a:fld id="{48A87A34-81AB-432B-8DAE-1953F412C126}" type="datetimeFigureOut">
               <a:rPr lang="en-US" smtClean="0"/>
               <a:pPr/>
-              <a:t>9/12/2020</a:t>
+              <a:t>9/19/2020</a:t>
             </a:fld>
             <a:endParaRPr lang="en-US" dirty="0"/>
           </a:p>
@@ -822,7 +821,7 @@
             <a:fld id="{48A87A34-81AB-432B-8DAE-1953F412C126}" type="datetimeFigureOut">
               <a:rPr lang="en-US" smtClean="0"/>
               <a:pPr/>
-              <a:t>9/12/2020</a:t>
+              <a:t>9/19/2020</a:t>
             </a:fld>
             <a:endParaRPr lang="en-US" dirty="0"/>
           </a:p>
@@ -1115,7 +1114,7 @@
             <a:fld id="{48A87A34-81AB-432B-8DAE-1953F412C126}" type="datetimeFigureOut">
               <a:rPr lang="en-US" smtClean="0"/>
               <a:pPr/>
-              <a:t>9/12/2020</a:t>
+              <a:t>9/19/2020</a:t>
             </a:fld>
             <a:endParaRPr lang="en-US" dirty="0"/>
           </a:p>
@@ -1571,7 +1570,7 @@
             <a:fld id="{48A87A34-81AB-432B-8DAE-1953F412C126}" type="datetimeFigureOut">
               <a:rPr lang="en-US" smtClean="0"/>
               <a:pPr/>
-              <a:t>9/12/2020</a:t>
+              <a:t>9/19/2020</a:t>
             </a:fld>
             <a:endParaRPr lang="en-US" dirty="0"/>
           </a:p>
@@ -2149,7 +2148,7 @@
             <a:fld id="{48A87A34-81AB-432B-8DAE-1953F412C126}" type="datetimeFigureOut">
               <a:rPr lang="en-US" smtClean="0"/>
               <a:pPr/>
-              <a:t>9/12/2020</a:t>
+              <a:t>9/19/2020</a:t>
             </a:fld>
             <a:endParaRPr lang="en-US" dirty="0"/>
           </a:p>
@@ -3003,7 +3002,7 @@
             <a:fld id="{48A87A34-81AB-432B-8DAE-1953F412C126}" type="datetimeFigureOut">
               <a:rPr lang="en-US" smtClean="0"/>
               <a:pPr/>
-              <a:t>9/12/2020</a:t>
+              <a:t>9/19/2020</a:t>
             </a:fld>
             <a:endParaRPr lang="en-US" dirty="0"/>
           </a:p>
@@ -3210,7 +3209,7 @@
             <a:fld id="{48A87A34-81AB-432B-8DAE-1953F412C126}" type="datetimeFigureOut">
               <a:rPr lang="en-US" smtClean="0"/>
               <a:pPr/>
-              <a:t>9/12/2020</a:t>
+              <a:t>9/19/2020</a:t>
             </a:fld>
             <a:endParaRPr lang="en-US" dirty="0"/>
           </a:p>
@@ -3426,7 +3425,7 @@
             <a:fld id="{48A87A34-81AB-432B-8DAE-1953F412C126}" type="datetimeFigureOut">
               <a:rPr lang="en-US" smtClean="0"/>
               <a:pPr/>
-              <a:t>9/12/2020</a:t>
+              <a:t>9/19/2020</a:t>
             </a:fld>
             <a:endParaRPr lang="en-US" dirty="0"/>
           </a:p>
@@ -3664,7 +3663,7 @@
           <a:p>
             <a:fld id="{48A87A34-81AB-432B-8DAE-1953F412C126}" type="datetimeFigureOut">
               <a:rPr lang="en-US" smtClean="0"/>
-              <a:t>9/12/2020</a:t>
+              <a:t>9/19/2020</a:t>
             </a:fld>
             <a:endParaRPr lang="en-US" dirty="0"/>
           </a:p>
@@ -3834,7 +3833,7 @@
           <a:p>
             <a:fld id="{48A87A34-81AB-432B-8DAE-1953F412C126}" type="datetimeFigureOut">
               <a:rPr lang="en-US" smtClean="0"/>
-              <a:t>9/12/2020</a:t>
+              <a:t>9/19/2020</a:t>
             </a:fld>
             <a:endParaRPr lang="en-US" dirty="0"/>
           </a:p>
@@ -4040,7 +4039,7 @@
             <a:fld id="{48A87A34-81AB-432B-8DAE-1953F412C126}" type="datetimeFigureOut">
               <a:rPr lang="en-US" smtClean="0"/>
               <a:pPr/>
-              <a:t>9/12/2020</a:t>
+              <a:t>9/19/2020</a:t>
             </a:fld>
             <a:endParaRPr lang="en-US" dirty="0"/>
           </a:p>
@@ -4321,7 +4320,7 @@
           <a:p>
             <a:fld id="{48A87A34-81AB-432B-8DAE-1953F412C126}" type="datetimeFigureOut">
               <a:rPr lang="en-US" smtClean="0"/>
-              <a:t>9/12/2020</a:t>
+              <a:t>9/19/2020</a:t>
             </a:fld>
             <a:endParaRPr lang="en-US" dirty="0"/>
           </a:p>
@@ -4589,7 +4588,7 @@
             <a:fld id="{48A87A34-81AB-432B-8DAE-1953F412C126}" type="datetimeFigureOut">
               <a:rPr lang="en-US" smtClean="0"/>
               <a:pPr/>
-              <a:t>9/12/2020</a:t>
+              <a:t>9/19/2020</a:t>
             </a:fld>
             <a:endParaRPr lang="en-US" dirty="0"/>
           </a:p>
@@ -5006,7 +5005,7 @@
             <a:fld id="{48A87A34-81AB-432B-8DAE-1953F412C126}" type="datetimeFigureOut">
               <a:rPr lang="en-US" smtClean="0"/>
               <a:pPr/>
-              <a:t>9/12/2020</a:t>
+              <a:t>9/19/2020</a:t>
             </a:fld>
             <a:endParaRPr lang="en-US" dirty="0"/>
           </a:p>
@@ -5155,7 +5154,7 @@
           <a:p>
             <a:fld id="{48A87A34-81AB-432B-8DAE-1953F412C126}" type="datetimeFigureOut">
               <a:rPr lang="en-US" smtClean="0"/>
-              <a:t>9/12/2020</a:t>
+              <a:t>9/19/2020</a:t>
             </a:fld>
             <a:endParaRPr lang="en-US" dirty="0"/>
           </a:p>
@@ -5280,7 +5279,7 @@
           <a:p>
             <a:fld id="{48A87A34-81AB-432B-8DAE-1953F412C126}" type="datetimeFigureOut">
               <a:rPr lang="en-US" smtClean="0"/>
-              <a:t>9/12/2020</a:t>
+              <a:t>9/19/2020</a:t>
             </a:fld>
             <a:endParaRPr lang="en-US" dirty="0"/>
           </a:p>
@@ -5560,7 +5559,7 @@
             <a:fld id="{48A87A34-81AB-432B-8DAE-1953F412C126}" type="datetimeFigureOut">
               <a:rPr lang="en-US" smtClean="0"/>
               <a:pPr/>
-              <a:t>9/12/2020</a:t>
+              <a:t>9/19/2020</a:t>
             </a:fld>
             <a:endParaRPr lang="en-US" dirty="0"/>
           </a:p>
@@ -5873,7 +5872,7 @@
           <a:p>
             <a:fld id="{48A87A34-81AB-432B-8DAE-1953F412C126}" type="datetimeFigureOut">
               <a:rPr lang="en-US" smtClean="0"/>
-              <a:t>9/12/2020</a:t>
+              <a:t>9/19/2020</a:t>
             </a:fld>
             <a:endParaRPr lang="en-US" dirty="0"/>
           </a:p>
@@ -6127,7 +6126,7 @@
             <a:fld id="{48A87A34-81AB-432B-8DAE-1953F412C126}" type="datetimeFigureOut">
               <a:rPr lang="en-US" smtClean="0"/>
               <a:pPr/>
-              <a:t>9/12/2020</a:t>
+              <a:t>9/19/2020</a:t>
             </a:fld>
             <a:endParaRPr lang="en-US" dirty="0"/>
           </a:p>
@@ -6592,8 +6591,8 @@
         </p:nvSpPr>
         <p:spPr>
           <a:xfrm>
-            <a:off x="1009181" y="2010878"/>
-            <a:ext cx="4791544" cy="4056547"/>
+            <a:off x="1009180" y="2010878"/>
+            <a:ext cx="5009879" cy="4056547"/>
           </a:xfrm>
         </p:spPr>
         <p:txBody>
@@ -6612,8 +6611,8 @@
               <a:buNone/>
             </a:pPr>
             <a:r>
-              <a:rPr lang="en-US" sz="2800" dirty="0"/>
-              <a:t>Beatriz Sara Biju</a:t>
+              <a:rPr lang="en-US" dirty="0"/>
+              <a:t>Rosalyn Roby</a:t>
             </a:r>
           </a:p>
           <a:p>
@@ -6627,8 +6626,8 @@
               <a:buNone/>
             </a:pPr>
             <a:r>
-              <a:rPr lang="en-US" sz="2800" dirty="0"/>
-              <a:t>Mr. Sushil George</a:t>
+              <a:rPr lang="en-US" dirty="0"/>
+              <a:t>Mr. Sunny K Paul</a:t>
             </a:r>
           </a:p>
           <a:p>
@@ -6642,14 +6641,9 @@
               <a:buNone/>
             </a:pPr>
             <a:r>
-              <a:rPr lang="en-US" sz="2800" dirty="0"/>
-              <a:t>Mrs. Tina </a:t>
-            </a:r>
-            <a:r>
-              <a:rPr lang="en-US" sz="2800" dirty="0" err="1"/>
-              <a:t>Boby</a:t>
-            </a:r>
-            <a:endParaRPr lang="en-US" sz="2800" dirty="0"/>
+              <a:rPr lang="en-US" dirty="0"/>
+              <a:t>Kane Kurian Jacob</a:t>
+            </a:r>
           </a:p>
           <a:p>
             <a:pPr marL="0" indent="0">
@@ -6662,14 +6656,9 @@
               <a:buNone/>
             </a:pPr>
             <a:r>
-              <a:rPr lang="en-US" sz="2800" dirty="0"/>
-              <a:t>Mrs. Leela Mary </a:t>
-            </a:r>
-            <a:r>
-              <a:rPr lang="en-US" sz="2800" dirty="0" err="1"/>
-              <a:t>Eapen</a:t>
-            </a:r>
-            <a:endParaRPr lang="en-US" sz="2800" dirty="0"/>
+              <a:rPr lang="en-US" dirty="0"/>
+              <a:t>Mr. Varghese Paulose</a:t>
+            </a:r>
           </a:p>
           <a:p>
             <a:pPr marL="0" indent="0">
@@ -6682,12 +6671,8 @@
               <a:buNone/>
             </a:pPr>
             <a:r>
-              <a:rPr lang="en-US" sz="2800" dirty="0" err="1"/>
-              <a:t>Sandrea</a:t>
-            </a:r>
-            <a:r>
-              <a:rPr lang="en-US" sz="2800" dirty="0"/>
-              <a:t> Ann Alby</a:t>
+              <a:rPr lang="en-US" dirty="0"/>
+              <a:t>Mrs. Susan Marissa Babu</a:t>
             </a:r>
           </a:p>
           <a:p>
@@ -6701,8 +6686,20 @@
               <a:buNone/>
             </a:pPr>
             <a:r>
-              <a:rPr lang="en-US" sz="2800" dirty="0"/>
-              <a:t>Ethan Mathew Zachariah</a:t>
+              <a:rPr lang="en-US" dirty="0" err="1"/>
+              <a:t>Jeffin</a:t>
+            </a:r>
+            <a:r>
+              <a:rPr lang="en-US" dirty="0"/>
+              <a:t> </a:t>
+            </a:r>
+            <a:r>
+              <a:rPr lang="en-US" dirty="0" err="1"/>
+              <a:t>Panackamittathu</a:t>
+            </a:r>
+            <a:r>
+              <a:rPr lang="en-US" dirty="0"/>
+              <a:t> Alex</a:t>
             </a:r>
           </a:p>
           <a:p>
@@ -6716,25 +6713,14 @@
               <a:buNone/>
             </a:pPr>
             <a:r>
-              <a:rPr lang="en-US" sz="2800" dirty="0"/>
-              <a:t>Mr. </a:t>
-            </a:r>
-            <a:r>
-              <a:rPr lang="en-US" sz="2800" dirty="0" err="1"/>
-              <a:t>Jelin</a:t>
-            </a:r>
-            <a:r>
-              <a:rPr lang="en-US" sz="2800" dirty="0"/>
-              <a:t> </a:t>
-            </a:r>
-            <a:r>
-              <a:rPr lang="en-US" sz="2800" dirty="0" err="1"/>
-              <a:t>Jokutty</a:t>
-            </a:r>
-            <a:r>
-              <a:rPr lang="en-US" sz="2800" dirty="0"/>
-              <a:t> Mathew</a:t>
-            </a:r>
+              <a:rPr lang="en-US" dirty="0"/>
+              <a:t>Shadrach Shakespeare </a:t>
+            </a:r>
+            <a:r>
+              <a:rPr lang="en-US" dirty="0" err="1"/>
+              <a:t>Vairamon</a:t>
+            </a:r>
+            <a:endParaRPr lang="en-US" dirty="0"/>
           </a:p>
           <a:p>
             <a:pPr marL="0" indent="0">
@@ -6747,33 +6733,15 @@
               <a:buNone/>
             </a:pPr>
             <a:r>
-              <a:rPr lang="en-US" sz="2800" dirty="0"/>
-              <a:t>Richa Rachel John</a:t>
-            </a:r>
-          </a:p>
-        </p:txBody>
-      </p:sp>
-      <p:sp>
-        <p:nvSpPr>
-          <p:cNvPr id="4" name="Content Placeholder 3"/>
-          <p:cNvSpPr>
-            <a:spLocks noGrp="1"/>
-          </p:cNvSpPr>
-          <p:nvPr>
-            <p:ph sz="half" idx="2"/>
-          </p:nvPr>
-        </p:nvSpPr>
-        <p:spPr>
-          <a:xfrm>
-            <a:off x="5800725" y="2019056"/>
-            <a:ext cx="6198359" cy="3441520"/>
-          </a:xfrm>
-        </p:spPr>
-        <p:txBody>
-          <a:bodyPr>
-            <a:noAutofit/>
-          </a:bodyPr>
-          <a:lstStyle/>
+              <a:rPr lang="en-US" dirty="0"/>
+              <a:t>Suresh </a:t>
+            </a:r>
+            <a:r>
+              <a:rPr lang="en-US" dirty="0" err="1"/>
+              <a:t>Eapen</a:t>
+            </a:r>
+            <a:endParaRPr lang="en-US" dirty="0"/>
+          </a:p>
           <a:p>
             <a:pPr marL="0" indent="0">
               <a:lnSpc>
@@ -6785,8 +6753,16 @@
               <a:buNone/>
             </a:pPr>
             <a:r>
-              <a:rPr lang="en-US" sz="2800" dirty="0"/>
-              <a:t>Mr. Abraham Joseph M</a:t>
+              <a:rPr lang="en-US" dirty="0"/>
+              <a:t>Susan </a:t>
+            </a:r>
+            <a:r>
+              <a:rPr lang="en-US" dirty="0" err="1"/>
+              <a:t>Merisa</a:t>
+            </a:r>
+            <a:r>
+              <a:rPr lang="en-US" dirty="0"/>
+              <a:t> Mathew</a:t>
             </a:r>
           </a:p>
           <a:p>
@@ -6800,22 +6776,33 @@
               <a:buNone/>
             </a:pPr>
             <a:r>
-              <a:rPr lang="en-US" sz="2800" dirty="0" err="1"/>
-              <a:t>Mrs</a:t>
-            </a:r>
-            <a:r>
-              <a:rPr lang="en-US" sz="2800" dirty="0"/>
-              <a:t> Sarah </a:t>
-            </a:r>
-            <a:r>
-              <a:rPr lang="en-US" sz="2800" dirty="0" err="1"/>
-              <a:t>Thara</a:t>
-            </a:r>
-            <a:r>
-              <a:rPr lang="en-US" sz="2800" dirty="0"/>
-              <a:t> Roby</a:t>
-            </a:r>
-          </a:p>
+              <a:rPr lang="en-US" dirty="0"/>
+              <a:t>Mr. Varghese A I</a:t>
+            </a:r>
+          </a:p>
+        </p:txBody>
+      </p:sp>
+      <p:sp>
+        <p:nvSpPr>
+          <p:cNvPr id="4" name="Content Placeholder 3"/>
+          <p:cNvSpPr>
+            <a:spLocks noGrp="1"/>
+          </p:cNvSpPr>
+          <p:nvPr>
+            <p:ph sz="half" idx="2"/>
+          </p:nvPr>
+        </p:nvSpPr>
+        <p:spPr>
+          <a:xfrm>
+            <a:off x="6337055" y="2010878"/>
+            <a:ext cx="5541268" cy="4056547"/>
+          </a:xfrm>
+        </p:spPr>
+        <p:txBody>
+          <a:bodyPr>
+            <a:noAutofit/>
+          </a:bodyPr>
+          <a:lstStyle/>
           <a:p>
             <a:pPr marL="0" indent="0">
               <a:lnSpc>
@@ -6827,12 +6814,8 @@
               <a:buNone/>
             </a:pPr>
             <a:r>
-              <a:rPr lang="en-US" sz="2800" dirty="0" err="1"/>
-              <a:t>Mrs</a:t>
-            </a:r>
-            <a:r>
-              <a:rPr lang="en-US" sz="2800" dirty="0"/>
-              <a:t> Sonia Samantha Kaman</a:t>
+              <a:rPr lang="en-US" dirty="0"/>
+              <a:t>Joseph Abraham</a:t>
             </a:r>
           </a:p>
           <a:p>
@@ -6846,22 +6829,13 @@
               <a:buNone/>
             </a:pPr>
             <a:r>
-              <a:rPr lang="en-US" sz="2800" dirty="0"/>
-              <a:t>Mrs. </a:t>
-            </a:r>
-            <a:r>
-              <a:rPr lang="en-US" sz="2800" dirty="0" err="1"/>
-              <a:t>Neena</a:t>
-            </a:r>
-            <a:r>
-              <a:rPr lang="en-US" sz="2800" dirty="0"/>
-              <a:t> Varghese </a:t>
-            </a:r>
-            <a:r>
-              <a:rPr lang="en-US" sz="2800" dirty="0" err="1"/>
-              <a:t>Keepanassery</a:t>
-            </a:r>
-            <a:endParaRPr lang="en-US" sz="2800" dirty="0"/>
+              <a:rPr lang="en-US" dirty="0" err="1"/>
+              <a:t>Anina</a:t>
+            </a:r>
+            <a:r>
+              <a:rPr lang="en-US" dirty="0"/>
+              <a:t> Anna Anish</a:t>
+            </a:r>
           </a:p>
           <a:p>
             <a:pPr marL="0" indent="0">
@@ -6874,16 +6848,8 @@
               <a:buNone/>
             </a:pPr>
             <a:r>
-              <a:rPr lang="en-US" sz="2800" dirty="0"/>
-              <a:t>Mrs. Simi </a:t>
-            </a:r>
-            <a:r>
-              <a:rPr lang="en-US" sz="2800" dirty="0" err="1"/>
-              <a:t>Benoy</a:t>
-            </a:r>
-            <a:r>
-              <a:rPr lang="en-US" sz="2800" dirty="0"/>
-              <a:t> Philip</a:t>
+              <a:rPr lang="en-US" dirty="0"/>
+              <a:t>Mrs. Bindu Alexander</a:t>
             </a:r>
           </a:p>
           <a:p>
@@ -6897,8 +6863,8 @@
               <a:buNone/>
             </a:pPr>
             <a:r>
-              <a:rPr lang="en-US" sz="2800" dirty="0"/>
-              <a:t>Mrs. Annamma Mathew</a:t>
+              <a:rPr lang="en-US" dirty="0"/>
+              <a:t>Aiden Mathew Varghese</a:t>
             </a:r>
           </a:p>
           <a:p>
@@ -6912,8 +6878,12 @@
               <a:buNone/>
             </a:pPr>
             <a:r>
-              <a:rPr lang="en-US" sz="2800" dirty="0"/>
-              <a:t>Mr. Mathew E Joseph</a:t>
+              <a:rPr lang="en-US" dirty="0" err="1"/>
+              <a:t>Jisa</a:t>
+            </a:r>
+            <a:r>
+              <a:rPr lang="en-US" dirty="0"/>
+              <a:t> Mariam Zachariah</a:t>
             </a:r>
           </a:p>
           <a:p>
@@ -6927,18 +6897,58 @@
               <a:buNone/>
             </a:pPr>
             <a:r>
-              <a:rPr lang="en-US" sz="2800" dirty="0" err="1"/>
-              <a:t>Salford</a:t>
-            </a:r>
-            <a:r>
-              <a:rPr lang="en-US" sz="2800" dirty="0"/>
-              <a:t> </a:t>
-            </a:r>
-            <a:r>
-              <a:rPr lang="en-US" sz="2800" dirty="0" err="1"/>
-              <a:t>Fernandis</a:t>
-            </a:r>
-            <a:endParaRPr lang="en-US" sz="2800" dirty="0"/>
+              <a:rPr lang="en-US" dirty="0" err="1"/>
+              <a:t>Jancy</a:t>
+            </a:r>
+            <a:r>
+              <a:rPr lang="en-US" dirty="0"/>
+              <a:t> Mathews</a:t>
+            </a:r>
+          </a:p>
+          <a:p>
+            <a:pPr marL="0" indent="0">
+              <a:lnSpc>
+                <a:spcPct val="110000"/>
+              </a:lnSpc>
+              <a:spcBef>
+                <a:spcPts val="600"/>
+              </a:spcBef>
+              <a:buNone/>
+            </a:pPr>
+            <a:r>
+              <a:rPr lang="en-US" dirty="0"/>
+              <a:t>Mr. Eldo T M</a:t>
+            </a:r>
+          </a:p>
+          <a:p>
+            <a:pPr marL="0" indent="0">
+              <a:lnSpc>
+                <a:spcPct val="110000"/>
+              </a:lnSpc>
+              <a:spcBef>
+                <a:spcPts val="600"/>
+              </a:spcBef>
+              <a:buNone/>
+            </a:pPr>
+            <a:r>
+              <a:rPr lang="en-US" dirty="0"/>
+              <a:t>Mrs. Neethu Thomas</a:t>
+            </a:r>
+          </a:p>
+          <a:p>
+            <a:pPr marL="0" indent="0">
+              <a:lnSpc>
+                <a:spcPct val="110000"/>
+              </a:lnSpc>
+              <a:spcBef>
+                <a:spcPts val="600"/>
+              </a:spcBef>
+              <a:buNone/>
+            </a:pPr>
+            <a:r>
+              <a:rPr lang="en-US" dirty="0"/>
+              <a:t>Mr. Dinesh John Charles</a:t>
+            </a:r>
           </a:p>
         </p:txBody>
       </p:sp>
@@ -7024,7 +7034,7 @@
               <a:rPr lang="en-US" sz="1800" b="1" dirty="0">
                 <a:latin typeface="+mn-lt"/>
               </a:rPr>
-              <a:t>(SEP 7</a:t>
+              <a:t>(SEP 14</a:t>
             </a:r>
             <a:r>
               <a:rPr lang="en-US" sz="1800" b="1" baseline="30000" dirty="0">
@@ -7036,7 +7046,7 @@
               <a:rPr lang="en-US" sz="1800" b="1" dirty="0">
                 <a:latin typeface="+mn-lt"/>
               </a:rPr>
-              <a:t>– 13</a:t>
+              <a:t>– 20</a:t>
             </a:r>
             <a:r>
               <a:rPr lang="en-US" sz="1800" b="1" baseline="30000" dirty="0">
@@ -7123,15 +7133,7 @@
             </a:pPr>
             <a:r>
               <a:rPr lang="en-US" sz="2800" dirty="0"/>
-              <a:t>Fr. Thomas </a:t>
-            </a:r>
-            <a:r>
-              <a:rPr lang="en-US" sz="2800" dirty="0" err="1"/>
-              <a:t>Issac</a:t>
-            </a:r>
-            <a:r>
-              <a:rPr lang="en-US" sz="2800" dirty="0"/>
-              <a:t> AND Mrs. Shanti Sara Thomas</a:t>
+              <a:t>Mr. Bino Abraham AND Dr. Jaya Philip</a:t>
             </a:r>
           </a:p>
           <a:p>
@@ -7146,7 +7148,31 @@
             </a:pPr>
             <a:r>
               <a:rPr lang="en-US" sz="2800" dirty="0"/>
-              <a:t>Mrs. Bini Rachel Mathew AND Mr. Francis Xavier</a:t>
+              <a:t>Mr. </a:t>
+            </a:r>
+            <a:r>
+              <a:rPr lang="en-US" sz="2800" dirty="0" err="1"/>
+              <a:t>Thanuj</a:t>
+            </a:r>
+            <a:r>
+              <a:rPr lang="en-US" sz="2800" dirty="0"/>
+              <a:t> </a:t>
+            </a:r>
+            <a:r>
+              <a:rPr lang="en-US" sz="2800" dirty="0" err="1"/>
+              <a:t>Panackamittathu</a:t>
+            </a:r>
+            <a:r>
+              <a:rPr lang="en-US" sz="2800" dirty="0"/>
+              <a:t> Alex AND Mrs. </a:t>
+            </a:r>
+            <a:r>
+              <a:rPr lang="en-US" sz="2800" dirty="0" err="1"/>
+              <a:t>Reeba</a:t>
+            </a:r>
+            <a:r>
+              <a:rPr lang="en-US" sz="2800" dirty="0"/>
+              <a:t> Alex</a:t>
             </a:r>
           </a:p>
           <a:p>
@@ -7161,29 +7187,85 @@
             </a:pPr>
             <a:r>
               <a:rPr lang="en-US" sz="2800" dirty="0"/>
-              <a:t>Dr. Aaron </a:t>
+              <a:t>Mr. Albin Jose AND Mrs. Priyanka John</a:t>
+            </a:r>
+          </a:p>
+          <a:p>
+            <a:pPr marL="0" indent="0">
+              <a:lnSpc>
+                <a:spcPct val="110000"/>
+              </a:lnSpc>
+              <a:spcBef>
+                <a:spcPts val="600"/>
+              </a:spcBef>
+              <a:buNone/>
+            </a:pPr>
+            <a:r>
+              <a:rPr lang="en-US" sz="2800" dirty="0"/>
+              <a:t>Mr. </a:t>
             </a:r>
             <a:r>
               <a:rPr lang="en-US" sz="2800" dirty="0" err="1"/>
-              <a:t>Zefrin</a:t>
+              <a:t>Makesh</a:t>
             </a:r>
             <a:r>
               <a:rPr lang="en-US" sz="2800" dirty="0"/>
-              <a:t> </a:t>
+              <a:t> Mathew </a:t>
             </a:r>
             <a:r>
               <a:rPr lang="en-US" sz="2800" dirty="0" err="1"/>
-              <a:t>Fernandis</a:t>
+              <a:t>Mathew</a:t>
             </a:r>
             <a:r>
               <a:rPr lang="en-US" sz="2800" dirty="0"/>
-              <a:t> AND Mrs. Seema Stella </a:t>
+              <a:t> AND Mrs. </a:t>
             </a:r>
             <a:r>
               <a:rPr lang="en-US" sz="2800" dirty="0" err="1"/>
-              <a:t>Fernandis</a:t>
-            </a:r>
-            <a:endParaRPr lang="en-US" sz="2800" dirty="0"/>
+              <a:t>Jeena</a:t>
+            </a:r>
+            <a:r>
+              <a:rPr lang="en-US" sz="2800" dirty="0"/>
+              <a:t> Varghese</a:t>
+            </a:r>
+          </a:p>
+          <a:p>
+            <a:pPr marL="0" indent="0">
+              <a:lnSpc>
+                <a:spcPct val="110000"/>
+              </a:lnSpc>
+              <a:spcBef>
+                <a:spcPts val="600"/>
+              </a:spcBef>
+              <a:buNone/>
+            </a:pPr>
+            <a:r>
+              <a:rPr lang="en-US" sz="2800" dirty="0"/>
+              <a:t>Mr. Biju Baby AND Mrs. </a:t>
+            </a:r>
+            <a:r>
+              <a:rPr lang="en-US" sz="2800" dirty="0" err="1"/>
+              <a:t>Raimol</a:t>
+            </a:r>
+            <a:r>
+              <a:rPr lang="en-US" sz="2800" dirty="0"/>
+              <a:t> Mathew</a:t>
+            </a:r>
+          </a:p>
+          <a:p>
+            <a:pPr marL="0" indent="0">
+              <a:lnSpc>
+                <a:spcPct val="110000"/>
+              </a:lnSpc>
+              <a:spcBef>
+                <a:spcPts val="600"/>
+              </a:spcBef>
+              <a:buNone/>
+            </a:pPr>
+            <a:r>
+              <a:rPr lang="en-US" sz="2800" dirty="0"/>
+              <a:t>Mr. Thomas Zacharias AND Mrs. Sheela Thomas</a:t>
+            </a:r>
           </a:p>
         </p:txBody>
       </p:sp>
@@ -7297,7 +7379,7 @@
           <a:p>
             <a:r>
               <a:rPr lang="en-US" sz="1800" b="1" dirty="0"/>
-              <a:t>(SEP 7</a:t>
+              <a:t>(SEP 14</a:t>
             </a:r>
             <a:r>
               <a:rPr lang="en-US" sz="1800" b="1" baseline="30000" dirty="0"/>
@@ -7305,7 +7387,7 @@
             </a:r>
             <a:r>
               <a:rPr lang="en-US" sz="1800" b="1" dirty="0"/>
-              <a:t>– 13</a:t>
+              <a:t>– 20</a:t>
             </a:r>
             <a:r>
               <a:rPr lang="en-US" sz="1800" b="1" baseline="30000" dirty="0"/>
@@ -7322,208 +7404,6 @@
     <p:extLst>
       <p:ext uri="{BB962C8B-B14F-4D97-AF65-F5344CB8AC3E}">
         <p14:creationId xmlns:p14="http://schemas.microsoft.com/office/powerpoint/2010/main" val="1881118211"/>
-      </p:ext>
-    </p:extLst>
-  </p:cSld>
-  <p:clrMapOvr>
-    <a:masterClrMapping/>
-  </p:clrMapOvr>
-</p:sld>
-</file>
-
-<file path=ppt/slides/slide3.xml><?xml version="1.0" encoding="utf-8"?>
-<p:sld xmlns:a="http://schemas.openxmlformats.org/drawingml/2006/main" xmlns:r="http://schemas.openxmlformats.org/officeDocument/2006/relationships" xmlns:p="http://schemas.openxmlformats.org/presentationml/2006/main">
-  <p:cSld>
-    <p:spTree>
-      <p:nvGrpSpPr>
-        <p:cNvPr id="1" name=""/>
-        <p:cNvGrpSpPr/>
-        <p:nvPr/>
-      </p:nvGrpSpPr>
-      <p:grpSpPr>
-        <a:xfrm>
-          <a:off x="0" y="0"/>
-          <a:ext cx="0" cy="0"/>
-          <a:chOff x="0" y="0"/>
-          <a:chExt cx="0" cy="0"/>
-        </a:xfrm>
-      </p:grpSpPr>
-      <p:pic>
-        <p:nvPicPr>
-          <p:cNvPr id="9" name="Picture 8" descr="A close up of a flower&#10;&#10;Description automatically generated">
-            <a:extLst>
-              <a:ext uri="{FF2B5EF4-FFF2-40B4-BE49-F238E27FC236}">
-                <a16:creationId xmlns:a16="http://schemas.microsoft.com/office/drawing/2014/main" id="{C64352A9-4F48-4E22-8EA7-48BCFF692FC3}"/>
-              </a:ext>
-            </a:extLst>
-          </p:cNvPr>
-          <p:cNvPicPr>
-            <a:picLocks noChangeAspect="1"/>
-          </p:cNvPicPr>
-          <p:nvPr/>
-        </p:nvPicPr>
-        <p:blipFill>
-          <a:blip r:embed="rId2"/>
-          <a:stretch>
-            <a:fillRect/>
-          </a:stretch>
-        </p:blipFill>
-        <p:spPr>
-          <a:xfrm>
-            <a:off x="813481" y="1524495"/>
-            <a:ext cx="3840815" cy="3840815"/>
-          </a:xfrm>
-          <a:prstGeom prst="rect">
-            <a:avLst/>
-          </a:prstGeom>
-        </p:spPr>
-      </p:pic>
-      <p:sp>
-        <p:nvSpPr>
-          <p:cNvPr id="10" name="Content Placeholder 2">
-            <a:extLst>
-              <a:ext uri="{FF2B5EF4-FFF2-40B4-BE49-F238E27FC236}">
-                <a16:creationId xmlns:a16="http://schemas.microsoft.com/office/drawing/2014/main" id="{C0442AE5-99FF-4D45-A717-42F72F7BC74E}"/>
-              </a:ext>
-            </a:extLst>
-          </p:cNvPr>
-          <p:cNvSpPr>
-            <a:spLocks noGrp="1"/>
-          </p:cNvSpPr>
-          <p:nvPr>
-            <p:ph idx="1"/>
-          </p:nvPr>
-        </p:nvSpPr>
-        <p:spPr>
-          <a:xfrm>
-            <a:off x="5282520" y="2367092"/>
-            <a:ext cx="6472600" cy="3847444"/>
-          </a:xfrm>
-          <a:noFill/>
-        </p:spPr>
-        <p:txBody>
-          <a:bodyPr>
-            <a:normAutofit/>
-          </a:bodyPr>
-          <a:lstStyle/>
-          <a:p>
-            <a:pPr marL="0" indent="0">
-              <a:buNone/>
-            </a:pPr>
-            <a:r>
-              <a:rPr lang="en-US" b="1" dirty="0"/>
-              <a:t>Mr. </a:t>
-            </a:r>
-            <a:r>
-              <a:rPr lang="en-US" b="1" dirty="0" err="1"/>
-              <a:t>Oommen</a:t>
-            </a:r>
-            <a:r>
-              <a:rPr lang="en-US" b="1" dirty="0"/>
-              <a:t> </a:t>
-            </a:r>
-            <a:r>
-              <a:rPr lang="en-US" b="1" dirty="0" err="1"/>
-              <a:t>Thampan</a:t>
-            </a:r>
-            <a:r>
-              <a:rPr lang="en-US" b="1" dirty="0"/>
-              <a:t> </a:t>
-            </a:r>
-            <a:r>
-              <a:rPr lang="en-US" dirty="0"/>
-              <a:t>(77), father of </a:t>
-            </a:r>
-            <a:r>
-              <a:rPr lang="en-US" b="1" dirty="0"/>
-              <a:t>Pinky </a:t>
-            </a:r>
-            <a:r>
-              <a:rPr lang="en-US" b="1" dirty="0" err="1"/>
-              <a:t>Saji</a:t>
-            </a:r>
-            <a:r>
-              <a:rPr lang="en-US" b="1" dirty="0"/>
-              <a:t> (S029) </a:t>
-            </a:r>
-            <a:r>
-              <a:rPr lang="en-US" dirty="0"/>
-              <a:t>was called to heavenly abode on Sept 11</a:t>
-            </a:r>
-            <a:r>
-              <a:rPr lang="en-US" baseline="30000" dirty="0"/>
-              <a:t>th</a:t>
-            </a:r>
-            <a:r>
-              <a:rPr lang="en-US" dirty="0"/>
-              <a:t>, 2020. The Funeral was held in Kerala yesterday in </a:t>
-            </a:r>
-            <a:r>
-              <a:rPr lang="en-US" dirty="0" err="1"/>
-              <a:t>karthikapalli</a:t>
-            </a:r>
-            <a:r>
-              <a:rPr lang="en-US" dirty="0"/>
-              <a:t>, Kerala. </a:t>
-            </a:r>
-          </a:p>
-          <a:p>
-            <a:pPr marL="0" indent="0">
-              <a:buNone/>
-            </a:pPr>
-            <a:endParaRPr lang="en-US" dirty="0"/>
-          </a:p>
-          <a:p>
-            <a:pPr marL="0" indent="0">
-              <a:buNone/>
-            </a:pPr>
-            <a:r>
-              <a:rPr lang="en-US" dirty="0"/>
-              <a:t>The cathedral expresses its deepest condolences. May the departed soul rest in peace.</a:t>
-            </a:r>
-          </a:p>
-        </p:txBody>
-      </p:sp>
-      <p:sp>
-        <p:nvSpPr>
-          <p:cNvPr id="11" name="Title 1">
-            <a:extLst>
-              <a:ext uri="{FF2B5EF4-FFF2-40B4-BE49-F238E27FC236}">
-                <a16:creationId xmlns:a16="http://schemas.microsoft.com/office/drawing/2014/main" id="{3F1D8B64-2330-4C65-B36A-4993E36D19E0}"/>
-              </a:ext>
-            </a:extLst>
-          </p:cNvPr>
-          <p:cNvSpPr>
-            <a:spLocks noGrp="1"/>
-          </p:cNvSpPr>
-          <p:nvPr>
-            <p:ph type="title"/>
-          </p:nvPr>
-        </p:nvSpPr>
-        <p:spPr>
-          <a:xfrm>
-            <a:off x="5282520" y="618517"/>
-            <a:ext cx="5855416" cy="1596177"/>
-          </a:xfrm>
-        </p:spPr>
-        <p:txBody>
-          <a:bodyPr>
-            <a:normAutofit/>
-          </a:bodyPr>
-          <a:lstStyle/>
-          <a:p>
-            <a:r>
-              <a:rPr lang="en-US"/>
-              <a:t>OBITUARY</a:t>
-            </a:r>
-            <a:endParaRPr lang="en-US" dirty="0"/>
-          </a:p>
-        </p:txBody>
-      </p:sp>
-    </p:spTree>
-    <p:extLst>
-      <p:ext uri="{BB962C8B-B14F-4D97-AF65-F5344CB8AC3E}">
-        <p14:creationId xmlns:p14="http://schemas.microsoft.com/office/powerpoint/2010/main" val="2937066918"/>
       </p:ext>
     </p:extLst>
   </p:cSld>

</xml_diff>

<commit_message>
Birthday Slide to darker background
</commit_message>
<xml_diff>
--- a/stosc_services/PPT/Birthday & Anniversaries.pptx
+++ b/stosc_services/PPT/Birthday & Anniversaries.pptx
@@ -2,7 +2,7 @@
 <file path=ppt/presentation.xml><?xml version="1.0" encoding="utf-8"?>
 <p:presentation xmlns:a="http://schemas.openxmlformats.org/drawingml/2006/main" xmlns:r="http://schemas.openxmlformats.org/officeDocument/2006/relationships" xmlns:p="http://schemas.openxmlformats.org/presentationml/2006/main" autoCompressPictures="0">
   <p:sldMasterIdLst>
-    <p:sldMasterId id="2147483699" r:id="rId1"/>
+    <p:sldMasterId id="2147483719" r:id="rId1"/>
   </p:sldMasterIdLst>
   <p:sldIdLst>
     <p:sldId id="257" r:id="rId2"/>
@@ -130,50 +130,20 @@
           <a:chExt cx="0" cy="0"/>
         </a:xfrm>
       </p:grpSpPr>
-      <p:pic>
-        <p:nvPicPr>
-          <p:cNvPr id="7" name="Picture 6" descr="Droplets-HD-Title-R1d.png"/>
-          <p:cNvPicPr>
-            <a:picLocks noChangeAspect="1"/>
-          </p:cNvPicPr>
-          <p:nvPr/>
-        </p:nvPicPr>
-        <p:blipFill>
-          <a:blip r:embed="rId2">
-            <a:extLst>
-              <a:ext uri="{28A0092B-C50C-407E-A947-70E740481C1C}">
-                <a14:useLocalDpi xmlns:a14="http://schemas.microsoft.com/office/drawing/2010/main" val="0"/>
-              </a:ext>
-            </a:extLst>
-          </a:blip>
-          <a:stretch>
-            <a:fillRect/>
-          </a:stretch>
-        </p:blipFill>
+      <p:sp>
+        <p:nvSpPr>
+          <p:cNvPr id="2" name="Title 1"/>
+          <p:cNvSpPr>
+            <a:spLocks noGrp="1"/>
+          </p:cNvSpPr>
+          <p:nvPr>
+            <p:ph type="ctrTitle"/>
+          </p:nvPr>
+        </p:nvSpPr>
         <p:spPr>
           <a:xfrm>
-            <a:off x="0" y="0"/>
-            <a:ext cx="12192000" cy="6858000"/>
-          </a:xfrm>
-          <a:prstGeom prst="rect">
-            <a:avLst/>
-          </a:prstGeom>
-        </p:spPr>
-      </p:pic>
-      <p:sp>
-        <p:nvSpPr>
-          <p:cNvPr id="2" name="Title 1"/>
-          <p:cNvSpPr>
-            <a:spLocks noGrp="1"/>
-          </p:cNvSpPr>
-          <p:nvPr>
-            <p:ph type="ctrTitle"/>
-          </p:nvPr>
-        </p:nvSpPr>
-        <p:spPr>
-          <a:xfrm>
-            <a:off x="1751012" y="1300785"/>
-            <a:ext cx="8689976" cy="2509213"/>
+            <a:off x="1595269" y="1122363"/>
+            <a:ext cx="9001462" cy="2387600"/>
           </a:xfrm>
         </p:spPr>
         <p:txBody>
@@ -206,24 +176,16 @@
         </p:nvSpPr>
         <p:spPr>
           <a:xfrm>
-            <a:off x="1751012" y="3886200"/>
-            <a:ext cx="8689976" cy="1371599"/>
+            <a:off x="1595269" y="3602038"/>
+            <a:ext cx="9001462" cy="1655762"/>
           </a:xfrm>
         </p:spPr>
         <p:txBody>
-          <a:bodyPr>
-            <a:normAutofit/>
-          </a:bodyPr>
+          <a:bodyPr/>
           <a:lstStyle>
             <a:lvl1pPr marL="0" indent="0" algn="ctr">
               <a:buNone/>
-              <a:defRPr sz="2200">
-                <a:solidFill>
-                  <a:schemeClr val="bg1">
-                    <a:lumMod val="50000"/>
-                  </a:schemeClr>
-                </a:solidFill>
-              </a:defRPr>
+              <a:defRPr sz="2400"/>
             </a:lvl1pPr>
             <a:lvl2pPr marL="457200" indent="0" algn="ctr">
               <a:buNone/>
@@ -284,7 +246,7 @@
           <a:p>
             <a:fld id="{48A87A34-81AB-432B-8DAE-1953F412C126}" type="datetimeFigureOut">
               <a:rPr lang="en-US" smtClean="0"/>
-              <a:t>9/26/2020</a:t>
+              <a:t>9/27/2020</a:t>
             </a:fld>
             <a:endParaRPr lang="en-US" dirty="0"/>
           </a:p>
@@ -335,7 +297,7 @@
     </p:spTree>
     <p:extLst>
       <p:ext uri="{BB962C8B-B14F-4D97-AF65-F5344CB8AC3E}">
-        <p14:creationId xmlns:p14="http://schemas.microsoft.com/office/powerpoint/2010/main" val="400599148"/>
+        <p14:creationId xmlns:p14="http://schemas.microsoft.com/office/powerpoint/2010/main" val="600922496"/>
       </p:ext>
     </p:extLst>
   </p:cSld>
@@ -362,106 +324,79 @@
           <a:chExt cx="0" cy="0"/>
         </a:xfrm>
       </p:grpSpPr>
-      <p:pic>
-        <p:nvPicPr>
-          <p:cNvPr id="10" name="Picture 9" descr="Droplets-HD-Content-R1d.png"/>
-          <p:cNvPicPr>
-            <a:picLocks noChangeAspect="1"/>
-          </p:cNvPicPr>
-          <p:nvPr/>
-        </p:nvPicPr>
-        <p:blipFill>
-          <a:blip r:embed="rId2">
-            <a:extLst>
-              <a:ext uri="{28A0092B-C50C-407E-A947-70E740481C1C}">
-                <a14:useLocalDpi xmlns:a14="http://schemas.microsoft.com/office/drawing/2010/main" val="0"/>
-              </a:ext>
-            </a:extLst>
-          </a:blip>
-          <a:stretch>
-            <a:fillRect/>
-          </a:stretch>
-        </p:blipFill>
+      <p:sp>
+        <p:nvSpPr>
+          <p:cNvPr id="2" name="Title 1"/>
+          <p:cNvSpPr>
+            <a:spLocks noGrp="1"/>
+          </p:cNvSpPr>
+          <p:nvPr>
+            <p:ph type="title"/>
+          </p:nvPr>
+        </p:nvSpPr>
         <p:spPr>
           <a:xfrm>
-            <a:off x="0" y="0"/>
-            <a:ext cx="12192000" cy="6858000"/>
+            <a:off x="913806" y="4289372"/>
+            <a:ext cx="10367564" cy="819355"/>
           </a:xfrm>
-          <a:prstGeom prst="rect">
-            <a:avLst/>
-          </a:prstGeom>
         </p:spPr>
-      </p:pic>
-      <p:sp>
-        <p:nvSpPr>
-          <p:cNvPr id="2" name="Title 1"/>
-          <p:cNvSpPr>
-            <a:spLocks noGrp="1"/>
-          </p:cNvSpPr>
-          <p:nvPr>
-            <p:ph type="title"/>
+        <p:txBody>
+          <a:bodyPr anchor="b">
+            <a:normAutofit/>
+          </a:bodyPr>
+          <a:lstStyle>
+            <a:lvl1pPr>
+              <a:defRPr sz="2800"/>
+            </a:lvl1pPr>
+          </a:lstStyle>
+          <a:p>
+            <a:r>
+              <a:rPr lang="en-US"/>
+              <a:t>Click to edit Master title style</a:t>
+            </a:r>
+            <a:endParaRPr lang="en-US" dirty="0"/>
+          </a:p>
+        </p:txBody>
+      </p:sp>
+      <p:sp>
+        <p:nvSpPr>
+          <p:cNvPr id="3" name="Picture Placeholder 2"/>
+          <p:cNvSpPr>
+            <a:spLocks noGrp="1" noChangeAspect="1"/>
+          </p:cNvSpPr>
+          <p:nvPr>
+            <p:ph type="pic" idx="1"/>
           </p:nvPr>
         </p:nvSpPr>
         <p:spPr>
           <a:xfrm>
-            <a:off x="913794" y="4289374"/>
-            <a:ext cx="10364432" cy="811610"/>
+            <a:off x="913806" y="621321"/>
+            <a:ext cx="10367564" cy="3379735"/>
           </a:xfrm>
-        </p:spPr>
-        <p:txBody>
-          <a:bodyPr anchor="b"/>
-          <a:lstStyle>
-            <a:lvl1pPr>
-              <a:defRPr sz="3200"/>
-            </a:lvl1pPr>
-          </a:lstStyle>
-          <a:p>
-            <a:r>
-              <a:rPr lang="en-US"/>
-              <a:t>Click to edit Master title style</a:t>
-            </a:r>
-            <a:endParaRPr lang="en-US" dirty="0"/>
-          </a:p>
-        </p:txBody>
-      </p:sp>
-      <p:sp>
-        <p:nvSpPr>
-          <p:cNvPr id="3" name="Picture Placeholder 2"/>
-          <p:cNvSpPr>
-            <a:spLocks noGrp="1" noChangeAspect="1"/>
-          </p:cNvSpPr>
-          <p:nvPr>
-            <p:ph type="pic" idx="1"/>
-          </p:nvPr>
-        </p:nvSpPr>
-        <p:spPr>
-          <a:xfrm>
-            <a:off x="1184744" y="698261"/>
-            <a:ext cx="9822532" cy="3214136"/>
-          </a:xfrm>
-          <a:prstGeom prst="roundRect">
-            <a:avLst>
-              <a:gd name="adj" fmla="val 4944"/>
-            </a:avLst>
-          </a:prstGeom>
           <a:noFill/>
-          <a:ln w="82550" cap="sq">
+          <a:ln w="190500" cap="sq">
             <a:solidFill>
-              <a:srgbClr val="EAEAEA"/>
+              <a:srgbClr val="FFFFFF"/>
             </a:solidFill>
             <a:miter lim="800000"/>
           </a:ln>
-          <a:effectLst/>
+          <a:effectLst>
+            <a:outerShdw blurRad="55000" dist="18000" dir="5400000" algn="tl" rotWithShape="0">
+              <a:srgbClr val="000000">
+                <a:alpha val="40000"/>
+              </a:srgbClr>
+            </a:outerShdw>
+          </a:effectLst>
           <a:scene3d>
             <a:camera prst="orthographicFront"/>
-            <a:lightRig rig="threePt" dir="t">
-              <a:rot lat="0" lon="0" rev="2700000"/>
+            <a:lightRig rig="twoPt" dir="t">
+              <a:rot lat="0" lon="0" rev="7200000"/>
             </a:lightRig>
           </a:scene3d>
-          <a:sp3d contourW="6350">
-            <a:bevelT h="38100"/>
+          <a:sp3d>
+            <a:bevelT w="25400" h="19050"/>
             <a:contourClr>
-              <a:srgbClr val="C0C0C0"/>
+              <a:srgbClr val="FFFFFF"/>
             </a:contourClr>
           </a:sp3d>
         </p:spPr>
@@ -526,16 +461,18 @@
         </p:nvSpPr>
         <p:spPr>
           <a:xfrm>
-            <a:off x="913774" y="5108728"/>
-            <a:ext cx="10364452" cy="682472"/>
+            <a:off x="913795" y="5108728"/>
+            <a:ext cx="10365998" cy="682472"/>
           </a:xfrm>
         </p:spPr>
         <p:txBody>
-          <a:bodyPr/>
+          <a:bodyPr>
+            <a:normAutofit/>
+          </a:bodyPr>
           <a:lstStyle>
             <a:lvl1pPr marL="0" indent="0" algn="ctr">
               <a:buNone/>
-              <a:defRPr sz="1600"/>
+              <a:defRPr sz="1800"/>
             </a:lvl1pPr>
             <a:lvl2pPr marL="457200" indent="0">
               <a:buNone/>
@@ -597,7 +534,7 @@
             <a:fld id="{48A87A34-81AB-432B-8DAE-1953F412C126}" type="datetimeFigureOut">
               <a:rPr lang="en-US" smtClean="0"/>
               <a:pPr/>
-              <a:t>9/26/2020</a:t>
+              <a:t>9/27/2020</a:t>
             </a:fld>
             <a:endParaRPr lang="en-US" dirty="0"/>
           </a:p>
@@ -649,7 +586,7 @@
     </p:spTree>
     <p:extLst>
       <p:ext uri="{BB962C8B-B14F-4D97-AF65-F5344CB8AC3E}">
-        <p14:creationId xmlns:p14="http://schemas.microsoft.com/office/powerpoint/2010/main" val="128663418"/>
+        <p14:creationId xmlns:p14="http://schemas.microsoft.com/office/powerpoint/2010/main" val="2183609351"/>
       </p:ext>
     </p:extLst>
   </p:cSld>
@@ -676,56 +613,26 @@
           <a:chExt cx="0" cy="0"/>
         </a:xfrm>
       </p:grpSpPr>
-      <p:pic>
-        <p:nvPicPr>
-          <p:cNvPr id="8" name="Picture 7" descr="Droplets-HD-Content-R1d.png"/>
-          <p:cNvPicPr>
-            <a:picLocks noChangeAspect="1"/>
-          </p:cNvPicPr>
-          <p:nvPr/>
-        </p:nvPicPr>
-        <p:blipFill>
-          <a:blip r:embed="rId2">
-            <a:extLst>
-              <a:ext uri="{28A0092B-C50C-407E-A947-70E740481C1C}">
-                <a14:useLocalDpi xmlns:a14="http://schemas.microsoft.com/office/drawing/2010/main" val="0"/>
-              </a:ext>
-            </a:extLst>
-          </a:blip>
-          <a:stretch>
-            <a:fillRect/>
-          </a:stretch>
-        </p:blipFill>
+      <p:sp>
+        <p:nvSpPr>
+          <p:cNvPr id="2" name="Title 1"/>
+          <p:cNvSpPr>
+            <a:spLocks noGrp="1"/>
+          </p:cNvSpPr>
+          <p:nvPr>
+            <p:ph type="title"/>
+          </p:nvPr>
+        </p:nvSpPr>
         <p:spPr>
           <a:xfrm>
-            <a:off x="0" y="0"/>
-            <a:ext cx="12192000" cy="6858000"/>
-          </a:xfrm>
-          <a:prstGeom prst="rect">
-            <a:avLst/>
-          </a:prstGeom>
-        </p:spPr>
-      </p:pic>
-      <p:sp>
-        <p:nvSpPr>
-          <p:cNvPr id="2" name="Title 1"/>
-          <p:cNvSpPr>
-            <a:spLocks noGrp="1"/>
-          </p:cNvSpPr>
-          <p:nvPr>
-            <p:ph type="title"/>
-          </p:nvPr>
-        </p:nvSpPr>
-        <p:spPr>
-          <a:xfrm>
-            <a:off x="913774" y="609599"/>
-            <a:ext cx="10364452" cy="3427245"/>
+            <a:off x="913795" y="609600"/>
+            <a:ext cx="10353762" cy="3424859"/>
           </a:xfrm>
         </p:spPr>
         <p:txBody>
           <a:bodyPr anchor="ctr"/>
           <a:lstStyle>
-            <a:lvl1pPr algn="ctr">
+            <a:lvl1pPr>
               <a:defRPr sz="3200"/>
             </a:lvl1pPr>
           </a:lstStyle>
@@ -750,8 +657,8 @@
         </p:nvSpPr>
         <p:spPr>
           <a:xfrm>
-            <a:off x="913775" y="4204821"/>
-            <a:ext cx="10364452" cy="1586380"/>
+            <a:off x="913795" y="4204820"/>
+            <a:ext cx="10353761" cy="1592186"/>
           </a:xfrm>
         </p:spPr>
         <p:txBody>
@@ -821,7 +728,7 @@
             <a:fld id="{48A87A34-81AB-432B-8DAE-1953F412C126}" type="datetimeFigureOut">
               <a:rPr lang="en-US" smtClean="0"/>
               <a:pPr/>
-              <a:t>9/26/2020</a:t>
+              <a:t>9/27/2020</a:t>
             </a:fld>
             <a:endParaRPr lang="en-US" dirty="0"/>
           </a:p>
@@ -873,7 +780,7 @@
     </p:spTree>
     <p:extLst>
       <p:ext uri="{BB962C8B-B14F-4D97-AF65-F5344CB8AC3E}">
-        <p14:creationId xmlns:p14="http://schemas.microsoft.com/office/powerpoint/2010/main" val="853602044"/>
+        <p14:creationId xmlns:p14="http://schemas.microsoft.com/office/powerpoint/2010/main" val="325471538"/>
       </p:ext>
     </p:extLst>
   </p:cSld>
@@ -900,36 +807,6 @@
           <a:chExt cx="0" cy="0"/>
         </a:xfrm>
       </p:grpSpPr>
-      <p:pic>
-        <p:nvPicPr>
-          <p:cNvPr id="11" name="Picture 10" descr="Droplets-HD-Content-R1d.png"/>
-          <p:cNvPicPr>
-            <a:picLocks noChangeAspect="1"/>
-          </p:cNvPicPr>
-          <p:nvPr/>
-        </p:nvPicPr>
-        <p:blipFill>
-          <a:blip r:embed="rId2">
-            <a:extLst>
-              <a:ext uri="{28A0092B-C50C-407E-A947-70E740481C1C}">
-                <a14:useLocalDpi xmlns:a14="http://schemas.microsoft.com/office/drawing/2010/main" val="0"/>
-              </a:ext>
-            </a:extLst>
-          </a:blip>
-          <a:stretch>
-            <a:fillRect/>
-          </a:stretch>
-        </p:blipFill>
-        <p:spPr>
-          <a:xfrm>
-            <a:off x="0" y="0"/>
-            <a:ext cx="12192000" cy="6858000"/>
-          </a:xfrm>
-          <a:prstGeom prst="rect">
-            <a:avLst/>
-          </a:prstGeom>
-        </p:spPr>
-      </p:pic>
       <p:sp>
         <p:nvSpPr>
           <p:cNvPr id="2" name="Title 1"/>
@@ -975,7 +852,7 @@
         <p:spPr>
           <a:xfrm>
             <a:off x="1720644" y="3610032"/>
-            <a:ext cx="8752299" cy="594788"/>
+            <a:ext cx="8752299" cy="426812"/>
           </a:xfrm>
         </p:spPr>
         <p:txBody>
@@ -983,7 +860,7 @@
             <a:normAutofit/>
           </a:bodyPr>
           <a:lstStyle>
-            <a:lvl1pPr marL="0" indent="0">
+            <a:lvl1pPr marL="0" indent="0" algn="r">
               <a:buNone/>
               <a:defRPr sz="1400"/>
             </a:lvl1pPr>
@@ -1041,8 +918,8 @@
         </p:nvSpPr>
         <p:spPr>
           <a:xfrm>
-            <a:off x="913774" y="4372796"/>
-            <a:ext cx="10364452" cy="1421053"/>
+            <a:off x="913794" y="4204821"/>
+            <a:ext cx="10353762" cy="1586380"/>
           </a:xfrm>
         </p:spPr>
         <p:txBody>
@@ -1114,7 +991,7 @@
             <a:fld id="{48A87A34-81AB-432B-8DAE-1953F412C126}" type="datetimeFigureOut">
               <a:rPr lang="en-US" smtClean="0"/>
               <a:pPr/>
-              <a:t>9/26/2020</a:t>
+              <a:t>9/27/2020</a:t>
             </a:fld>
             <a:endParaRPr lang="en-US" dirty="0"/>
           </a:p>
@@ -1165,13 +1042,13 @@
       </p:sp>
       <p:sp>
         <p:nvSpPr>
-          <p:cNvPr id="13" name="TextBox 12"/>
+          <p:cNvPr id="11" name="TextBox 10"/>
           <p:cNvSpPr txBox="1"/>
           <p:nvPr/>
         </p:nvSpPr>
         <p:spPr>
           <a:xfrm>
-            <a:off x="1001488" y="754166"/>
+            <a:off x="836612" y="735241"/>
             <a:ext cx="609600" cy="584776"/>
           </a:xfrm>
           <a:prstGeom prst="rect">
@@ -1281,13 +1158,13 @@
       </p:sp>
       <p:sp>
         <p:nvSpPr>
-          <p:cNvPr id="14" name="TextBox 13"/>
+          <p:cNvPr id="13" name="TextBox 12"/>
           <p:cNvSpPr txBox="1"/>
           <p:nvPr/>
         </p:nvSpPr>
         <p:spPr>
           <a:xfrm>
-            <a:off x="10557558" y="2993578"/>
+            <a:off x="10657956" y="2972093"/>
             <a:ext cx="609600" cy="584776"/>
           </a:xfrm>
           <a:prstGeom prst="rect">
@@ -1398,7 +1275,7 @@
     </p:spTree>
     <p:extLst>
       <p:ext uri="{BB962C8B-B14F-4D97-AF65-F5344CB8AC3E}">
-        <p14:creationId xmlns:p14="http://schemas.microsoft.com/office/powerpoint/2010/main" val="472768595"/>
+        <p14:creationId xmlns:p14="http://schemas.microsoft.com/office/powerpoint/2010/main" val="3112958982"/>
       </p:ext>
     </p:extLst>
   </p:cSld>
@@ -1425,56 +1302,26 @@
           <a:chExt cx="0" cy="0"/>
         </a:xfrm>
       </p:grpSpPr>
-      <p:pic>
-        <p:nvPicPr>
-          <p:cNvPr id="8" name="Picture 7" descr="Droplets-HD-Content-R1d.png"/>
-          <p:cNvPicPr>
-            <a:picLocks noChangeAspect="1"/>
-          </p:cNvPicPr>
-          <p:nvPr/>
-        </p:nvPicPr>
-        <p:blipFill>
-          <a:blip r:embed="rId2">
-            <a:extLst>
-              <a:ext uri="{28A0092B-C50C-407E-A947-70E740481C1C}">
-                <a14:useLocalDpi xmlns:a14="http://schemas.microsoft.com/office/drawing/2010/main" val="0"/>
-              </a:ext>
-            </a:extLst>
-          </a:blip>
-          <a:stretch>
-            <a:fillRect/>
-          </a:stretch>
-        </p:blipFill>
+      <p:sp>
+        <p:nvSpPr>
+          <p:cNvPr id="2" name="Title 1"/>
+          <p:cNvSpPr>
+            <a:spLocks noGrp="1"/>
+          </p:cNvSpPr>
+          <p:nvPr>
+            <p:ph type="title"/>
+          </p:nvPr>
+        </p:nvSpPr>
         <p:spPr>
           <a:xfrm>
-            <a:off x="0" y="0"/>
-            <a:ext cx="12192000" cy="6858000"/>
-          </a:xfrm>
-          <a:prstGeom prst="rect">
-            <a:avLst/>
-          </a:prstGeom>
-        </p:spPr>
-      </p:pic>
-      <p:sp>
-        <p:nvSpPr>
-          <p:cNvPr id="2" name="Title 1"/>
-          <p:cNvSpPr>
-            <a:spLocks noGrp="1"/>
-          </p:cNvSpPr>
-          <p:nvPr>
-            <p:ph type="title"/>
-          </p:nvPr>
-        </p:nvSpPr>
-        <p:spPr>
-          <a:xfrm>
-            <a:off x="913775" y="2138721"/>
-            <a:ext cx="10364452" cy="2511835"/>
+            <a:off x="913806" y="2126942"/>
+            <a:ext cx="10355327" cy="2511835"/>
           </a:xfrm>
         </p:spPr>
         <p:txBody>
           <a:bodyPr anchor="b"/>
           <a:lstStyle>
-            <a:lvl1pPr algn="ctr">
+            <a:lvl1pPr>
               <a:defRPr sz="3200"/>
             </a:lvl1pPr>
           </a:lstStyle>
@@ -1499,8 +1346,8 @@
         </p:nvSpPr>
         <p:spPr>
           <a:xfrm>
-            <a:off x="913775" y="4662335"/>
-            <a:ext cx="10364452" cy="1140644"/>
+            <a:off x="913794" y="4650556"/>
+            <a:ext cx="10353763" cy="1140644"/>
           </a:xfrm>
         </p:spPr>
         <p:txBody>
@@ -1570,7 +1417,7 @@
             <a:fld id="{48A87A34-81AB-432B-8DAE-1953F412C126}" type="datetimeFigureOut">
               <a:rPr lang="en-US" smtClean="0"/>
               <a:pPr/>
-              <a:t>9/26/2020</a:t>
+              <a:t>9/27/2020</a:t>
             </a:fld>
             <a:endParaRPr lang="en-US" dirty="0"/>
           </a:p>
@@ -1622,7 +1469,7 @@
     </p:spTree>
     <p:extLst>
       <p:ext uri="{BB962C8B-B14F-4D97-AF65-F5344CB8AC3E}">
-        <p14:creationId xmlns:p14="http://schemas.microsoft.com/office/powerpoint/2010/main" val="460690595"/>
+        <p14:creationId xmlns:p14="http://schemas.microsoft.com/office/powerpoint/2010/main" val="2345444057"/>
       </p:ext>
     </p:extLst>
   </p:cSld>
@@ -1649,78 +1496,48 @@
           <a:chExt cx="0" cy="0"/>
         </a:xfrm>
       </p:grpSpPr>
-      <p:pic>
-        <p:nvPicPr>
-          <p:cNvPr id="13" name="Picture 12" descr="Droplets-HD-Content-R1d.png"/>
-          <p:cNvPicPr>
-            <a:picLocks noChangeAspect="1"/>
-          </p:cNvPicPr>
-          <p:nvPr/>
-        </p:nvPicPr>
-        <p:blipFill>
-          <a:blip r:embed="rId2">
-            <a:extLst>
-              <a:ext uri="{28A0092B-C50C-407E-A947-70E740481C1C}">
-                <a14:useLocalDpi xmlns:a14="http://schemas.microsoft.com/office/drawing/2010/main" val="0"/>
-              </a:ext>
-            </a:extLst>
-          </a:blip>
-          <a:stretch>
-            <a:fillRect/>
-          </a:stretch>
-        </p:blipFill>
+      <p:sp>
+        <p:nvSpPr>
+          <p:cNvPr id="15" name="Title 1"/>
+          <p:cNvSpPr>
+            <a:spLocks noGrp="1"/>
+          </p:cNvSpPr>
+          <p:nvPr>
+            <p:ph type="title"/>
+          </p:nvPr>
+        </p:nvSpPr>
         <p:spPr>
           <a:xfrm>
-            <a:off x="0" y="0"/>
-            <a:ext cx="12192000" cy="6858000"/>
+            <a:off x="913794" y="609600"/>
+            <a:ext cx="10353762" cy="1325563"/>
           </a:xfrm>
-          <a:prstGeom prst="rect">
-            <a:avLst/>
-          </a:prstGeom>
         </p:spPr>
-      </p:pic>
-      <p:sp>
-        <p:nvSpPr>
-          <p:cNvPr id="15" name="Title 1"/>
-          <p:cNvSpPr>
-            <a:spLocks noGrp="1"/>
-          </p:cNvSpPr>
-          <p:nvPr>
-            <p:ph type="title"/>
+        <p:txBody>
+          <a:bodyPr/>
+          <a:lstStyle/>
+          <a:p>
+            <a:r>
+              <a:rPr lang="en-US"/>
+              <a:t>Click to edit Master title style</a:t>
+            </a:r>
+            <a:endParaRPr lang="en-US" dirty="0"/>
+          </a:p>
+        </p:txBody>
+      </p:sp>
+      <p:sp>
+        <p:nvSpPr>
+          <p:cNvPr id="7" name="Text Placeholder 2"/>
+          <p:cNvSpPr>
+            <a:spLocks noGrp="1"/>
+          </p:cNvSpPr>
+          <p:nvPr>
+            <p:ph type="body" idx="1"/>
           </p:nvPr>
         </p:nvSpPr>
         <p:spPr>
           <a:xfrm>
-            <a:off x="913774" y="609600"/>
-            <a:ext cx="10364452" cy="1605094"/>
-          </a:xfrm>
-        </p:spPr>
-        <p:txBody>
-          <a:bodyPr/>
-          <a:lstStyle/>
-          <a:p>
-            <a:r>
-              <a:rPr lang="en-US"/>
-              <a:t>Click to edit Master title style</a:t>
-            </a:r>
-            <a:endParaRPr lang="en-US" dirty="0"/>
-          </a:p>
-        </p:txBody>
-      </p:sp>
-      <p:sp>
-        <p:nvSpPr>
-          <p:cNvPr id="7" name="Text Placeholder 2"/>
-          <p:cNvSpPr>
-            <a:spLocks noGrp="1"/>
-          </p:cNvSpPr>
-          <p:nvPr>
-            <p:ph type="body" idx="1"/>
-          </p:nvPr>
-        </p:nvSpPr>
-        <p:spPr>
-          <a:xfrm>
-            <a:off x="913774" y="2367093"/>
-            <a:ext cx="3298976" cy="576262"/>
+            <a:off x="913794" y="2088319"/>
+            <a:ext cx="3298956" cy="823305"/>
           </a:xfrm>
         </p:spPr>
         <p:txBody>
@@ -1730,7 +1547,7 @@
           <a:lstStyle>
             <a:lvl1pPr marL="0" indent="0" algn="ctr">
               <a:lnSpc>
-                <a:spcPct val="85000"/>
+                <a:spcPct val="100000"/>
               </a:lnSpc>
               <a:buNone/>
               <a:defRPr sz="2400" b="0">
@@ -1793,8 +1610,8 @@
         </p:nvSpPr>
         <p:spPr>
           <a:xfrm>
-            <a:off x="913774" y="2943355"/>
-            <a:ext cx="3298976" cy="2847845"/>
+            <a:off x="913794" y="2911624"/>
+            <a:ext cx="3298956" cy="2879576"/>
           </a:xfrm>
         </p:spPr>
         <p:txBody>
@@ -1860,8 +1677,8 @@
         </p:nvSpPr>
         <p:spPr>
           <a:xfrm>
-            <a:off x="4452389" y="2367093"/>
-            <a:ext cx="3291521" cy="576262"/>
+            <a:off x="4444878" y="2088320"/>
+            <a:ext cx="3298558" cy="823304"/>
           </a:xfrm>
         </p:spPr>
         <p:txBody>
@@ -1871,7 +1688,7 @@
           <a:lstStyle>
             <a:lvl1pPr marL="0" indent="0" algn="ctr">
               <a:lnSpc>
-                <a:spcPct val="85000"/>
+                <a:spcPct val="100000"/>
               </a:lnSpc>
               <a:buNone/>
               <a:defRPr sz="2400" b="0">
@@ -1934,8 +1751,8 @@
         </p:nvSpPr>
         <p:spPr>
           <a:xfrm>
-            <a:off x="4441348" y="2943355"/>
-            <a:ext cx="3303351" cy="2847845"/>
+            <a:off x="4444878" y="2911624"/>
+            <a:ext cx="3299821" cy="2879576"/>
           </a:xfrm>
         </p:spPr>
         <p:txBody>
@@ -2001,8 +1818,8 @@
         </p:nvSpPr>
         <p:spPr>
           <a:xfrm>
-            <a:off x="7973298" y="2367093"/>
-            <a:ext cx="3304928" cy="576262"/>
+            <a:off x="7973298" y="2088320"/>
+            <a:ext cx="3291211" cy="823304"/>
           </a:xfrm>
         </p:spPr>
         <p:txBody>
@@ -2012,7 +1829,7 @@
           <a:lstStyle>
             <a:lvl1pPr marL="0" indent="0" algn="ctr">
               <a:lnSpc>
-                <a:spcPct val="85000"/>
+                <a:spcPct val="100000"/>
               </a:lnSpc>
               <a:buNone/>
               <a:defRPr sz="2400" b="0">
@@ -2075,8 +1892,8 @@
         </p:nvSpPr>
         <p:spPr>
           <a:xfrm>
-            <a:off x="7973298" y="2943355"/>
-            <a:ext cx="3304928" cy="2847845"/>
+            <a:off x="7976346" y="2911624"/>
+            <a:ext cx="3291211" cy="2879576"/>
           </a:xfrm>
         </p:spPr>
         <p:txBody>
@@ -2148,7 +1965,7 @@
             <a:fld id="{48A87A34-81AB-432B-8DAE-1953F412C126}" type="datetimeFigureOut">
               <a:rPr lang="en-US" smtClean="0"/>
               <a:pPr/>
-              <a:t>9/26/2020</a:t>
+              <a:t>9/27/2020</a:t>
             </a:fld>
             <a:endParaRPr lang="en-US" dirty="0"/>
           </a:p>
@@ -2200,7 +2017,7 @@
     </p:spTree>
     <p:extLst>
       <p:ext uri="{BB962C8B-B14F-4D97-AF65-F5344CB8AC3E}">
-        <p14:creationId xmlns:p14="http://schemas.microsoft.com/office/powerpoint/2010/main" val="234507288"/>
+        <p14:creationId xmlns:p14="http://schemas.microsoft.com/office/powerpoint/2010/main" val="1830785893"/>
       </p:ext>
     </p:extLst>
   </p:cSld>
@@ -2227,78 +2044,48 @@
           <a:chExt cx="0" cy="0"/>
         </a:xfrm>
       </p:grpSpPr>
-      <p:pic>
-        <p:nvPicPr>
-          <p:cNvPr id="16" name="Picture 15" descr="Droplets-HD-Content-R1d.png"/>
-          <p:cNvPicPr>
-            <a:picLocks noChangeAspect="1"/>
-          </p:cNvPicPr>
-          <p:nvPr/>
-        </p:nvPicPr>
-        <p:blipFill>
-          <a:blip r:embed="rId2">
-            <a:extLst>
-              <a:ext uri="{28A0092B-C50C-407E-A947-70E740481C1C}">
-                <a14:useLocalDpi xmlns:a14="http://schemas.microsoft.com/office/drawing/2010/main" val="0"/>
-              </a:ext>
-            </a:extLst>
-          </a:blip>
-          <a:stretch>
-            <a:fillRect/>
-          </a:stretch>
-        </p:blipFill>
+      <p:sp>
+        <p:nvSpPr>
+          <p:cNvPr id="30" name="Title 1"/>
+          <p:cNvSpPr>
+            <a:spLocks noGrp="1"/>
+          </p:cNvSpPr>
+          <p:nvPr>
+            <p:ph type="title"/>
+          </p:nvPr>
+        </p:nvSpPr>
         <p:spPr>
           <a:xfrm>
-            <a:off x="0" y="0"/>
-            <a:ext cx="12192000" cy="6858000"/>
+            <a:off x="913795" y="609600"/>
+            <a:ext cx="10353762" cy="1325563"/>
           </a:xfrm>
-          <a:prstGeom prst="rect">
-            <a:avLst/>
-          </a:prstGeom>
         </p:spPr>
-      </p:pic>
-      <p:sp>
-        <p:nvSpPr>
-          <p:cNvPr id="30" name="Title 1"/>
-          <p:cNvSpPr>
-            <a:spLocks noGrp="1"/>
-          </p:cNvSpPr>
-          <p:nvPr>
-            <p:ph type="title"/>
+        <p:txBody>
+          <a:bodyPr/>
+          <a:lstStyle/>
+          <a:p>
+            <a:r>
+              <a:rPr lang="en-US"/>
+              <a:t>Click to edit Master title style</a:t>
+            </a:r>
+            <a:endParaRPr lang="en-US" dirty="0"/>
+          </a:p>
+        </p:txBody>
+      </p:sp>
+      <p:sp>
+        <p:nvSpPr>
+          <p:cNvPr id="19" name="Text Placeholder 2"/>
+          <p:cNvSpPr>
+            <a:spLocks noGrp="1"/>
+          </p:cNvSpPr>
+          <p:nvPr>
+            <p:ph type="body" idx="1"/>
           </p:nvPr>
         </p:nvSpPr>
         <p:spPr>
           <a:xfrm>
-            <a:off x="913774" y="610772"/>
-            <a:ext cx="10364452" cy="1603922"/>
-          </a:xfrm>
-        </p:spPr>
-        <p:txBody>
-          <a:bodyPr/>
-          <a:lstStyle/>
-          <a:p>
-            <a:r>
-              <a:rPr lang="en-US"/>
-              <a:t>Click to edit Master title style</a:t>
-            </a:r>
-            <a:endParaRPr lang="en-US" dirty="0"/>
-          </a:p>
-        </p:txBody>
-      </p:sp>
-      <p:sp>
-        <p:nvSpPr>
-          <p:cNvPr id="19" name="Text Placeholder 2"/>
-          <p:cNvSpPr>
-            <a:spLocks noGrp="1"/>
-          </p:cNvSpPr>
-          <p:nvPr>
-            <p:ph type="body" idx="1"/>
-          </p:nvPr>
-        </p:nvSpPr>
-        <p:spPr>
-          <a:xfrm>
-            <a:off x="913774" y="4204820"/>
-            <a:ext cx="3296409" cy="576262"/>
+            <a:off x="913795" y="4195899"/>
+            <a:ext cx="3298955" cy="576262"/>
           </a:xfrm>
         </p:spPr>
         <p:txBody>
@@ -2308,10 +2095,10 @@
           <a:lstStyle>
             <a:lvl1pPr marL="0" indent="0" algn="ctr">
               <a:lnSpc>
-                <a:spcPct val="85000"/>
+                <a:spcPct val="100000"/>
               </a:lnSpc>
               <a:buNone/>
-              <a:defRPr sz="2200" b="0">
+              <a:defRPr sz="2000" b="0">
                 <a:solidFill>
                   <a:schemeClr val="tx1"/>
                 </a:solidFill>
@@ -2371,32 +2158,38 @@
         </p:nvSpPr>
         <p:spPr>
           <a:xfrm>
-            <a:off x="913774" y="2367093"/>
-            <a:ext cx="3296409" cy="1524000"/>
+            <a:off x="1092020" y="2298987"/>
+            <a:ext cx="2940050" cy="1524000"/>
           </a:xfrm>
           <a:prstGeom prst="roundRect">
             <a:avLst>
-              <a:gd name="adj" fmla="val 9363"/>
+              <a:gd name="adj" fmla="val 0"/>
             </a:avLst>
           </a:prstGeom>
           <a:noFill/>
-          <a:ln w="82550" cap="sq">
+          <a:ln w="146050" cap="sq">
             <a:solidFill>
-              <a:srgbClr val="EAEAEA"/>
+              <a:srgbClr val="FFFFFF"/>
             </a:solidFill>
             <a:miter lim="800000"/>
           </a:ln>
-          <a:effectLst/>
+          <a:effectLst>
+            <a:outerShdw blurRad="55000" dist="18000" dir="5400000" algn="tl" rotWithShape="0">
+              <a:srgbClr val="000000">
+                <a:alpha val="40000"/>
+              </a:srgbClr>
+            </a:outerShdw>
+          </a:effectLst>
           <a:scene3d>
             <a:camera prst="orthographicFront"/>
-            <a:lightRig rig="threePt" dir="t">
-              <a:rot lat="0" lon="0" rev="2700000"/>
+            <a:lightRig rig="twoPt" dir="t">
+              <a:rot lat="0" lon="0" rev="7200000"/>
             </a:lightRig>
           </a:scene3d>
-          <a:sp3d contourW="6350">
-            <a:bevelT h="38100"/>
+          <a:sp3d>
+            <a:bevelT w="25400" h="19050"/>
             <a:contourClr>
-              <a:srgbClr val="C0C0C0"/>
+              <a:srgbClr val="FFFFFF"/>
             </a:contourClr>
           </a:sp3d>
         </p:spPr>
@@ -2463,8 +2256,8 @@
         </p:nvSpPr>
         <p:spPr>
           <a:xfrm>
-            <a:off x="913774" y="4781082"/>
-            <a:ext cx="3296409" cy="1010118"/>
+            <a:off x="913795" y="4772161"/>
+            <a:ext cx="3298955" cy="1019038"/>
           </a:xfrm>
         </p:spPr>
         <p:txBody>
@@ -2530,8 +2323,8 @@
         </p:nvSpPr>
         <p:spPr>
           <a:xfrm>
-            <a:off x="4442759" y="4204820"/>
-            <a:ext cx="3301828" cy="576262"/>
+            <a:off x="4442701" y="4195899"/>
+            <a:ext cx="3298983" cy="576262"/>
           </a:xfrm>
         </p:spPr>
         <p:txBody>
@@ -2541,10 +2334,10 @@
           <a:lstStyle>
             <a:lvl1pPr marL="0" indent="0" algn="ctr">
               <a:lnSpc>
-                <a:spcPct val="85000"/>
+                <a:spcPct val="100000"/>
               </a:lnSpc>
               <a:buNone/>
-              <a:defRPr sz="2200" b="0">
+              <a:defRPr sz="2000" b="0">
                 <a:solidFill>
                   <a:schemeClr val="tx1"/>
                 </a:solidFill>
@@ -2604,32 +2397,38 @@
         </p:nvSpPr>
         <p:spPr>
           <a:xfrm>
-            <a:off x="4441348" y="2367093"/>
-            <a:ext cx="3303352" cy="1524000"/>
+            <a:off x="4568996" y="2298987"/>
+            <a:ext cx="2930525" cy="1524000"/>
           </a:xfrm>
           <a:prstGeom prst="roundRect">
             <a:avLst>
-              <a:gd name="adj" fmla="val 8841"/>
+              <a:gd name="adj" fmla="val 0"/>
             </a:avLst>
           </a:prstGeom>
           <a:noFill/>
-          <a:ln w="82550" cap="sq">
+          <a:ln w="146050" cap="sq">
             <a:solidFill>
-              <a:srgbClr val="EAEAEA"/>
+              <a:srgbClr val="FFFFFF"/>
             </a:solidFill>
             <a:miter lim="800000"/>
           </a:ln>
-          <a:effectLst/>
+          <a:effectLst>
+            <a:outerShdw blurRad="55000" dist="18000" dir="5400000" algn="tl" rotWithShape="0">
+              <a:srgbClr val="000000">
+                <a:alpha val="40000"/>
+              </a:srgbClr>
+            </a:outerShdw>
+          </a:effectLst>
           <a:scene3d>
             <a:camera prst="orthographicFront"/>
-            <a:lightRig rig="threePt" dir="t">
-              <a:rot lat="0" lon="0" rev="2700000"/>
+            <a:lightRig rig="twoPt" dir="t">
+              <a:rot lat="0" lon="0" rev="7200000"/>
             </a:lightRig>
           </a:scene3d>
-          <a:sp3d contourW="6350">
-            <a:bevelT h="38100"/>
+          <a:sp3d>
+            <a:bevelT w="25400" h="19050"/>
             <a:contourClr>
-              <a:srgbClr val="C0C0C0"/>
+              <a:srgbClr val="FFFFFF"/>
             </a:contourClr>
           </a:sp3d>
         </p:spPr>
@@ -2696,8 +2495,8 @@
         </p:nvSpPr>
         <p:spPr>
           <a:xfrm>
-            <a:off x="4441348" y="4781080"/>
-            <a:ext cx="3303352" cy="1010119"/>
+            <a:off x="4441348" y="4772160"/>
+            <a:ext cx="3300336" cy="1019038"/>
           </a:xfrm>
         </p:spPr>
         <p:txBody>
@@ -2763,8 +2562,8 @@
         </p:nvSpPr>
         <p:spPr>
           <a:xfrm>
-            <a:off x="7973298" y="4204820"/>
-            <a:ext cx="3300681" cy="576262"/>
+            <a:off x="7973423" y="4195899"/>
+            <a:ext cx="3289900" cy="576262"/>
           </a:xfrm>
         </p:spPr>
         <p:txBody>
@@ -2774,10 +2573,10 @@
           <a:lstStyle>
             <a:lvl1pPr marL="0" indent="0" algn="ctr">
               <a:lnSpc>
-                <a:spcPct val="85000"/>
+                <a:spcPct val="100000"/>
               </a:lnSpc>
               <a:buNone/>
-              <a:defRPr sz="2200" b="0">
+              <a:defRPr sz="2000" b="0">
                 <a:solidFill>
                   <a:schemeClr val="tx1"/>
                 </a:solidFill>
@@ -2837,32 +2636,38 @@
         </p:nvSpPr>
         <p:spPr>
           <a:xfrm>
-            <a:off x="7973298" y="2367093"/>
-            <a:ext cx="3304928" cy="1524000"/>
+            <a:off x="8152803" y="2298987"/>
+            <a:ext cx="2932113" cy="1524000"/>
           </a:xfrm>
           <a:prstGeom prst="roundRect">
             <a:avLst>
-              <a:gd name="adj" fmla="val 8841"/>
+              <a:gd name="adj" fmla="val 0"/>
             </a:avLst>
           </a:prstGeom>
           <a:noFill/>
-          <a:ln w="82550" cap="sq">
+          <a:ln w="146050" cap="sq">
             <a:solidFill>
-              <a:srgbClr val="EAEAEA"/>
+              <a:srgbClr val="FFFFFF"/>
             </a:solidFill>
             <a:miter lim="800000"/>
           </a:ln>
-          <a:effectLst/>
+          <a:effectLst>
+            <a:outerShdw blurRad="55000" dist="18000" dir="5400000" algn="tl" rotWithShape="0">
+              <a:srgbClr val="000000">
+                <a:alpha val="40000"/>
+              </a:srgbClr>
+            </a:outerShdw>
+          </a:effectLst>
           <a:scene3d>
             <a:camera prst="orthographicFront"/>
-            <a:lightRig rig="threePt" dir="t">
-              <a:rot lat="0" lon="0" rev="2700000"/>
+            <a:lightRig rig="twoPt" dir="t">
+              <a:rot lat="0" lon="0" rev="7200000"/>
             </a:lightRig>
           </a:scene3d>
-          <a:sp3d contourW="6350">
-            <a:bevelT h="38100"/>
+          <a:sp3d>
+            <a:bevelT w="25400" h="19050"/>
             <a:contourClr>
-              <a:srgbClr val="C0C0C0"/>
+              <a:srgbClr val="FFFFFF"/>
             </a:contourClr>
           </a:sp3d>
         </p:spPr>
@@ -2929,8 +2734,8 @@
         </p:nvSpPr>
         <p:spPr>
           <a:xfrm>
-            <a:off x="7973173" y="4781078"/>
-            <a:ext cx="3305053" cy="1010121"/>
+            <a:off x="7973298" y="4772161"/>
+            <a:ext cx="3294258" cy="1019037"/>
           </a:xfrm>
         </p:spPr>
         <p:txBody>
@@ -3002,7 +2807,7 @@
             <a:fld id="{48A87A34-81AB-432B-8DAE-1953F412C126}" type="datetimeFigureOut">
               <a:rPr lang="en-US" smtClean="0"/>
               <a:pPr/>
-              <a:t>9/26/2020</a:t>
+              <a:t>9/27/2020</a:t>
             </a:fld>
             <a:endParaRPr lang="en-US" dirty="0"/>
           </a:p>
@@ -3054,7 +2859,7 @@
     </p:spTree>
     <p:extLst>
       <p:ext uri="{BB962C8B-B14F-4D97-AF65-F5344CB8AC3E}">
-        <p14:creationId xmlns:p14="http://schemas.microsoft.com/office/powerpoint/2010/main" val="1101961718"/>
+        <p14:creationId xmlns:p14="http://schemas.microsoft.com/office/powerpoint/2010/main" val="4294252597"/>
       </p:ext>
     </p:extLst>
   </p:cSld>
@@ -3081,36 +2886,6 @@
           <a:chExt cx="0" cy="0"/>
         </a:xfrm>
       </p:grpSpPr>
-      <p:pic>
-        <p:nvPicPr>
-          <p:cNvPr id="8" name="Picture 7" descr="Droplets-HD-Content-R1d.png"/>
-          <p:cNvPicPr>
-            <a:picLocks noChangeAspect="1"/>
-          </p:cNvPicPr>
-          <p:nvPr/>
-        </p:nvPicPr>
-        <p:blipFill>
-          <a:blip r:embed="rId2">
-            <a:extLst>
-              <a:ext uri="{28A0092B-C50C-407E-A947-70E740481C1C}">
-                <a14:useLocalDpi xmlns:a14="http://schemas.microsoft.com/office/drawing/2010/main" val="0"/>
-              </a:ext>
-            </a:extLst>
-          </a:blip>
-          <a:stretch>
-            <a:fillRect/>
-          </a:stretch>
-        </p:blipFill>
-        <p:spPr>
-          <a:xfrm>
-            <a:off x="0" y="0"/>
-            <a:ext cx="12192000" cy="6858000"/>
-          </a:xfrm>
-          <a:prstGeom prst="rect">
-            <a:avLst/>
-          </a:prstGeom>
-        </p:spPr>
-      </p:pic>
       <p:sp>
         <p:nvSpPr>
           <p:cNvPr id="2" name="Title 1"/>
@@ -3136,20 +2911,15 @@
       </p:sp>
       <p:sp>
         <p:nvSpPr>
-          <p:cNvPr id="11" name="Vertical Text Placeholder 2"/>
-          <p:cNvSpPr>
-            <a:spLocks noGrp="1"/>
-          </p:cNvSpPr>
-          <p:nvPr>
-            <p:ph type="body" orient="vert" sz="quarter" idx="13"/>
-          </p:nvPr>
-        </p:nvSpPr>
-        <p:spPr>
-          <a:xfrm>
-            <a:off x="913775" y="2367093"/>
-            <a:ext cx="10364452" cy="3424107"/>
-          </a:xfrm>
-        </p:spPr>
+          <p:cNvPr id="3" name="Vertical Text Placeholder 2"/>
+          <p:cNvSpPr>
+            <a:spLocks noGrp="1"/>
+          </p:cNvSpPr>
+          <p:nvPr>
+            <p:ph type="body" orient="vert" idx="1"/>
+          </p:nvPr>
+        </p:nvSpPr>
+        <p:spPr/>
         <p:txBody>
           <a:bodyPr vert="eaVert"/>
           <a:lstStyle/>
@@ -3209,7 +2979,7 @@
             <a:fld id="{48A87A34-81AB-432B-8DAE-1953F412C126}" type="datetimeFigureOut">
               <a:rPr lang="en-US" smtClean="0"/>
               <a:pPr/>
-              <a:t>9/26/2020</a:t>
+              <a:t>9/27/2020</a:t>
             </a:fld>
             <a:endParaRPr lang="en-US" dirty="0"/>
           </a:p>
@@ -3261,7 +3031,7 @@
     </p:spTree>
     <p:extLst>
       <p:ext uri="{BB962C8B-B14F-4D97-AF65-F5344CB8AC3E}">
-        <p14:creationId xmlns:p14="http://schemas.microsoft.com/office/powerpoint/2010/main" val="1594451263"/>
+        <p14:creationId xmlns:p14="http://schemas.microsoft.com/office/powerpoint/2010/main" val="1169145480"/>
       </p:ext>
     </p:extLst>
   </p:cSld>
@@ -3288,50 +3058,20 @@
           <a:chExt cx="0" cy="0"/>
         </a:xfrm>
       </p:grpSpPr>
-      <p:pic>
-        <p:nvPicPr>
-          <p:cNvPr id="9" name="Picture 8" descr="Droplets-HD-Content-R1d.png"/>
-          <p:cNvPicPr>
-            <a:picLocks noChangeAspect="1"/>
-          </p:cNvPicPr>
-          <p:nvPr/>
-        </p:nvPicPr>
-        <p:blipFill>
-          <a:blip r:embed="rId2">
-            <a:extLst>
-              <a:ext uri="{28A0092B-C50C-407E-A947-70E740481C1C}">
-                <a14:useLocalDpi xmlns:a14="http://schemas.microsoft.com/office/drawing/2010/main" val="0"/>
-              </a:ext>
-            </a:extLst>
-          </a:blip>
-          <a:stretch>
-            <a:fillRect/>
-          </a:stretch>
-        </p:blipFill>
+      <p:sp>
+        <p:nvSpPr>
+          <p:cNvPr id="2" name="Vertical Title 1"/>
+          <p:cNvSpPr>
+            <a:spLocks noGrp="1"/>
+          </p:cNvSpPr>
+          <p:nvPr>
+            <p:ph type="title" orient="vert"/>
+          </p:nvPr>
+        </p:nvSpPr>
         <p:spPr>
           <a:xfrm>
-            <a:off x="0" y="0"/>
-            <a:ext cx="12192000" cy="6858000"/>
-          </a:xfrm>
-          <a:prstGeom prst="rect">
-            <a:avLst/>
-          </a:prstGeom>
-        </p:spPr>
-      </p:pic>
-      <p:sp>
-        <p:nvSpPr>
-          <p:cNvPr id="2" name="Vertical Title 1"/>
-          <p:cNvSpPr>
-            <a:spLocks noGrp="1"/>
-          </p:cNvSpPr>
-          <p:nvPr>
-            <p:ph type="title" orient="vert"/>
-          </p:nvPr>
-        </p:nvSpPr>
-        <p:spPr>
-          <a:xfrm>
-            <a:off x="8724900" y="609601"/>
-            <a:ext cx="2553326" cy="5181599"/>
+            <a:off x="8724900" y="609599"/>
+            <a:ext cx="2542657" cy="5181601"/>
           </a:xfrm>
         </p:spPr>
         <p:txBody>
@@ -3352,18 +3092,18 @@
       </p:sp>
       <p:sp>
         <p:nvSpPr>
-          <p:cNvPr id="8" name="Vertical Text Placeholder 2"/>
-          <p:cNvSpPr>
-            <a:spLocks noGrp="1"/>
-          </p:cNvSpPr>
-          <p:nvPr>
-            <p:ph type="body" orient="vert" sz="quarter" idx="13"/>
+          <p:cNvPr id="3" name="Vertical Text Placeholder 2"/>
+          <p:cNvSpPr>
+            <a:spLocks noGrp="1"/>
+          </p:cNvSpPr>
+          <p:nvPr>
+            <p:ph type="body" orient="vert" idx="1"/>
           </p:nvPr>
         </p:nvSpPr>
         <p:spPr>
           <a:xfrm>
-            <a:off x="913775" y="609601"/>
-            <a:ext cx="7658724" cy="5181599"/>
+            <a:off x="913794" y="609599"/>
+            <a:ext cx="7658705" cy="5181601"/>
           </a:xfrm>
         </p:spPr>
         <p:txBody>
@@ -3425,7 +3165,7 @@
             <a:fld id="{48A87A34-81AB-432B-8DAE-1953F412C126}" type="datetimeFigureOut">
               <a:rPr lang="en-US" smtClean="0"/>
               <a:pPr/>
-              <a:t>9/26/2020</a:t>
+              <a:t>9/27/2020</a:t>
             </a:fld>
             <a:endParaRPr lang="en-US" dirty="0"/>
           </a:p>
@@ -3477,414 +3217,7 @@
     </p:spTree>
     <p:extLst>
       <p:ext uri="{BB962C8B-B14F-4D97-AF65-F5344CB8AC3E}">
-        <p14:creationId xmlns:p14="http://schemas.microsoft.com/office/powerpoint/2010/main" val="510603221"/>
-      </p:ext>
-    </p:extLst>
-  </p:cSld>
-  <p:clrMapOvr>
-    <a:masterClrMapping/>
-  </p:clrMapOvr>
-</p:sldLayout>
-</file>
-
-<file path=ppt/slideLayouts/slideLayout18.xml><?xml version="1.0" encoding="utf-8"?>
-<p:sldLayout xmlns:a="http://schemas.openxmlformats.org/drawingml/2006/main" xmlns:r="http://schemas.openxmlformats.org/officeDocument/2006/relationships" xmlns:p="http://schemas.openxmlformats.org/presentationml/2006/main" type="twoObj">
-  <p:cSld name="1_Two Content">
-    <p:spTree>
-      <p:nvGrpSpPr>
-        <p:cNvPr id="1" name=""/>
-        <p:cNvGrpSpPr/>
-        <p:nvPr/>
-      </p:nvGrpSpPr>
-      <p:grpSpPr>
-        <a:xfrm>
-          <a:off x="0" y="0"/>
-          <a:ext cx="0" cy="0"/>
-          <a:chOff x="0" y="0"/>
-          <a:chExt cx="0" cy="0"/>
-        </a:xfrm>
-      </p:grpSpPr>
-      <p:sp>
-        <p:nvSpPr>
-          <p:cNvPr id="2" name="Title 1"/>
-          <p:cNvSpPr>
-            <a:spLocks noGrp="1"/>
-          </p:cNvSpPr>
-          <p:nvPr>
-            <p:ph type="title"/>
-          </p:nvPr>
-        </p:nvSpPr>
-        <p:spPr>
-          <a:xfrm>
-            <a:off x="1449217" y="804889"/>
-            <a:ext cx="9605635" cy="1059305"/>
-          </a:xfrm>
-        </p:spPr>
-        <p:txBody>
-          <a:bodyPr/>
-          <a:lstStyle/>
-          <a:p>
-            <a:r>
-              <a:rPr lang="en-US"/>
-              <a:t>Click to edit Master title style</a:t>
-            </a:r>
-            <a:endParaRPr lang="en-US" dirty="0"/>
-          </a:p>
-        </p:txBody>
-      </p:sp>
-      <p:sp>
-        <p:nvSpPr>
-          <p:cNvPr id="3" name="Content Placeholder 2"/>
-          <p:cNvSpPr>
-            <a:spLocks noGrp="1"/>
-          </p:cNvSpPr>
-          <p:nvPr>
-            <p:ph sz="half" idx="1"/>
-          </p:nvPr>
-        </p:nvSpPr>
-        <p:spPr>
-          <a:xfrm>
-            <a:off x="1447331" y="2010878"/>
-            <a:ext cx="4645152" cy="3448595"/>
-          </a:xfrm>
-        </p:spPr>
-        <p:txBody>
-          <a:bodyPr/>
-          <a:lstStyle/>
-          <a:p>
-            <a:pPr lvl="0"/>
-            <a:r>
-              <a:rPr lang="en-US"/>
-              <a:t>Click to edit Master text styles</a:t>
-            </a:r>
-          </a:p>
-          <a:p>
-            <a:pPr lvl="1"/>
-            <a:r>
-              <a:rPr lang="en-US"/>
-              <a:t>Second level</a:t>
-            </a:r>
-          </a:p>
-          <a:p>
-            <a:pPr lvl="2"/>
-            <a:r>
-              <a:rPr lang="en-US"/>
-              <a:t>Third level</a:t>
-            </a:r>
-          </a:p>
-          <a:p>
-            <a:pPr lvl="3"/>
-            <a:r>
-              <a:rPr lang="en-US"/>
-              <a:t>Fourth level</a:t>
-            </a:r>
-          </a:p>
-          <a:p>
-            <a:pPr lvl="4"/>
-            <a:r>
-              <a:rPr lang="en-US"/>
-              <a:t>Fifth level</a:t>
-            </a:r>
-            <a:endParaRPr lang="en-US" dirty="0"/>
-          </a:p>
-        </p:txBody>
-      </p:sp>
-      <p:sp>
-        <p:nvSpPr>
-          <p:cNvPr id="4" name="Content Placeholder 3"/>
-          <p:cNvSpPr>
-            <a:spLocks noGrp="1"/>
-          </p:cNvSpPr>
-          <p:nvPr>
-            <p:ph sz="half" idx="2"/>
-          </p:nvPr>
-        </p:nvSpPr>
-        <p:spPr>
-          <a:xfrm>
-            <a:off x="6413771" y="2017343"/>
-            <a:ext cx="4645152" cy="3441520"/>
-          </a:xfrm>
-        </p:spPr>
-        <p:txBody>
-          <a:bodyPr/>
-          <a:lstStyle/>
-          <a:p>
-            <a:pPr lvl="0"/>
-            <a:r>
-              <a:rPr lang="en-US"/>
-              <a:t>Click to edit Master text styles</a:t>
-            </a:r>
-          </a:p>
-          <a:p>
-            <a:pPr lvl="1"/>
-            <a:r>
-              <a:rPr lang="en-US"/>
-              <a:t>Second level</a:t>
-            </a:r>
-          </a:p>
-          <a:p>
-            <a:pPr lvl="2"/>
-            <a:r>
-              <a:rPr lang="en-US"/>
-              <a:t>Third level</a:t>
-            </a:r>
-          </a:p>
-          <a:p>
-            <a:pPr lvl="3"/>
-            <a:r>
-              <a:rPr lang="en-US"/>
-              <a:t>Fourth level</a:t>
-            </a:r>
-          </a:p>
-          <a:p>
-            <a:pPr lvl="4"/>
-            <a:r>
-              <a:rPr lang="en-US"/>
-              <a:t>Fifth level</a:t>
-            </a:r>
-            <a:endParaRPr lang="en-US" dirty="0"/>
-          </a:p>
-        </p:txBody>
-      </p:sp>
-      <p:sp>
-        <p:nvSpPr>
-          <p:cNvPr id="5" name="Date Placeholder 4"/>
-          <p:cNvSpPr>
-            <a:spLocks noGrp="1"/>
-          </p:cNvSpPr>
-          <p:nvPr>
-            <p:ph type="dt" sz="half" idx="10"/>
-          </p:nvPr>
-        </p:nvSpPr>
-        <p:spPr/>
-        <p:txBody>
-          <a:bodyPr/>
-          <a:lstStyle/>
-          <a:p>
-            <a:fld id="{48A87A34-81AB-432B-8DAE-1953F412C126}" type="datetimeFigureOut">
-              <a:rPr lang="en-US" smtClean="0"/>
-              <a:t>9/26/2020</a:t>
-            </a:fld>
-            <a:endParaRPr lang="en-US" dirty="0"/>
-          </a:p>
-        </p:txBody>
-      </p:sp>
-      <p:sp>
-        <p:nvSpPr>
-          <p:cNvPr id="6" name="Footer Placeholder 5"/>
-          <p:cNvSpPr>
-            <a:spLocks noGrp="1"/>
-          </p:cNvSpPr>
-          <p:nvPr>
-            <p:ph type="ftr" sz="quarter" idx="11"/>
-          </p:nvPr>
-        </p:nvSpPr>
-        <p:spPr/>
-        <p:txBody>
-          <a:bodyPr/>
-          <a:lstStyle/>
-          <a:p>
-            <a:endParaRPr lang="en-US" dirty="0"/>
-          </a:p>
-        </p:txBody>
-      </p:sp>
-      <p:sp>
-        <p:nvSpPr>
-          <p:cNvPr id="7" name="Slide Number Placeholder 6"/>
-          <p:cNvSpPr>
-            <a:spLocks noGrp="1"/>
-          </p:cNvSpPr>
-          <p:nvPr>
-            <p:ph type="sldNum" sz="quarter" idx="12"/>
-          </p:nvPr>
-        </p:nvSpPr>
-        <p:spPr/>
-        <p:txBody>
-          <a:bodyPr/>
-          <a:lstStyle/>
-          <a:p>
-            <a:fld id="{6D22F896-40B5-4ADD-8801-0D06FADFA095}" type="slidenum">
-              <a:rPr lang="en-US" smtClean="0"/>
-              <a:t>‹#›</a:t>
-            </a:fld>
-            <a:endParaRPr lang="en-US" dirty="0"/>
-          </a:p>
-        </p:txBody>
-      </p:sp>
-    </p:spTree>
-    <p:extLst>
-      <p:ext uri="{BB962C8B-B14F-4D97-AF65-F5344CB8AC3E}">
-        <p14:creationId xmlns:p14="http://schemas.microsoft.com/office/powerpoint/2010/main" val="773887200"/>
-      </p:ext>
-    </p:extLst>
-  </p:cSld>
-  <p:clrMapOvr>
-    <a:masterClrMapping/>
-  </p:clrMapOvr>
-</p:sldLayout>
-</file>
-
-<file path=ppt/slideLayouts/slideLayout19.xml><?xml version="1.0" encoding="utf-8"?>
-<p:sldLayout xmlns:a="http://schemas.openxmlformats.org/drawingml/2006/main" xmlns:r="http://schemas.openxmlformats.org/officeDocument/2006/relationships" xmlns:p="http://schemas.openxmlformats.org/presentationml/2006/main" type="obj">
-  <p:cSld name="1_Title and Content">
-    <p:spTree>
-      <p:nvGrpSpPr>
-        <p:cNvPr id="1" name=""/>
-        <p:cNvGrpSpPr/>
-        <p:nvPr/>
-      </p:nvGrpSpPr>
-      <p:grpSpPr>
-        <a:xfrm>
-          <a:off x="0" y="0"/>
-          <a:ext cx="0" cy="0"/>
-          <a:chOff x="0" y="0"/>
-          <a:chExt cx="0" cy="0"/>
-        </a:xfrm>
-      </p:grpSpPr>
-      <p:sp>
-        <p:nvSpPr>
-          <p:cNvPr id="2" name="Title 1"/>
-          <p:cNvSpPr>
-            <a:spLocks noGrp="1"/>
-          </p:cNvSpPr>
-          <p:nvPr>
-            <p:ph type="title"/>
-          </p:nvPr>
-        </p:nvSpPr>
-        <p:spPr/>
-        <p:txBody>
-          <a:bodyPr/>
-          <a:lstStyle/>
-          <a:p>
-            <a:r>
-              <a:rPr lang="en-US"/>
-              <a:t>Click to edit Master title style</a:t>
-            </a:r>
-            <a:endParaRPr lang="en-US" dirty="0"/>
-          </a:p>
-        </p:txBody>
-      </p:sp>
-      <p:sp>
-        <p:nvSpPr>
-          <p:cNvPr id="3" name="Content Placeholder 2"/>
-          <p:cNvSpPr>
-            <a:spLocks noGrp="1"/>
-          </p:cNvSpPr>
-          <p:nvPr>
-            <p:ph idx="1"/>
-          </p:nvPr>
-        </p:nvSpPr>
-        <p:spPr/>
-        <p:txBody>
-          <a:bodyPr anchor="t"/>
-          <a:lstStyle/>
-          <a:p>
-            <a:pPr lvl="0"/>
-            <a:r>
-              <a:rPr lang="en-US"/>
-              <a:t>Click to edit Master text styles</a:t>
-            </a:r>
-          </a:p>
-          <a:p>
-            <a:pPr lvl="1"/>
-            <a:r>
-              <a:rPr lang="en-US"/>
-              <a:t>Second level</a:t>
-            </a:r>
-          </a:p>
-          <a:p>
-            <a:pPr lvl="2"/>
-            <a:r>
-              <a:rPr lang="en-US"/>
-              <a:t>Third level</a:t>
-            </a:r>
-          </a:p>
-          <a:p>
-            <a:pPr lvl="3"/>
-            <a:r>
-              <a:rPr lang="en-US"/>
-              <a:t>Fourth level</a:t>
-            </a:r>
-          </a:p>
-          <a:p>
-            <a:pPr lvl="4"/>
-            <a:r>
-              <a:rPr lang="en-US"/>
-              <a:t>Fifth level</a:t>
-            </a:r>
-            <a:endParaRPr lang="en-US" dirty="0"/>
-          </a:p>
-        </p:txBody>
-      </p:sp>
-      <p:sp>
-        <p:nvSpPr>
-          <p:cNvPr id="4" name="Date Placeholder 3"/>
-          <p:cNvSpPr>
-            <a:spLocks noGrp="1"/>
-          </p:cNvSpPr>
-          <p:nvPr>
-            <p:ph type="dt" sz="half" idx="10"/>
-          </p:nvPr>
-        </p:nvSpPr>
-        <p:spPr/>
-        <p:txBody>
-          <a:bodyPr/>
-          <a:lstStyle/>
-          <a:p>
-            <a:fld id="{48A87A34-81AB-432B-8DAE-1953F412C126}" type="datetimeFigureOut">
-              <a:rPr lang="en-US" smtClean="0"/>
-              <a:t>9/26/2020</a:t>
-            </a:fld>
-            <a:endParaRPr lang="en-US" dirty="0"/>
-          </a:p>
-        </p:txBody>
-      </p:sp>
-      <p:sp>
-        <p:nvSpPr>
-          <p:cNvPr id="5" name="Footer Placeholder 4"/>
-          <p:cNvSpPr>
-            <a:spLocks noGrp="1"/>
-          </p:cNvSpPr>
-          <p:nvPr>
-            <p:ph type="ftr" sz="quarter" idx="11"/>
-          </p:nvPr>
-        </p:nvSpPr>
-        <p:spPr/>
-        <p:txBody>
-          <a:bodyPr/>
-          <a:lstStyle/>
-          <a:p>
-            <a:endParaRPr lang="en-US" dirty="0"/>
-          </a:p>
-        </p:txBody>
-      </p:sp>
-      <p:sp>
-        <p:nvSpPr>
-          <p:cNvPr id="6" name="Slide Number Placeholder 5"/>
-          <p:cNvSpPr>
-            <a:spLocks noGrp="1"/>
-          </p:cNvSpPr>
-          <p:nvPr>
-            <p:ph type="sldNum" sz="quarter" idx="12"/>
-          </p:nvPr>
-        </p:nvSpPr>
-        <p:spPr/>
-        <p:txBody>
-          <a:bodyPr/>
-          <a:lstStyle/>
-          <a:p>
-            <a:fld id="{6D22F896-40B5-4ADD-8801-0D06FADFA095}" type="slidenum">
-              <a:rPr lang="en-US" smtClean="0"/>
-              <a:t>‹#›</a:t>
-            </a:fld>
-            <a:endParaRPr lang="en-US" dirty="0"/>
-          </a:p>
-        </p:txBody>
-      </p:sp>
-    </p:spTree>
-    <p:extLst>
-      <p:ext uri="{BB962C8B-B14F-4D97-AF65-F5344CB8AC3E}">
-        <p14:creationId xmlns:p14="http://schemas.microsoft.com/office/powerpoint/2010/main" val="3079259405"/>
+        <p14:creationId xmlns:p14="http://schemas.microsoft.com/office/powerpoint/2010/main" val="628046237"/>
       </p:ext>
     </p:extLst>
   </p:cSld>
@@ -3911,36 +3244,6 @@
           <a:chExt cx="0" cy="0"/>
         </a:xfrm>
       </p:grpSpPr>
-      <p:pic>
-        <p:nvPicPr>
-          <p:cNvPr id="3" name="Picture 2" descr="Droplets-HD-Content-R1d.png"/>
-          <p:cNvPicPr>
-            <a:picLocks noChangeAspect="1"/>
-          </p:cNvPicPr>
-          <p:nvPr/>
-        </p:nvPicPr>
-        <p:blipFill>
-          <a:blip r:embed="rId2">
-            <a:extLst>
-              <a:ext uri="{28A0092B-C50C-407E-A947-70E740481C1C}">
-                <a14:useLocalDpi xmlns:a14="http://schemas.microsoft.com/office/drawing/2010/main" val="0"/>
-              </a:ext>
-            </a:extLst>
-          </a:blip>
-          <a:stretch>
-            <a:fillRect/>
-          </a:stretch>
-        </p:blipFill>
-        <p:spPr>
-          <a:xfrm>
-            <a:off x="0" y="0"/>
-            <a:ext cx="12192000" cy="6858000"/>
-          </a:xfrm>
-          <a:prstGeom prst="rect">
-            <a:avLst/>
-          </a:prstGeom>
-        </p:spPr>
-      </p:pic>
       <p:sp>
         <p:nvSpPr>
           <p:cNvPr id="2" name="Title 1"/>
@@ -3966,20 +3269,15 @@
       </p:sp>
       <p:sp>
         <p:nvSpPr>
-          <p:cNvPr id="12" name="Content Placeholder 2"/>
-          <p:cNvSpPr>
-            <a:spLocks noGrp="1"/>
-          </p:cNvSpPr>
-          <p:nvPr>
-            <p:ph sz="quarter" idx="13"/>
-          </p:nvPr>
-        </p:nvSpPr>
-        <p:spPr>
-          <a:xfrm>
-            <a:off x="913774" y="2367092"/>
-            <a:ext cx="10363826" cy="3424107"/>
-          </a:xfrm>
-        </p:spPr>
+          <p:cNvPr id="3" name="Content Placeholder 2"/>
+          <p:cNvSpPr>
+            <a:spLocks noGrp="1"/>
+          </p:cNvSpPr>
+          <p:nvPr>
+            <p:ph idx="1"/>
+          </p:nvPr>
+        </p:nvSpPr>
+        <p:spPr/>
         <p:txBody>
           <a:bodyPr/>
           <a:lstStyle/>
@@ -4039,7 +3337,7 @@
             <a:fld id="{48A87A34-81AB-432B-8DAE-1953F412C126}" type="datetimeFigureOut">
               <a:rPr lang="en-US" smtClean="0"/>
               <a:pPr/>
-              <a:t>9/26/2020</a:t>
+              <a:t>9/27/2020</a:t>
             </a:fld>
             <a:endParaRPr lang="en-US" dirty="0"/>
           </a:p>
@@ -4091,7 +3389,7 @@
     </p:spTree>
     <p:extLst>
       <p:ext uri="{BB962C8B-B14F-4D97-AF65-F5344CB8AC3E}">
-        <p14:creationId xmlns:p14="http://schemas.microsoft.com/office/powerpoint/2010/main" val="1678956452"/>
+        <p14:creationId xmlns:p14="http://schemas.microsoft.com/office/powerpoint/2010/main" val="1218239954"/>
       </p:ext>
     </p:extLst>
   </p:cSld>
@@ -4118,50 +3416,20 @@
           <a:chExt cx="0" cy="0"/>
         </a:xfrm>
       </p:grpSpPr>
-      <p:pic>
-        <p:nvPicPr>
-          <p:cNvPr id="9" name="Picture 8" descr="Droplets-HD-Content-R1d.png"/>
-          <p:cNvPicPr>
-            <a:picLocks noChangeAspect="1"/>
-          </p:cNvPicPr>
-          <p:nvPr/>
-        </p:nvPicPr>
-        <p:blipFill>
-          <a:blip r:embed="rId2">
-            <a:extLst>
-              <a:ext uri="{28A0092B-C50C-407E-A947-70E740481C1C}">
-                <a14:useLocalDpi xmlns:a14="http://schemas.microsoft.com/office/drawing/2010/main" val="0"/>
-              </a:ext>
-            </a:extLst>
-          </a:blip>
-          <a:stretch>
-            <a:fillRect/>
-          </a:stretch>
-        </p:blipFill>
+      <p:sp>
+        <p:nvSpPr>
+          <p:cNvPr id="2" name="Title 1"/>
+          <p:cNvSpPr>
+            <a:spLocks noGrp="1"/>
+          </p:cNvSpPr>
+          <p:nvPr>
+            <p:ph type="title"/>
+          </p:nvPr>
+        </p:nvSpPr>
         <p:spPr>
           <a:xfrm>
-            <a:off x="0" y="0"/>
-            <a:ext cx="12192000" cy="6858000"/>
-          </a:xfrm>
-          <a:prstGeom prst="rect">
-            <a:avLst/>
-          </a:prstGeom>
-        </p:spPr>
-      </p:pic>
-      <p:sp>
-        <p:nvSpPr>
-          <p:cNvPr id="2" name="Title 1"/>
-          <p:cNvSpPr>
-            <a:spLocks noGrp="1"/>
-          </p:cNvSpPr>
-          <p:nvPr>
-            <p:ph type="title"/>
-          </p:nvPr>
-        </p:nvSpPr>
-        <p:spPr>
-          <a:xfrm>
-            <a:off x="913774" y="828563"/>
-            <a:ext cx="10351752" cy="2736819"/>
+            <a:off x="1229244" y="657226"/>
+            <a:ext cx="9733512" cy="2852737"/>
           </a:xfrm>
         </p:spPr>
         <p:txBody>
@@ -4170,7 +3438,7 @@
           </a:bodyPr>
           <a:lstStyle>
             <a:lvl1pPr>
-              <a:defRPr sz="4000"/>
+              <a:defRPr sz="3400"/>
             </a:lvl1pPr>
           </a:lstStyle>
           <a:p>
@@ -4194,21 +3462,19 @@
         </p:nvSpPr>
         <p:spPr>
           <a:xfrm>
-            <a:off x="913774" y="3657457"/>
-            <a:ext cx="10351752" cy="1368183"/>
+            <a:off x="1229244" y="3602038"/>
+            <a:ext cx="9733512" cy="1500187"/>
           </a:xfrm>
         </p:spPr>
         <p:txBody>
-          <a:bodyPr>
-            <a:normAutofit/>
-          </a:bodyPr>
+          <a:bodyPr/>
           <a:lstStyle>
             <a:lvl1pPr marL="0" indent="0" algn="ctr">
               <a:buNone/>
-              <a:defRPr sz="2000">
+              <a:defRPr sz="2400">
                 <a:solidFill>
-                  <a:schemeClr val="bg1">
-                    <a:lumMod val="50000"/>
+                  <a:schemeClr val="tx1">
+                    <a:tint val="75000"/>
                   </a:schemeClr>
                 </a:solidFill>
               </a:defRPr>
@@ -4320,7 +3586,7 @@
           <a:p>
             <a:fld id="{48A87A34-81AB-432B-8DAE-1953F412C126}" type="datetimeFigureOut">
               <a:rPr lang="en-US" smtClean="0"/>
-              <a:t>9/26/2020</a:t>
+              <a:t>9/27/2020</a:t>
             </a:fld>
             <a:endParaRPr lang="en-US" dirty="0"/>
           </a:p>
@@ -4371,7 +3637,7 @@
     </p:spTree>
     <p:extLst>
       <p:ext uri="{BB962C8B-B14F-4D97-AF65-F5344CB8AC3E}">
-        <p14:creationId xmlns:p14="http://schemas.microsoft.com/office/powerpoint/2010/main" val="2856015609"/>
+        <p14:creationId xmlns:p14="http://schemas.microsoft.com/office/powerpoint/2010/main" val="3846685262"/>
       </p:ext>
     </p:extLst>
   </p:cSld>
@@ -4398,135 +3664,105 @@
           <a:chExt cx="0" cy="0"/>
         </a:xfrm>
       </p:grpSpPr>
-      <p:pic>
-        <p:nvPicPr>
-          <p:cNvPr id="10" name="Picture 9" descr="Droplets-HD-Content-R1d.png"/>
-          <p:cNvPicPr>
-            <a:picLocks noChangeAspect="1"/>
-          </p:cNvPicPr>
-          <p:nvPr/>
-        </p:nvPicPr>
-        <p:blipFill>
-          <a:blip r:embed="rId2">
-            <a:extLst>
-              <a:ext uri="{28A0092B-C50C-407E-A947-70E740481C1C}">
-                <a14:useLocalDpi xmlns:a14="http://schemas.microsoft.com/office/drawing/2010/main" val="0"/>
-              </a:ext>
-            </a:extLst>
-          </a:blip>
-          <a:stretch>
-            <a:fillRect/>
-          </a:stretch>
-        </p:blipFill>
+      <p:sp>
+        <p:nvSpPr>
+          <p:cNvPr id="2" name="Title 1"/>
+          <p:cNvSpPr>
+            <a:spLocks noGrp="1"/>
+          </p:cNvSpPr>
+          <p:nvPr>
+            <p:ph type="title"/>
+          </p:nvPr>
+        </p:nvSpPr>
         <p:spPr>
           <a:xfrm>
-            <a:off x="0" y="0"/>
-            <a:ext cx="12192000" cy="6858000"/>
+            <a:off x="913795" y="609600"/>
+            <a:ext cx="10353761" cy="1326321"/>
           </a:xfrm>
-          <a:prstGeom prst="rect">
-            <a:avLst/>
-          </a:prstGeom>
         </p:spPr>
-      </p:pic>
-      <p:sp>
-        <p:nvSpPr>
-          <p:cNvPr id="14" name="Title 1"/>
-          <p:cNvSpPr>
-            <a:spLocks noGrp="1"/>
-          </p:cNvSpPr>
-          <p:nvPr>
-            <p:ph type="title"/>
+        <p:txBody>
+          <a:bodyPr/>
+          <a:lstStyle/>
+          <a:p>
+            <a:r>
+              <a:rPr lang="en-US"/>
+              <a:t>Click to edit Master title style</a:t>
+            </a:r>
+            <a:endParaRPr lang="en-US" dirty="0"/>
+          </a:p>
+        </p:txBody>
+      </p:sp>
+      <p:sp>
+        <p:nvSpPr>
+          <p:cNvPr id="3" name="Content Placeholder 2"/>
+          <p:cNvSpPr>
+            <a:spLocks noGrp="1"/>
+          </p:cNvSpPr>
+          <p:nvPr>
+            <p:ph sz="half" idx="1"/>
           </p:nvPr>
         </p:nvSpPr>
         <p:spPr>
           <a:xfrm>
-            <a:off x="913775" y="618517"/>
-            <a:ext cx="10364451" cy="1596177"/>
+            <a:off x="913795" y="2088319"/>
+            <a:ext cx="5106004" cy="3702881"/>
           </a:xfrm>
         </p:spPr>
         <p:txBody>
           <a:bodyPr/>
           <a:lstStyle/>
           <a:p>
-            <a:r>
-              <a:rPr lang="en-US"/>
-              <a:t>Click to edit Master title style</a:t>
-            </a:r>
-            <a:endParaRPr lang="en-US" dirty="0"/>
-          </a:p>
-        </p:txBody>
-      </p:sp>
-      <p:sp>
-        <p:nvSpPr>
-          <p:cNvPr id="12" name="Content Placeholder 2"/>
-          <p:cNvSpPr>
-            <a:spLocks noGrp="1"/>
-          </p:cNvSpPr>
-          <p:nvPr>
-            <p:ph sz="quarter" idx="13"/>
+            <a:pPr lvl="0"/>
+            <a:r>
+              <a:rPr lang="en-US"/>
+              <a:t>Click to edit Master text styles</a:t>
+            </a:r>
+          </a:p>
+          <a:p>
+            <a:pPr lvl="1"/>
+            <a:r>
+              <a:rPr lang="en-US"/>
+              <a:t>Second level</a:t>
+            </a:r>
+          </a:p>
+          <a:p>
+            <a:pPr lvl="2"/>
+            <a:r>
+              <a:rPr lang="en-US"/>
+              <a:t>Third level</a:t>
+            </a:r>
+          </a:p>
+          <a:p>
+            <a:pPr lvl="3"/>
+            <a:r>
+              <a:rPr lang="en-US"/>
+              <a:t>Fourth level</a:t>
+            </a:r>
+          </a:p>
+          <a:p>
+            <a:pPr lvl="4"/>
+            <a:r>
+              <a:rPr lang="en-US"/>
+              <a:t>Fifth level</a:t>
+            </a:r>
+            <a:endParaRPr lang="en-US" dirty="0"/>
+          </a:p>
+        </p:txBody>
+      </p:sp>
+      <p:sp>
+        <p:nvSpPr>
+          <p:cNvPr id="4" name="Content Placeholder 3"/>
+          <p:cNvSpPr>
+            <a:spLocks noGrp="1"/>
+          </p:cNvSpPr>
+          <p:nvPr>
+            <p:ph sz="half" idx="2"/>
           </p:nvPr>
         </p:nvSpPr>
         <p:spPr>
           <a:xfrm>
-            <a:off x="913774" y="2367092"/>
-            <a:ext cx="5106026" cy="3424107"/>
-          </a:xfrm>
-        </p:spPr>
-        <p:txBody>
-          <a:bodyPr/>
-          <a:lstStyle/>
-          <a:p>
-            <a:pPr lvl="0"/>
-            <a:r>
-              <a:rPr lang="en-US"/>
-              <a:t>Click to edit Master text styles</a:t>
-            </a:r>
-          </a:p>
-          <a:p>
-            <a:pPr lvl="1"/>
-            <a:r>
-              <a:rPr lang="en-US"/>
-              <a:t>Second level</a:t>
-            </a:r>
-          </a:p>
-          <a:p>
-            <a:pPr lvl="2"/>
-            <a:r>
-              <a:rPr lang="en-US"/>
-              <a:t>Third level</a:t>
-            </a:r>
-          </a:p>
-          <a:p>
-            <a:pPr lvl="3"/>
-            <a:r>
-              <a:rPr lang="en-US"/>
-              <a:t>Fourth level</a:t>
-            </a:r>
-          </a:p>
-          <a:p>
-            <a:pPr lvl="4"/>
-            <a:r>
-              <a:rPr lang="en-US"/>
-              <a:t>Fifth level</a:t>
-            </a:r>
-            <a:endParaRPr lang="en-US" dirty="0"/>
-          </a:p>
-        </p:txBody>
-      </p:sp>
-      <p:sp>
-        <p:nvSpPr>
-          <p:cNvPr id="13" name="Content Placeholder 3"/>
-          <p:cNvSpPr>
-            <a:spLocks noGrp="1"/>
-          </p:cNvSpPr>
-          <p:nvPr>
-            <p:ph sz="quarter" idx="14"/>
-          </p:nvPr>
-        </p:nvSpPr>
-        <p:spPr>
-          <a:xfrm>
-            <a:off x="6172200" y="2367092"/>
-            <a:ext cx="5105400" cy="3424107"/>
+            <a:off x="6173403" y="2088319"/>
+            <a:ext cx="5094154" cy="3702881"/>
           </a:xfrm>
         </p:spPr>
         <p:txBody>
@@ -4588,7 +3824,7 @@
             <a:fld id="{48A87A34-81AB-432B-8DAE-1953F412C126}" type="datetimeFigureOut">
               <a:rPr lang="en-US" smtClean="0"/>
               <a:pPr/>
-              <a:t>9/26/2020</a:t>
+              <a:t>9/27/2020</a:t>
             </a:fld>
             <a:endParaRPr lang="en-US" dirty="0"/>
           </a:p>
@@ -4640,7 +3876,7 @@
     </p:spTree>
     <p:extLst>
       <p:ext uri="{BB962C8B-B14F-4D97-AF65-F5344CB8AC3E}">
-        <p14:creationId xmlns:p14="http://schemas.microsoft.com/office/powerpoint/2010/main" val="271845349"/>
+        <p14:creationId xmlns:p14="http://schemas.microsoft.com/office/powerpoint/2010/main" val="4257203278"/>
       </p:ext>
     </p:extLst>
   </p:cSld>
@@ -4667,95 +3903,59 @@
           <a:chExt cx="0" cy="0"/>
         </a:xfrm>
       </p:grpSpPr>
-      <p:pic>
-        <p:nvPicPr>
-          <p:cNvPr id="15" name="Picture 14" descr="Droplets-HD-Content-R1d.png"/>
-          <p:cNvPicPr>
-            <a:picLocks noChangeAspect="1"/>
-          </p:cNvPicPr>
-          <p:nvPr/>
-        </p:nvPicPr>
-        <p:blipFill>
-          <a:blip r:embed="rId2">
-            <a:extLst>
-              <a:ext uri="{28A0092B-C50C-407E-A947-70E740481C1C}">
-                <a14:useLocalDpi xmlns:a14="http://schemas.microsoft.com/office/drawing/2010/main" val="0"/>
-              </a:ext>
-            </a:extLst>
-          </a:blip>
-          <a:stretch>
-            <a:fillRect/>
-          </a:stretch>
-        </p:blipFill>
+      <p:sp>
+        <p:nvSpPr>
+          <p:cNvPr id="2" name="Title 1"/>
+          <p:cNvSpPr>
+            <a:spLocks noGrp="1"/>
+          </p:cNvSpPr>
+          <p:nvPr>
+            <p:ph type="title"/>
+          </p:nvPr>
+        </p:nvSpPr>
         <p:spPr>
           <a:xfrm>
-            <a:off x="0" y="0"/>
-            <a:ext cx="12192000" cy="6858000"/>
+            <a:off x="913795" y="609600"/>
+            <a:ext cx="10353761" cy="1325563"/>
           </a:xfrm>
-          <a:prstGeom prst="rect">
-            <a:avLst/>
-          </a:prstGeom>
         </p:spPr>
-      </p:pic>
-      <p:sp>
-        <p:nvSpPr>
-          <p:cNvPr id="14" name="Title 1"/>
-          <p:cNvSpPr>
-            <a:spLocks noGrp="1"/>
-          </p:cNvSpPr>
-          <p:nvPr>
-            <p:ph type="title"/>
+        <p:txBody>
+          <a:bodyPr/>
+          <a:lstStyle/>
+          <a:p>
+            <a:r>
+              <a:rPr lang="en-US"/>
+              <a:t>Click to edit Master title style</a:t>
+            </a:r>
+            <a:endParaRPr lang="en-US" dirty="0"/>
+          </a:p>
+        </p:txBody>
+      </p:sp>
+      <p:sp>
+        <p:nvSpPr>
+          <p:cNvPr id="3" name="Text Placeholder 2"/>
+          <p:cNvSpPr>
+            <a:spLocks noGrp="1"/>
+          </p:cNvSpPr>
+          <p:nvPr>
+            <p:ph type="body" idx="1"/>
           </p:nvPr>
         </p:nvSpPr>
         <p:spPr>
           <a:xfrm>
-            <a:off x="913775" y="618517"/>
-            <a:ext cx="10364451" cy="1596177"/>
+            <a:off x="1141804" y="2088320"/>
+            <a:ext cx="4879199" cy="823912"/>
           </a:xfrm>
         </p:spPr>
         <p:txBody>
-          <a:bodyPr/>
-          <a:lstStyle/>
-          <a:p>
-            <a:r>
-              <a:rPr lang="en-US"/>
-              <a:t>Click to edit Master title style</a:t>
-            </a:r>
-            <a:endParaRPr lang="en-US" dirty="0"/>
-          </a:p>
-        </p:txBody>
-      </p:sp>
-      <p:sp>
-        <p:nvSpPr>
-          <p:cNvPr id="3" name="Text Placeholder 2"/>
-          <p:cNvSpPr>
-            <a:spLocks noGrp="1"/>
-          </p:cNvSpPr>
-          <p:nvPr>
-            <p:ph type="body" idx="1"/>
-          </p:nvPr>
-        </p:nvSpPr>
-        <p:spPr>
-          <a:xfrm>
-            <a:off x="1146328" y="2371018"/>
-            <a:ext cx="4873474" cy="679994"/>
-          </a:xfrm>
-        </p:spPr>
-        <p:txBody>
-          <a:bodyPr anchor="b">
-            <a:noAutofit/>
-          </a:bodyPr>
+          <a:bodyPr anchor="b"/>
           <a:lstStyle>
             <a:lvl1pPr marL="0" indent="0">
               <a:lnSpc>
-                <a:spcPct val="85000"/>
+                <a:spcPct val="100000"/>
               </a:lnSpc>
               <a:buNone/>
-              <a:defRPr sz="2600" b="0">
-                <a:solidFill>
-                  <a:schemeClr val="tx1"/>
-                </a:solidFill>
-              </a:defRPr>
+              <a:defRPr sz="2400" b="1"/>
             </a:lvl1pPr>
             <a:lvl2pPr marL="457200" indent="0">
               <a:buNone/>
@@ -4801,18 +4001,18 @@
       </p:sp>
       <p:sp>
         <p:nvSpPr>
-          <p:cNvPr id="12" name="Content Placeholder 3"/>
-          <p:cNvSpPr>
-            <a:spLocks noGrp="1"/>
-          </p:cNvSpPr>
-          <p:nvPr>
-            <p:ph sz="quarter" idx="13"/>
+          <p:cNvPr id="4" name="Content Placeholder 3"/>
+          <p:cNvSpPr>
+            <a:spLocks noGrp="1"/>
+          </p:cNvSpPr>
+          <p:nvPr>
+            <p:ph sz="half" idx="2"/>
           </p:nvPr>
         </p:nvSpPr>
         <p:spPr>
           <a:xfrm>
-            <a:off x="913774" y="3051012"/>
-            <a:ext cx="5106027" cy="2740187"/>
+            <a:off x="913795" y="2912232"/>
+            <a:ext cx="5107208" cy="2878968"/>
           </a:xfrm>
         </p:spPr>
         <p:txBody>
@@ -4868,25 +4068,19 @@
         </p:nvSpPr>
         <p:spPr>
           <a:xfrm>
-            <a:off x="6396423" y="2371018"/>
-            <a:ext cx="4881804" cy="679994"/>
+            <a:off x="6402003" y="2088320"/>
+            <a:ext cx="4865554" cy="823912"/>
           </a:xfrm>
         </p:spPr>
         <p:txBody>
-          <a:bodyPr anchor="b">
-            <a:noAutofit/>
-          </a:bodyPr>
+          <a:bodyPr anchor="b"/>
           <a:lstStyle>
             <a:lvl1pPr marL="0" indent="0">
               <a:lnSpc>
-                <a:spcPct val="85000"/>
+                <a:spcPct val="100000"/>
               </a:lnSpc>
               <a:buNone/>
-              <a:defRPr sz="2600" b="0">
-                <a:solidFill>
-                  <a:schemeClr val="tx1"/>
-                </a:solidFill>
-              </a:defRPr>
+              <a:defRPr sz="2400" b="1"/>
             </a:lvl1pPr>
             <a:lvl2pPr marL="457200" indent="0">
               <a:buNone/>
@@ -4932,18 +4126,18 @@
       </p:sp>
       <p:sp>
         <p:nvSpPr>
-          <p:cNvPr id="13" name="Content Placeholder 5"/>
-          <p:cNvSpPr>
-            <a:spLocks noGrp="1"/>
-          </p:cNvSpPr>
-          <p:nvPr>
-            <p:ph sz="quarter" idx="14"/>
+          <p:cNvPr id="6" name="Content Placeholder 5"/>
+          <p:cNvSpPr>
+            <a:spLocks noGrp="1"/>
+          </p:cNvSpPr>
+          <p:nvPr>
+            <p:ph sz="quarter" idx="4"/>
           </p:nvPr>
         </p:nvSpPr>
         <p:spPr>
           <a:xfrm>
-            <a:off x="6172200" y="3051012"/>
-            <a:ext cx="5105401" cy="2740187"/>
+            <a:off x="6172200" y="2912232"/>
+            <a:ext cx="5095357" cy="2878968"/>
           </a:xfrm>
         </p:spPr>
         <p:txBody>
@@ -5005,7 +4199,7 @@
             <a:fld id="{48A87A34-81AB-432B-8DAE-1953F412C126}" type="datetimeFigureOut">
               <a:rPr lang="en-US" smtClean="0"/>
               <a:pPr/>
-              <a:t>9/26/2020</a:t>
+              <a:t>9/27/2020</a:t>
             </a:fld>
             <a:endParaRPr lang="en-US" dirty="0"/>
           </a:p>
@@ -5057,7 +4251,7 @@
     </p:spTree>
     <p:extLst>
       <p:ext uri="{BB962C8B-B14F-4D97-AF65-F5344CB8AC3E}">
-        <p14:creationId xmlns:p14="http://schemas.microsoft.com/office/powerpoint/2010/main" val="3161954005"/>
+        <p14:creationId xmlns:p14="http://schemas.microsoft.com/office/powerpoint/2010/main" val="821882546"/>
       </p:ext>
     </p:extLst>
   </p:cSld>
@@ -5084,36 +4278,6 @@
           <a:chExt cx="0" cy="0"/>
         </a:xfrm>
       </p:grpSpPr>
-      <p:pic>
-        <p:nvPicPr>
-          <p:cNvPr id="8" name="Picture 7" descr="Droplets-HD-Content-R1d.png"/>
-          <p:cNvPicPr>
-            <a:picLocks noChangeAspect="1"/>
-          </p:cNvPicPr>
-          <p:nvPr/>
-        </p:nvPicPr>
-        <p:blipFill>
-          <a:blip r:embed="rId2">
-            <a:extLst>
-              <a:ext uri="{28A0092B-C50C-407E-A947-70E740481C1C}">
-                <a14:useLocalDpi xmlns:a14="http://schemas.microsoft.com/office/drawing/2010/main" val="0"/>
-              </a:ext>
-            </a:extLst>
-          </a:blip>
-          <a:stretch>
-            <a:fillRect/>
-          </a:stretch>
-        </p:blipFill>
-        <p:spPr>
-          <a:xfrm>
-            <a:off x="0" y="0"/>
-            <a:ext cx="12192000" cy="6858000"/>
-          </a:xfrm>
-          <a:prstGeom prst="rect">
-            <a:avLst/>
-          </a:prstGeom>
-        </p:spPr>
-      </p:pic>
       <p:sp>
         <p:nvSpPr>
           <p:cNvPr id="2" name="Title 1"/>
@@ -5154,7 +4318,7 @@
           <a:p>
             <a:fld id="{48A87A34-81AB-432B-8DAE-1953F412C126}" type="datetimeFigureOut">
               <a:rPr lang="en-US" smtClean="0"/>
-              <a:t>9/26/2020</a:t>
+              <a:t>9/27/2020</a:t>
             </a:fld>
             <a:endParaRPr lang="en-US" dirty="0"/>
           </a:p>
@@ -5205,7 +4369,7 @@
     </p:spTree>
     <p:extLst>
       <p:ext uri="{BB962C8B-B14F-4D97-AF65-F5344CB8AC3E}">
-        <p14:creationId xmlns:p14="http://schemas.microsoft.com/office/powerpoint/2010/main" val="1453765121"/>
+        <p14:creationId xmlns:p14="http://schemas.microsoft.com/office/powerpoint/2010/main" val="1787810487"/>
       </p:ext>
     </p:extLst>
   </p:cSld>
@@ -5232,36 +4396,6 @@
           <a:chExt cx="0" cy="0"/>
         </a:xfrm>
       </p:grpSpPr>
-      <p:pic>
-        <p:nvPicPr>
-          <p:cNvPr id="7" name="Picture 6" descr="Droplets-HD-Content-R1d.png"/>
-          <p:cNvPicPr>
-            <a:picLocks noChangeAspect="1"/>
-          </p:cNvPicPr>
-          <p:nvPr/>
-        </p:nvPicPr>
-        <p:blipFill>
-          <a:blip r:embed="rId2">
-            <a:extLst>
-              <a:ext uri="{28A0092B-C50C-407E-A947-70E740481C1C}">
-                <a14:useLocalDpi xmlns:a14="http://schemas.microsoft.com/office/drawing/2010/main" val="0"/>
-              </a:ext>
-            </a:extLst>
-          </a:blip>
-          <a:stretch>
-            <a:fillRect/>
-          </a:stretch>
-        </p:blipFill>
-        <p:spPr>
-          <a:xfrm>
-            <a:off x="0" y="0"/>
-            <a:ext cx="12192000" cy="6858000"/>
-          </a:xfrm>
-          <a:prstGeom prst="rect">
-            <a:avLst/>
-          </a:prstGeom>
-        </p:spPr>
-      </p:pic>
       <p:sp>
         <p:nvSpPr>
           <p:cNvPr id="2" name="Date Placeholder 1"/>
@@ -5279,7 +4413,7 @@
           <a:p>
             <a:fld id="{48A87A34-81AB-432B-8DAE-1953F412C126}" type="datetimeFigureOut">
               <a:rPr lang="en-US" smtClean="0"/>
-              <a:t>9/26/2020</a:t>
+              <a:t>9/27/2020</a:t>
             </a:fld>
             <a:endParaRPr lang="en-US" dirty="0"/>
           </a:p>
@@ -5330,7 +4464,7 @@
     </p:spTree>
     <p:extLst>
       <p:ext uri="{BB962C8B-B14F-4D97-AF65-F5344CB8AC3E}">
-        <p14:creationId xmlns:p14="http://schemas.microsoft.com/office/powerpoint/2010/main" val="3824456261"/>
+        <p14:creationId xmlns:p14="http://schemas.microsoft.com/office/powerpoint/2010/main" val="3629809316"/>
       </p:ext>
     </p:extLst>
   </p:cSld>
@@ -5357,139 +4491,111 @@
           <a:chExt cx="0" cy="0"/>
         </a:xfrm>
       </p:grpSpPr>
-      <p:pic>
-        <p:nvPicPr>
-          <p:cNvPr id="11" name="Picture 10" descr="Droplets-HD-Content-R1d.png"/>
-          <p:cNvPicPr>
-            <a:picLocks noChangeAspect="1"/>
-          </p:cNvPicPr>
-          <p:nvPr/>
-        </p:nvPicPr>
-        <p:blipFill>
-          <a:blip r:embed="rId2">
-            <a:extLst>
-              <a:ext uri="{28A0092B-C50C-407E-A947-70E740481C1C}">
-                <a14:useLocalDpi xmlns:a14="http://schemas.microsoft.com/office/drawing/2010/main" val="0"/>
-              </a:ext>
-            </a:extLst>
-          </a:blip>
-          <a:stretch>
-            <a:fillRect/>
-          </a:stretch>
-        </p:blipFill>
+      <p:sp>
+        <p:nvSpPr>
+          <p:cNvPr id="2" name="Title 1"/>
+          <p:cNvSpPr>
+            <a:spLocks noGrp="1"/>
+          </p:cNvSpPr>
+          <p:nvPr>
+            <p:ph type="title"/>
+          </p:nvPr>
+        </p:nvSpPr>
         <p:spPr>
           <a:xfrm>
-            <a:off x="0" y="0"/>
-            <a:ext cx="12192000" cy="6858000"/>
+            <a:off x="917228" y="609600"/>
+            <a:ext cx="3932237" cy="2362200"/>
           </a:xfrm>
-          <a:prstGeom prst="rect">
-            <a:avLst/>
-          </a:prstGeom>
         </p:spPr>
-      </p:pic>
-      <p:sp>
-        <p:nvSpPr>
-          <p:cNvPr id="2" name="Title 1"/>
-          <p:cNvSpPr>
-            <a:spLocks noGrp="1"/>
-          </p:cNvSpPr>
-          <p:nvPr>
-            <p:ph type="title"/>
+        <p:txBody>
+          <a:bodyPr anchor="b">
+            <a:normAutofit/>
+          </a:bodyPr>
+          <a:lstStyle>
+            <a:lvl1pPr>
+              <a:defRPr sz="2800"/>
+            </a:lvl1pPr>
+          </a:lstStyle>
+          <a:p>
+            <a:r>
+              <a:rPr lang="en-US"/>
+              <a:t>Click to edit Master title style</a:t>
+            </a:r>
+            <a:endParaRPr lang="en-US" dirty="0"/>
+          </a:p>
+        </p:txBody>
+      </p:sp>
+      <p:sp>
+        <p:nvSpPr>
+          <p:cNvPr id="3" name="Content Placeholder 2"/>
+          <p:cNvSpPr>
+            <a:spLocks noGrp="1"/>
+          </p:cNvSpPr>
+          <p:nvPr>
+            <p:ph idx="1"/>
           </p:nvPr>
         </p:nvSpPr>
         <p:spPr>
           <a:xfrm>
-            <a:off x="913775" y="609600"/>
-            <a:ext cx="3935688" cy="2023252"/>
+            <a:off x="5078064" y="609600"/>
+            <a:ext cx="6189492" cy="5181600"/>
           </a:xfrm>
         </p:spPr>
         <p:txBody>
-          <a:bodyPr anchor="b"/>
-          <a:lstStyle>
-            <a:lvl1pPr algn="ctr">
-              <a:defRPr sz="3200"/>
-            </a:lvl1pPr>
-          </a:lstStyle>
-          <a:p>
-            <a:r>
-              <a:rPr lang="en-US"/>
-              <a:t>Click to edit Master title style</a:t>
-            </a:r>
-            <a:endParaRPr lang="en-US" dirty="0"/>
-          </a:p>
-        </p:txBody>
-      </p:sp>
-      <p:sp>
-        <p:nvSpPr>
-          <p:cNvPr id="10" name="Content Placeholder 2"/>
-          <p:cNvSpPr>
-            <a:spLocks noGrp="1"/>
-          </p:cNvSpPr>
-          <p:nvPr>
-            <p:ph sz="quarter" idx="13"/>
+          <a:bodyPr anchor="ctr"/>
+          <a:lstStyle/>
+          <a:p>
+            <a:pPr lvl="0"/>
+            <a:r>
+              <a:rPr lang="en-US"/>
+              <a:t>Click to edit Master text styles</a:t>
+            </a:r>
+          </a:p>
+          <a:p>
+            <a:pPr lvl="1"/>
+            <a:r>
+              <a:rPr lang="en-US"/>
+              <a:t>Second level</a:t>
+            </a:r>
+          </a:p>
+          <a:p>
+            <a:pPr lvl="2"/>
+            <a:r>
+              <a:rPr lang="en-US"/>
+              <a:t>Third level</a:t>
+            </a:r>
+          </a:p>
+          <a:p>
+            <a:pPr lvl="3"/>
+            <a:r>
+              <a:rPr lang="en-US"/>
+              <a:t>Fourth level</a:t>
+            </a:r>
+          </a:p>
+          <a:p>
+            <a:pPr lvl="4"/>
+            <a:r>
+              <a:rPr lang="en-US"/>
+              <a:t>Fifth level</a:t>
+            </a:r>
+            <a:endParaRPr lang="en-US" dirty="0"/>
+          </a:p>
+        </p:txBody>
+      </p:sp>
+      <p:sp>
+        <p:nvSpPr>
+          <p:cNvPr id="4" name="Text Placeholder 3"/>
+          <p:cNvSpPr>
+            <a:spLocks noGrp="1"/>
+          </p:cNvSpPr>
+          <p:nvPr>
+            <p:ph type="body" sz="half" idx="2"/>
           </p:nvPr>
         </p:nvSpPr>
         <p:spPr>
           <a:xfrm>
-            <a:off x="5078062" y="609600"/>
-            <a:ext cx="6200163" cy="5181599"/>
-          </a:xfrm>
-        </p:spPr>
-        <p:txBody>
-          <a:bodyPr/>
-          <a:lstStyle/>
-          <a:p>
-            <a:pPr lvl="0"/>
-            <a:r>
-              <a:rPr lang="en-US"/>
-              <a:t>Click to edit Master text styles</a:t>
-            </a:r>
-          </a:p>
-          <a:p>
-            <a:pPr lvl="1"/>
-            <a:r>
-              <a:rPr lang="en-US"/>
-              <a:t>Second level</a:t>
-            </a:r>
-          </a:p>
-          <a:p>
-            <a:pPr lvl="2"/>
-            <a:r>
-              <a:rPr lang="en-US"/>
-              <a:t>Third level</a:t>
-            </a:r>
-          </a:p>
-          <a:p>
-            <a:pPr lvl="3"/>
-            <a:r>
-              <a:rPr lang="en-US"/>
-              <a:t>Fourth level</a:t>
-            </a:r>
-          </a:p>
-          <a:p>
-            <a:pPr lvl="4"/>
-            <a:r>
-              <a:rPr lang="en-US"/>
-              <a:t>Fifth level</a:t>
-            </a:r>
-            <a:endParaRPr lang="en-US" dirty="0"/>
-          </a:p>
-        </p:txBody>
-      </p:sp>
-      <p:sp>
-        <p:nvSpPr>
-          <p:cNvPr id="4" name="Text Placeholder 3"/>
-          <p:cNvSpPr>
-            <a:spLocks noGrp="1"/>
-          </p:cNvSpPr>
-          <p:nvPr>
-            <p:ph type="body" sz="half" idx="2"/>
-          </p:nvPr>
-        </p:nvSpPr>
-        <p:spPr>
-          <a:xfrm>
-            <a:off x="913774" y="2632852"/>
-            <a:ext cx="3935689" cy="3158348"/>
+            <a:off x="917228" y="2971800"/>
+            <a:ext cx="3932237" cy="2819399"/>
           </a:xfrm>
         </p:spPr>
         <p:txBody>
@@ -5559,7 +4665,7 @@
             <a:fld id="{48A87A34-81AB-432B-8DAE-1953F412C126}" type="datetimeFigureOut">
               <a:rPr lang="en-US" smtClean="0"/>
               <a:pPr/>
-              <a:t>9/26/2020</a:t>
+              <a:t>9/27/2020</a:t>
             </a:fld>
             <a:endParaRPr lang="en-US" dirty="0"/>
           </a:p>
@@ -5611,7 +4717,7 @@
     </p:spTree>
     <p:extLst>
       <p:ext uri="{BB962C8B-B14F-4D97-AF65-F5344CB8AC3E}">
-        <p14:creationId xmlns:p14="http://schemas.microsoft.com/office/powerpoint/2010/main" val="822860054"/>
+        <p14:creationId xmlns:p14="http://schemas.microsoft.com/office/powerpoint/2010/main" val="1695046733"/>
       </p:ext>
     </p:extLst>
   </p:cSld>
@@ -5638,56 +4744,28 @@
           <a:chExt cx="0" cy="0"/>
         </a:xfrm>
       </p:grpSpPr>
-      <p:pic>
-        <p:nvPicPr>
-          <p:cNvPr id="10" name="Picture 9" descr="Droplets-HD-Content-R1d.png"/>
-          <p:cNvPicPr>
-            <a:picLocks noChangeAspect="1"/>
-          </p:cNvPicPr>
-          <p:nvPr/>
-        </p:nvPicPr>
-        <p:blipFill>
-          <a:blip r:embed="rId2">
-            <a:extLst>
-              <a:ext uri="{28A0092B-C50C-407E-A947-70E740481C1C}">
-                <a14:useLocalDpi xmlns:a14="http://schemas.microsoft.com/office/drawing/2010/main" val="0"/>
-              </a:ext>
-            </a:extLst>
-          </a:blip>
-          <a:stretch>
-            <a:fillRect/>
-          </a:stretch>
-        </p:blipFill>
+      <p:sp>
+        <p:nvSpPr>
+          <p:cNvPr id="2" name="Title 1"/>
+          <p:cNvSpPr>
+            <a:spLocks noGrp="1"/>
+          </p:cNvSpPr>
+          <p:nvPr>
+            <p:ph type="title"/>
+          </p:nvPr>
+        </p:nvSpPr>
         <p:spPr>
           <a:xfrm>
-            <a:off x="0" y="0"/>
-            <a:ext cx="12192000" cy="6858000"/>
-          </a:xfrm>
-          <a:prstGeom prst="rect">
-            <a:avLst/>
-          </a:prstGeom>
-        </p:spPr>
-      </p:pic>
-      <p:sp>
-        <p:nvSpPr>
-          <p:cNvPr id="2" name="Title 1"/>
-          <p:cNvSpPr>
-            <a:spLocks noGrp="1"/>
-          </p:cNvSpPr>
-          <p:nvPr>
-            <p:ph type="title"/>
-          </p:nvPr>
-        </p:nvSpPr>
-        <p:spPr>
-          <a:xfrm>
-            <a:off x="913774" y="609600"/>
-            <a:ext cx="5934969" cy="2023254"/>
+            <a:off x="917227" y="609600"/>
+            <a:ext cx="5929773" cy="2362200"/>
           </a:xfrm>
         </p:spPr>
         <p:txBody>
-          <a:bodyPr anchor="b"/>
+          <a:bodyPr anchor="b">
+            <a:normAutofit/>
+          </a:bodyPr>
           <a:lstStyle>
-            <a:lvl1pPr algn="ctr">
+            <a:lvl1pPr>
               <a:defRPr sz="3200"/>
             </a:lvl1pPr>
           </a:lstStyle>
@@ -5712,39 +4790,40 @@
         </p:nvSpPr>
         <p:spPr>
           <a:xfrm>
-            <a:off x="7424803" y="609601"/>
-            <a:ext cx="3255358" cy="5181600"/>
+            <a:off x="7424804" y="758881"/>
+            <a:ext cx="3255356" cy="4883038"/>
           </a:xfrm>
-          <a:prstGeom prst="roundRect">
-            <a:avLst>
-              <a:gd name="adj" fmla="val 4943"/>
-            </a:avLst>
-          </a:prstGeom>
           <a:noFill/>
-          <a:ln w="82550" cap="sq">
+          <a:ln w="190500" cap="sq">
             <a:solidFill>
-              <a:srgbClr val="EAEAEA"/>
+              <a:srgbClr val="FFFFFF"/>
             </a:solidFill>
             <a:miter lim="800000"/>
           </a:ln>
-          <a:effectLst/>
+          <a:effectLst>
+            <a:outerShdw blurRad="55000" dist="18000" dir="5400000" algn="tl" rotWithShape="0">
+              <a:srgbClr val="000000">
+                <a:alpha val="40000"/>
+              </a:srgbClr>
+            </a:outerShdw>
+          </a:effectLst>
           <a:scene3d>
             <a:camera prst="orthographicFront"/>
-            <a:lightRig rig="threePt" dir="t">
-              <a:rot lat="0" lon="0" rev="2700000"/>
+            <a:lightRig rig="twoPt" dir="t">
+              <a:rot lat="0" lon="0" rev="7200000"/>
             </a:lightRig>
           </a:scene3d>
-          <a:sp3d contourW="6350">
-            <a:bevelT h="38100"/>
+          <a:sp3d>
+            <a:bevelT w="25400" h="19050"/>
             <a:contourClr>
-              <a:srgbClr val="C0C0C0"/>
+              <a:srgbClr val="FFFFFF"/>
             </a:contourClr>
           </a:sp3d>
         </p:spPr>
         <p:txBody>
           <a:bodyPr anchor="t"/>
           <a:lstStyle>
-            <a:lvl1pPr marL="0" indent="0">
+            <a:lvl1pPr marL="0" indent="0" algn="ctr">
               <a:buNone/>
               <a:defRPr sz="3200"/>
             </a:lvl1pPr>
@@ -5802,16 +4881,18 @@
         </p:nvSpPr>
         <p:spPr>
           <a:xfrm>
-            <a:off x="913794" y="2632852"/>
-            <a:ext cx="5934949" cy="3158347"/>
+            <a:off x="913794" y="2971800"/>
+            <a:ext cx="5934950" cy="2819400"/>
           </a:xfrm>
         </p:spPr>
         <p:txBody>
-          <a:bodyPr/>
+          <a:bodyPr>
+            <a:normAutofit/>
+          </a:bodyPr>
           <a:lstStyle>
             <a:lvl1pPr marL="0" indent="0" algn="ctr">
               <a:buNone/>
-              <a:defRPr sz="1600"/>
+              <a:defRPr sz="1800"/>
             </a:lvl1pPr>
             <a:lvl2pPr marL="457200" indent="0">
               <a:buNone/>
@@ -5872,7 +4953,7 @@
           <a:p>
             <a:fld id="{48A87A34-81AB-432B-8DAE-1953F412C126}" type="datetimeFigureOut">
               <a:rPr lang="en-US" smtClean="0"/>
-              <a:t>9/26/2020</a:t>
+              <a:t>9/27/2020</a:t>
             </a:fld>
             <a:endParaRPr lang="en-US" dirty="0"/>
           </a:p>
@@ -5923,7 +5004,7 @@
     </p:spTree>
     <p:extLst>
       <p:ext uri="{BB962C8B-B14F-4D97-AF65-F5344CB8AC3E}">
-        <p14:creationId xmlns:p14="http://schemas.microsoft.com/office/powerpoint/2010/main" val="2209383613"/>
+        <p14:creationId xmlns:p14="http://schemas.microsoft.com/office/powerpoint/2010/main" val="3672542773"/>
       </p:ext>
     </p:extLst>
   </p:cSld>
@@ -5937,8 +5018,8 @@
 <p:sldMaster xmlns:a="http://schemas.openxmlformats.org/drawingml/2006/main" xmlns:r="http://schemas.openxmlformats.org/officeDocument/2006/relationships" xmlns:p="http://schemas.openxmlformats.org/presentationml/2006/main">
   <p:cSld>
     <p:bg>
-      <p:bgRef idx="1002">
-        <a:schemeClr val="bg1"/>
+      <p:bgRef idx="1003">
+        <a:schemeClr val="bg2"/>
       </p:bgRef>
     </p:bg>
     <p:spTree>
@@ -5955,48 +5036,6 @@
           <a:chExt cx="0" cy="0"/>
         </a:xfrm>
       </p:grpSpPr>
-      <p:pic>
-        <p:nvPicPr>
-          <p:cNvPr id="1026" name="Picture 2" descr="\\DROBO-FS\QuickDrops\JB\PPTX NG\Droplets\LightingOverlay.png"/>
-          <p:cNvPicPr>
-            <a:picLocks noChangeAspect="1" noChangeArrowheads="1"/>
-          </p:cNvPicPr>
-          <p:nvPr/>
-        </p:nvPicPr>
-        <p:blipFill>
-          <a:blip r:embed="rId21">
-            <a:alphaModFix/>
-            <a:extLst>
-              <a:ext uri="{28A0092B-C50C-407E-A947-70E740481C1C}">
-                <a14:useLocalDpi xmlns:a14="http://schemas.microsoft.com/office/drawing/2010/main" val="0"/>
-              </a:ext>
-            </a:extLst>
-          </a:blip>
-          <a:srcRect/>
-          <a:stretch>
-            <a:fillRect/>
-          </a:stretch>
-        </p:blipFill>
-        <p:spPr bwMode="auto">
-          <a:xfrm>
-            <a:off x="0" y="-1"/>
-            <a:ext cx="12192003" cy="6858001"/>
-          </a:xfrm>
-          <a:prstGeom prst="rect">
-            <a:avLst/>
-          </a:prstGeom>
-          <a:noFill/>
-          <a:extLst>
-            <a:ext uri="{909E8E84-426E-40DD-AFC4-6F175D3DCCD1}">
-              <a14:hiddenFill xmlns:a14="http://schemas.microsoft.com/office/drawing/2010/main">
-                <a:solidFill>
-                  <a:srgbClr val="FFFFFF"/>
-                </a:solidFill>
-              </a14:hiddenFill>
-            </a:ext>
-          </a:extLst>
-        </p:spPr>
-      </p:pic>
       <p:sp>
         <p:nvSpPr>
           <p:cNvPr id="2" name="Title Placeholder 1"/>
@@ -6009,8 +5048,8 @@
         </p:nvSpPr>
         <p:spPr>
           <a:xfrm>
-            <a:off x="913775" y="618517"/>
-            <a:ext cx="10364451" cy="1596177"/>
+            <a:off x="913795" y="609600"/>
+            <a:ext cx="10353761" cy="1326321"/>
           </a:xfrm>
           <a:prstGeom prst="rect">
             <a:avLst/>
@@ -6042,8 +5081,8 @@
         </p:nvSpPr>
         <p:spPr>
           <a:xfrm>
-            <a:off x="913775" y="2367093"/>
-            <a:ext cx="10364452" cy="3424107"/>
+            <a:off x="913795" y="2096064"/>
+            <a:ext cx="10353762" cy="3695136"/>
           </a:xfrm>
           <a:prstGeom prst="rect">
             <a:avLst/>
@@ -6104,7 +5143,7 @@
         </p:nvSpPr>
         <p:spPr>
           <a:xfrm>
-            <a:off x="7678737" y="5883275"/>
+            <a:off x="7678736" y="5883275"/>
             <a:ext cx="2743200" cy="365125"/>
           </a:xfrm>
           <a:prstGeom prst="rect">
@@ -6117,7 +5156,9 @@
             <a:lvl1pPr algn="r">
               <a:defRPr sz="1000">
                 <a:solidFill>
-                  <a:schemeClr val="tx1"/>
+                  <a:schemeClr val="tx1">
+                    <a:tint val="75000"/>
+                  </a:schemeClr>
                 </a:solidFill>
               </a:defRPr>
             </a:lvl1pPr>
@@ -6126,7 +5167,7 @@
             <a:fld id="{48A87A34-81AB-432B-8DAE-1953F412C126}" type="datetimeFigureOut">
               <a:rPr lang="en-US" smtClean="0"/>
               <a:pPr/>
-              <a:t>9/26/2020</a:t>
+              <a:t>9/27/2020</a:t>
             </a:fld>
             <a:endParaRPr lang="en-US" dirty="0"/>
           </a:p>
@@ -6144,8 +5185,8 @@
         </p:nvSpPr>
         <p:spPr>
           <a:xfrm>
-            <a:off x="913774" y="5883275"/>
-            <a:ext cx="6672887" cy="365125"/>
+            <a:off x="913794" y="5883275"/>
+            <a:ext cx="6672865" cy="365125"/>
           </a:xfrm>
           <a:prstGeom prst="rect">
             <a:avLst/>
@@ -6157,7 +5198,9 @@
             <a:lvl1pPr algn="l">
               <a:defRPr sz="1000">
                 <a:solidFill>
-                  <a:schemeClr val="tx1"/>
+                  <a:schemeClr val="tx1">
+                    <a:tint val="75000"/>
+                  </a:schemeClr>
                 </a:solidFill>
               </a:defRPr>
             </a:lvl1pPr>
@@ -6180,7 +5223,7 @@
         <p:spPr>
           <a:xfrm>
             <a:off x="10514011" y="5883275"/>
-            <a:ext cx="764215" cy="365125"/>
+            <a:ext cx="753545" cy="365125"/>
           </a:xfrm>
           <a:prstGeom prst="rect">
             <a:avLst/>
@@ -6192,7 +5235,9 @@
             <a:lvl1pPr algn="r">
               <a:defRPr sz="1000">
                 <a:solidFill>
-                  <a:schemeClr val="tx1"/>
+                  <a:schemeClr val="tx1">
+                    <a:tint val="75000"/>
+                  </a:schemeClr>
                 </a:solidFill>
               </a:defRPr>
             </a:lvl1pPr>
@@ -6210,31 +5255,29 @@
     </p:spTree>
     <p:extLst>
       <p:ext uri="{BB962C8B-B14F-4D97-AF65-F5344CB8AC3E}">
-        <p14:creationId xmlns:p14="http://schemas.microsoft.com/office/powerpoint/2010/main" val="2005746138"/>
+        <p14:creationId xmlns:p14="http://schemas.microsoft.com/office/powerpoint/2010/main" val="1743785716"/>
       </p:ext>
     </p:extLst>
   </p:cSld>
-  <p:clrMap bg1="lt1" tx1="dk1" bg2="lt2" tx2="dk2" accent1="accent1" accent2="accent2" accent3="accent3" accent4="accent4" accent5="accent5" accent6="accent6" hlink="hlink" folHlink="folHlink"/>
+  <p:clrMap bg1="dk1" tx1="lt1" bg2="dk2" tx2="lt2" accent1="accent1" accent2="accent2" accent3="accent3" accent4="accent4" accent5="accent5" accent6="accent6" hlink="hlink" folHlink="folHlink"/>
   <p:sldLayoutIdLst>
-    <p:sldLayoutId id="2147483700" r:id="rId1"/>
-    <p:sldLayoutId id="2147483701" r:id="rId2"/>
-    <p:sldLayoutId id="2147483702" r:id="rId3"/>
-    <p:sldLayoutId id="2147483703" r:id="rId4"/>
-    <p:sldLayoutId id="2147483704" r:id="rId5"/>
-    <p:sldLayoutId id="2147483705" r:id="rId6"/>
-    <p:sldLayoutId id="2147483706" r:id="rId7"/>
-    <p:sldLayoutId id="2147483707" r:id="rId8"/>
-    <p:sldLayoutId id="2147483708" r:id="rId9"/>
-    <p:sldLayoutId id="2147483709" r:id="rId10"/>
-    <p:sldLayoutId id="2147483710" r:id="rId11"/>
-    <p:sldLayoutId id="2147483711" r:id="rId12"/>
-    <p:sldLayoutId id="2147483712" r:id="rId13"/>
-    <p:sldLayoutId id="2147483713" r:id="rId14"/>
-    <p:sldLayoutId id="2147483714" r:id="rId15"/>
-    <p:sldLayoutId id="2147483715" r:id="rId16"/>
-    <p:sldLayoutId id="2147483716" r:id="rId17"/>
-    <p:sldLayoutId id="2147483717" r:id="rId18"/>
-    <p:sldLayoutId id="2147483718" r:id="rId19"/>
+    <p:sldLayoutId id="2147483720" r:id="rId1"/>
+    <p:sldLayoutId id="2147483721" r:id="rId2"/>
+    <p:sldLayoutId id="2147483722" r:id="rId3"/>
+    <p:sldLayoutId id="2147483723" r:id="rId4"/>
+    <p:sldLayoutId id="2147483724" r:id="rId5"/>
+    <p:sldLayoutId id="2147483725" r:id="rId6"/>
+    <p:sldLayoutId id="2147483726" r:id="rId7"/>
+    <p:sldLayoutId id="2147483727" r:id="rId8"/>
+    <p:sldLayoutId id="2147483728" r:id="rId9"/>
+    <p:sldLayoutId id="2147483729" r:id="rId10"/>
+    <p:sldLayoutId id="2147483730" r:id="rId11"/>
+    <p:sldLayoutId id="2147483731" r:id="rId12"/>
+    <p:sldLayoutId id="2147483732" r:id="rId13"/>
+    <p:sldLayoutId id="2147483733" r:id="rId14"/>
+    <p:sldLayoutId id="2147483734" r:id="rId15"/>
+    <p:sldLayoutId id="2147483735" r:id="rId16"/>
+    <p:sldLayoutId id="2147483736" r:id="rId17"/>
   </p:sldLayoutIdLst>
   <p:txStyles>
     <p:titleStyle>
@@ -6246,11 +5289,17 @@
           <a:spcPct val="0"/>
         </a:spcBef>
         <a:buNone/>
-        <a:defRPr sz="3600" kern="1200" cap="all" baseline="0">
+        <a:defRPr sz="3400" b="1" i="0" kern="1200" cap="all">
           <a:solidFill>
             <a:schemeClr val="tx1"/>
           </a:solidFill>
-          <a:effectLst/>
+          <a:effectLst>
+            <a:outerShdw blurRad="50800" dist="63500" dir="2700000" algn="tl" rotWithShape="0">
+              <a:srgbClr val="000000">
+                <a:alpha val="48000"/>
+              </a:srgbClr>
+            </a:outerShdw>
+          </a:effectLst>
           <a:latin typeface="+mj-lt"/>
           <a:ea typeface="+mj-ea"/>
           <a:cs typeface="+mj-cs"/>
@@ -6265,16 +5314,19 @@
         <a:spcBef>
           <a:spcPts val="1000"/>
         </a:spcBef>
-        <a:buClr>
-          <a:schemeClr val="tx1"/>
-        </a:buClr>
         <a:buFont typeface="Arial" panose="020B0604020202020204" pitchFamily="34" charset="0"/>
         <a:buChar char="•"/>
-        <a:defRPr sz="2000" kern="1200" cap="all" baseline="0">
+        <a:defRPr sz="2000" kern="1200">
           <a:solidFill>
             <a:schemeClr val="tx1"/>
           </a:solidFill>
-          <a:effectLst/>
+          <a:effectLst>
+            <a:outerShdw blurRad="50800" dist="38100" dir="2700000" algn="tl" rotWithShape="0">
+              <a:srgbClr val="000000">
+                <a:alpha val="48000"/>
+              </a:srgbClr>
+            </a:outerShdw>
+          </a:effectLst>
           <a:latin typeface="+mn-lt"/>
           <a:ea typeface="+mn-ea"/>
           <a:cs typeface="+mn-cs"/>
@@ -6287,16 +5339,19 @@
         <a:spcBef>
           <a:spcPts val="500"/>
         </a:spcBef>
-        <a:buClr>
-          <a:schemeClr val="tx1"/>
-        </a:buClr>
         <a:buFont typeface="Arial" panose="020B0604020202020204" pitchFamily="34" charset="0"/>
         <a:buChar char="•"/>
-        <a:defRPr sz="1800" kern="1200" cap="all" baseline="0">
+        <a:defRPr sz="1800" kern="1200">
           <a:solidFill>
             <a:schemeClr val="tx1"/>
           </a:solidFill>
-          <a:effectLst/>
+          <a:effectLst>
+            <a:outerShdw blurRad="50800" dist="38100" dir="2700000" algn="tl" rotWithShape="0">
+              <a:srgbClr val="000000">
+                <a:alpha val="48000"/>
+              </a:srgbClr>
+            </a:outerShdw>
+          </a:effectLst>
           <a:latin typeface="+mn-lt"/>
           <a:ea typeface="+mn-ea"/>
           <a:cs typeface="+mn-cs"/>
@@ -6309,16 +5364,19 @@
         <a:spcBef>
           <a:spcPts val="500"/>
         </a:spcBef>
-        <a:buClr>
-          <a:schemeClr val="tx1"/>
-        </a:buClr>
         <a:buFont typeface="Arial" panose="020B0604020202020204" pitchFamily="34" charset="0"/>
         <a:buChar char="•"/>
-        <a:defRPr sz="1600" kern="1200" cap="all" baseline="0">
+        <a:defRPr sz="1600" kern="1200">
           <a:solidFill>
             <a:schemeClr val="tx1"/>
           </a:solidFill>
-          <a:effectLst/>
+          <a:effectLst>
+            <a:outerShdw blurRad="50800" dist="38100" dir="2700000" algn="tl" rotWithShape="0">
+              <a:srgbClr val="000000">
+                <a:alpha val="48000"/>
+              </a:srgbClr>
+            </a:outerShdw>
+          </a:effectLst>
           <a:latin typeface="+mn-lt"/>
           <a:ea typeface="+mn-ea"/>
           <a:cs typeface="+mn-cs"/>
@@ -6331,16 +5389,19 @@
         <a:spcBef>
           <a:spcPts val="500"/>
         </a:spcBef>
-        <a:buClr>
-          <a:schemeClr val="tx1"/>
-        </a:buClr>
         <a:buFont typeface="Arial" panose="020B0604020202020204" pitchFamily="34" charset="0"/>
         <a:buChar char="•"/>
-        <a:defRPr sz="1400" kern="1200" cap="all" baseline="0">
+        <a:defRPr sz="1400" kern="1200">
           <a:solidFill>
             <a:schemeClr val="tx1"/>
           </a:solidFill>
-          <a:effectLst/>
+          <a:effectLst>
+            <a:outerShdw blurRad="50800" dist="38100" dir="2700000" algn="tl" rotWithShape="0">
+              <a:srgbClr val="000000">
+                <a:alpha val="48000"/>
+              </a:srgbClr>
+            </a:outerShdw>
+          </a:effectLst>
           <a:latin typeface="+mn-lt"/>
           <a:ea typeface="+mn-ea"/>
           <a:cs typeface="+mn-cs"/>
@@ -6353,16 +5414,19 @@
         <a:spcBef>
           <a:spcPts val="500"/>
         </a:spcBef>
-        <a:buClr>
-          <a:schemeClr val="tx1"/>
-        </a:buClr>
         <a:buFont typeface="Arial" panose="020B0604020202020204" pitchFamily="34" charset="0"/>
         <a:buChar char="•"/>
-        <a:defRPr sz="1400" kern="1200" cap="all" baseline="0">
+        <a:defRPr sz="1200" kern="1200">
           <a:solidFill>
             <a:schemeClr val="tx1"/>
           </a:solidFill>
-          <a:effectLst/>
+          <a:effectLst>
+            <a:outerShdw blurRad="50800" dist="38100" dir="2700000" algn="tl" rotWithShape="0">
+              <a:srgbClr val="000000">
+                <a:alpha val="48000"/>
+              </a:srgbClr>
+            </a:outerShdw>
+          </a:effectLst>
           <a:latin typeface="+mn-lt"/>
           <a:ea typeface="+mn-ea"/>
           <a:cs typeface="+mn-cs"/>
@@ -6375,16 +5439,19 @@
         <a:spcBef>
           <a:spcPts val="500"/>
         </a:spcBef>
-        <a:buClr>
-          <a:schemeClr val="tx1"/>
-        </a:buClr>
         <a:buFont typeface="Arial" panose="020B0604020202020204" pitchFamily="34" charset="0"/>
         <a:buChar char="•"/>
-        <a:defRPr sz="1400" kern="1200" cap="all" baseline="0">
+        <a:defRPr sz="1200" kern="1200">
           <a:solidFill>
             <a:schemeClr val="tx1"/>
           </a:solidFill>
-          <a:effectLst/>
+          <a:effectLst>
+            <a:outerShdw blurRad="50800" dist="38100" dir="2700000" algn="tl" rotWithShape="0">
+              <a:srgbClr val="000000">
+                <a:alpha val="48000"/>
+              </a:srgbClr>
+            </a:outerShdw>
+          </a:effectLst>
           <a:latin typeface="+mn-lt"/>
           <a:ea typeface="+mn-ea"/>
           <a:cs typeface="+mn-cs"/>
@@ -6397,16 +5464,19 @@
         <a:spcBef>
           <a:spcPts val="500"/>
         </a:spcBef>
-        <a:buClr>
-          <a:schemeClr val="tx1"/>
-        </a:buClr>
         <a:buFont typeface="Arial" panose="020B0604020202020204" pitchFamily="34" charset="0"/>
         <a:buChar char="•"/>
-        <a:defRPr sz="1400" kern="1200" cap="all" baseline="0">
+        <a:defRPr sz="1200" kern="1200">
           <a:solidFill>
             <a:schemeClr val="tx1"/>
           </a:solidFill>
-          <a:effectLst/>
+          <a:effectLst>
+            <a:outerShdw blurRad="50800" dist="38100" dir="2700000" algn="tl" rotWithShape="0">
+              <a:srgbClr val="000000">
+                <a:alpha val="48000"/>
+              </a:srgbClr>
+            </a:outerShdw>
+          </a:effectLst>
           <a:latin typeface="+mn-lt"/>
           <a:ea typeface="+mn-ea"/>
           <a:cs typeface="+mn-cs"/>
@@ -6419,16 +5489,19 @@
         <a:spcBef>
           <a:spcPts val="500"/>
         </a:spcBef>
-        <a:buClr>
-          <a:schemeClr val="tx1"/>
-        </a:buClr>
         <a:buFont typeface="Arial" panose="020B0604020202020204" pitchFamily="34" charset="0"/>
         <a:buChar char="•"/>
-        <a:defRPr sz="1400" kern="1200" cap="all" baseline="0">
+        <a:defRPr sz="1200" kern="1200">
           <a:solidFill>
             <a:schemeClr val="tx1"/>
           </a:solidFill>
-          <a:effectLst/>
+          <a:effectLst>
+            <a:outerShdw blurRad="50800" dist="38100" dir="2700000" algn="tl" rotWithShape="0">
+              <a:srgbClr val="000000">
+                <a:alpha val="48000"/>
+              </a:srgbClr>
+            </a:outerShdw>
+          </a:effectLst>
           <a:latin typeface="+mn-lt"/>
           <a:ea typeface="+mn-ea"/>
           <a:cs typeface="+mn-cs"/>
@@ -6441,16 +5514,19 @@
         <a:spcBef>
           <a:spcPts val="500"/>
         </a:spcBef>
-        <a:buClr>
-          <a:schemeClr val="tx1"/>
-        </a:buClr>
         <a:buFont typeface="Arial" panose="020B0604020202020204" pitchFamily="34" charset="0"/>
         <a:buChar char="•"/>
-        <a:defRPr sz="1400" kern="1200" cap="all" baseline="0">
+        <a:defRPr sz="1200" kern="1200">
           <a:solidFill>
             <a:schemeClr val="tx1"/>
           </a:solidFill>
-          <a:effectLst/>
+          <a:effectLst>
+            <a:outerShdw blurRad="50800" dist="38100" dir="2700000" algn="tl" rotWithShape="0">
+              <a:srgbClr val="000000">
+                <a:alpha val="48000"/>
+              </a:srgbClr>
+            </a:outerShdw>
+          </a:effectLst>
           <a:latin typeface="+mn-lt"/>
           <a:ea typeface="+mn-ea"/>
           <a:cs typeface="+mn-cs"/>
@@ -6573,486 +5649,12 @@
           <a:chExt cx="0" cy="0"/>
         </a:xfrm>
       </p:grpSpPr>
-      <p:sp>
-        <p:nvSpPr>
-          <p:cNvPr id="3" name="Content Placeholder 2">
+      <p:pic>
+        <p:nvPicPr>
+          <p:cNvPr id="11" name="Picture 10" descr="A picture containing object, light, traffic, bunch&#10;&#10;Description automatically generated">
             <a:extLst>
               <a:ext uri="{FF2B5EF4-FFF2-40B4-BE49-F238E27FC236}">
-                <a16:creationId xmlns:a16="http://schemas.microsoft.com/office/drawing/2014/main" id="{E0A3B9B1-435F-41CA-83C5-21824DE95CFD}"/>
-              </a:ext>
-            </a:extLst>
-          </p:cNvPr>
-          <p:cNvSpPr>
-            <a:spLocks noGrp="1"/>
-          </p:cNvSpPr>
-          <p:nvPr>
-            <p:ph sz="half" idx="1"/>
-          </p:nvPr>
-        </p:nvSpPr>
-        <p:spPr>
-          <a:xfrm>
-            <a:off x="1009180" y="2010878"/>
-            <a:ext cx="5009879" cy="4056547"/>
-          </a:xfrm>
-        </p:spPr>
-        <p:txBody>
-          <a:bodyPr>
-            <a:noAutofit/>
-          </a:bodyPr>
-          <a:lstStyle/>
-          <a:p>
-            <a:pPr marL="0" indent="0">
-              <a:lnSpc>
-                <a:spcPct val="110000"/>
-              </a:lnSpc>
-              <a:spcBef>
-                <a:spcPts val="600"/>
-              </a:spcBef>
-              <a:buNone/>
-            </a:pPr>
-            <a:r>
-              <a:rPr lang="en-US" sz="1800" dirty="0"/>
-              <a:t>Mr. Jacob John</a:t>
-            </a:r>
-          </a:p>
-          <a:p>
-            <a:pPr marL="0" indent="0">
-              <a:lnSpc>
-                <a:spcPct val="110000"/>
-              </a:lnSpc>
-              <a:spcBef>
-                <a:spcPts val="600"/>
-              </a:spcBef>
-              <a:buNone/>
-            </a:pPr>
-            <a:r>
-              <a:rPr lang="en-US" sz="1800" dirty="0"/>
-              <a:t>Rohan George Koshy</a:t>
-            </a:r>
-          </a:p>
-          <a:p>
-            <a:pPr marL="0" indent="0">
-              <a:lnSpc>
-                <a:spcPct val="110000"/>
-              </a:lnSpc>
-              <a:spcBef>
-                <a:spcPts val="600"/>
-              </a:spcBef>
-              <a:buNone/>
-            </a:pPr>
-            <a:r>
-              <a:rPr lang="en-US" sz="1800" dirty="0"/>
-              <a:t>Anusha Maria Thomas</a:t>
-            </a:r>
-          </a:p>
-          <a:p>
-            <a:pPr marL="0" indent="0">
-              <a:lnSpc>
-                <a:spcPct val="110000"/>
-              </a:lnSpc>
-              <a:spcBef>
-                <a:spcPts val="600"/>
-              </a:spcBef>
-              <a:buNone/>
-            </a:pPr>
-            <a:r>
-              <a:rPr lang="en-US" sz="1800" dirty="0"/>
-              <a:t>Mr. Jacob Philip </a:t>
-            </a:r>
-            <a:r>
-              <a:rPr lang="en-US" sz="1800" dirty="0" err="1"/>
-              <a:t>Kanianthara</a:t>
-            </a:r>
-            <a:endParaRPr lang="en-US" sz="1800" dirty="0"/>
-          </a:p>
-          <a:p>
-            <a:pPr marL="0" indent="0">
-              <a:lnSpc>
-                <a:spcPct val="110000"/>
-              </a:lnSpc>
-              <a:spcBef>
-                <a:spcPts val="600"/>
-              </a:spcBef>
-              <a:buNone/>
-            </a:pPr>
-            <a:r>
-              <a:rPr lang="en-US" sz="1800" dirty="0"/>
-              <a:t>Mr. Mathai </a:t>
-            </a:r>
-            <a:r>
-              <a:rPr lang="en-US" sz="1800" dirty="0" err="1"/>
-              <a:t>Shaji</a:t>
-            </a:r>
-            <a:endParaRPr lang="en-US" sz="1800" dirty="0"/>
-          </a:p>
-          <a:p>
-            <a:pPr marL="0" indent="0">
-              <a:lnSpc>
-                <a:spcPct val="110000"/>
-              </a:lnSpc>
-              <a:spcBef>
-                <a:spcPts val="600"/>
-              </a:spcBef>
-              <a:buNone/>
-            </a:pPr>
-            <a:r>
-              <a:rPr lang="en-US" sz="1800" dirty="0"/>
-              <a:t>Eva</a:t>
-            </a:r>
-          </a:p>
-          <a:p>
-            <a:pPr marL="0" indent="0">
-              <a:lnSpc>
-                <a:spcPct val="110000"/>
-              </a:lnSpc>
-              <a:spcBef>
-                <a:spcPts val="600"/>
-              </a:spcBef>
-              <a:buNone/>
-            </a:pPr>
-            <a:r>
-              <a:rPr lang="en-US" sz="1800" dirty="0"/>
-              <a:t>Mr. Don Fernandez Lawrie Norbert</a:t>
-            </a:r>
-          </a:p>
-          <a:p>
-            <a:pPr marL="0" indent="0">
-              <a:lnSpc>
-                <a:spcPct val="110000"/>
-              </a:lnSpc>
-              <a:spcBef>
-                <a:spcPts val="600"/>
-              </a:spcBef>
-              <a:buNone/>
-            </a:pPr>
-            <a:r>
-              <a:rPr lang="en-US" sz="1800" dirty="0"/>
-              <a:t>Mrs. </a:t>
-            </a:r>
-            <a:r>
-              <a:rPr lang="en-US" sz="1800" dirty="0" err="1"/>
-              <a:t>Zerin</a:t>
-            </a:r>
-            <a:r>
-              <a:rPr lang="en-US" sz="1800" dirty="0"/>
-              <a:t> Maria Fernandez</a:t>
-            </a:r>
-          </a:p>
-          <a:p>
-            <a:pPr marL="0" indent="0">
-              <a:lnSpc>
-                <a:spcPct val="110000"/>
-              </a:lnSpc>
-              <a:spcBef>
-                <a:spcPts val="600"/>
-              </a:spcBef>
-              <a:buNone/>
-            </a:pPr>
-            <a:r>
-              <a:rPr lang="en-US" sz="1800" dirty="0" err="1"/>
-              <a:t>Annah</a:t>
-            </a:r>
-            <a:r>
-              <a:rPr lang="en-US" sz="1800" dirty="0"/>
-              <a:t> </a:t>
-            </a:r>
-            <a:r>
-              <a:rPr lang="en-US" sz="1800" dirty="0" err="1"/>
-              <a:t>Elza</a:t>
-            </a:r>
-            <a:r>
-              <a:rPr lang="en-US" sz="1800" dirty="0"/>
-              <a:t> Zachariah</a:t>
-            </a:r>
-          </a:p>
-          <a:p>
-            <a:pPr marL="0" indent="0">
-              <a:lnSpc>
-                <a:spcPct val="110000"/>
-              </a:lnSpc>
-              <a:spcBef>
-                <a:spcPts val="600"/>
-              </a:spcBef>
-              <a:buNone/>
-            </a:pPr>
-            <a:r>
-              <a:rPr lang="en-US" sz="1800" dirty="0"/>
-              <a:t>Mrs. </a:t>
-            </a:r>
-            <a:r>
-              <a:rPr lang="en-US" sz="1800" dirty="0" err="1"/>
-              <a:t>Madhuwanti</a:t>
-            </a:r>
-            <a:r>
-              <a:rPr lang="en-US" sz="1800" dirty="0"/>
-              <a:t> Joshi</a:t>
-            </a:r>
-          </a:p>
-          <a:p>
-            <a:pPr marL="0" indent="0">
-              <a:lnSpc>
-                <a:spcPct val="110000"/>
-              </a:lnSpc>
-              <a:spcBef>
-                <a:spcPts val="600"/>
-              </a:spcBef>
-              <a:buNone/>
-            </a:pPr>
-            <a:r>
-              <a:rPr lang="en-US" sz="1800" dirty="0"/>
-              <a:t>Mrs. Roshni Sam Mathews</a:t>
-            </a:r>
-          </a:p>
-        </p:txBody>
-      </p:sp>
-      <p:sp>
-        <p:nvSpPr>
-          <p:cNvPr id="4" name="Content Placeholder 3"/>
-          <p:cNvSpPr>
-            <a:spLocks noGrp="1"/>
-          </p:cNvSpPr>
-          <p:nvPr>
-            <p:ph sz="half" idx="2"/>
-          </p:nvPr>
-        </p:nvSpPr>
-        <p:spPr>
-          <a:xfrm>
-            <a:off x="6337055" y="2010878"/>
-            <a:ext cx="5541268" cy="4056547"/>
-          </a:xfrm>
-        </p:spPr>
-        <p:txBody>
-          <a:bodyPr>
-            <a:noAutofit/>
-          </a:bodyPr>
-          <a:lstStyle/>
-          <a:p>
-            <a:pPr marL="0" indent="0">
-              <a:lnSpc>
-                <a:spcPct val="110000"/>
-              </a:lnSpc>
-              <a:spcBef>
-                <a:spcPts val="600"/>
-              </a:spcBef>
-              <a:buNone/>
-            </a:pPr>
-            <a:r>
-              <a:rPr lang="en-US" sz="1800" dirty="0"/>
-              <a:t>Elizabeth Daniel</a:t>
-            </a:r>
-          </a:p>
-          <a:p>
-            <a:pPr marL="0" indent="0">
-              <a:lnSpc>
-                <a:spcPct val="110000"/>
-              </a:lnSpc>
-              <a:spcBef>
-                <a:spcPts val="600"/>
-              </a:spcBef>
-              <a:buNone/>
-            </a:pPr>
-            <a:r>
-              <a:rPr lang="en-US" sz="1800" dirty="0"/>
-              <a:t>Eva Elizabeth </a:t>
-            </a:r>
-            <a:r>
-              <a:rPr lang="en-US" sz="1800" dirty="0" err="1"/>
-              <a:t>Jagan</a:t>
-            </a:r>
-            <a:endParaRPr lang="en-US" sz="1800" dirty="0"/>
-          </a:p>
-          <a:p>
-            <a:pPr marL="0" indent="0">
-              <a:lnSpc>
-                <a:spcPct val="110000"/>
-              </a:lnSpc>
-              <a:spcBef>
-                <a:spcPts val="600"/>
-              </a:spcBef>
-              <a:buNone/>
-            </a:pPr>
-            <a:r>
-              <a:rPr lang="en-US" sz="1800" dirty="0"/>
-              <a:t>Master Darren Joshua Fernandez</a:t>
-            </a:r>
-          </a:p>
-          <a:p>
-            <a:pPr marL="0" indent="0">
-              <a:lnSpc>
-                <a:spcPct val="110000"/>
-              </a:lnSpc>
-              <a:spcBef>
-                <a:spcPts val="600"/>
-              </a:spcBef>
-              <a:buNone/>
-            </a:pPr>
-            <a:r>
-              <a:rPr lang="en-US" sz="1800" dirty="0"/>
-              <a:t>Susan Koruthu</a:t>
-            </a:r>
-          </a:p>
-          <a:p>
-            <a:pPr marL="0" indent="0">
-              <a:lnSpc>
-                <a:spcPct val="110000"/>
-              </a:lnSpc>
-              <a:spcBef>
-                <a:spcPts val="600"/>
-              </a:spcBef>
-              <a:buNone/>
-            </a:pPr>
-            <a:r>
-              <a:rPr lang="en-US" sz="1800" dirty="0"/>
-              <a:t>Mrs. </a:t>
-            </a:r>
-            <a:r>
-              <a:rPr lang="en-US" sz="1800" dirty="0" err="1"/>
-              <a:t>Meethu</a:t>
-            </a:r>
-            <a:r>
-              <a:rPr lang="en-US" sz="1800" dirty="0"/>
-              <a:t> Jacob</a:t>
-            </a:r>
-          </a:p>
-          <a:p>
-            <a:pPr marL="0" indent="0">
-              <a:lnSpc>
-                <a:spcPct val="110000"/>
-              </a:lnSpc>
-              <a:spcBef>
-                <a:spcPts val="600"/>
-              </a:spcBef>
-              <a:buNone/>
-            </a:pPr>
-            <a:r>
-              <a:rPr lang="en-US" sz="1800" dirty="0" err="1"/>
-              <a:t>Jeswin</a:t>
-            </a:r>
-            <a:r>
-              <a:rPr lang="en-US" sz="1800" dirty="0"/>
-              <a:t> John Mathew</a:t>
-            </a:r>
-          </a:p>
-          <a:p>
-            <a:pPr marL="0" indent="0">
-              <a:lnSpc>
-                <a:spcPct val="110000"/>
-              </a:lnSpc>
-              <a:spcBef>
-                <a:spcPts val="600"/>
-              </a:spcBef>
-              <a:buNone/>
-            </a:pPr>
-            <a:r>
-              <a:rPr lang="en-US" sz="1800" dirty="0"/>
-              <a:t>Mr. George Joseph </a:t>
-            </a:r>
-            <a:r>
-              <a:rPr lang="en-US" sz="1800" dirty="0" err="1"/>
-              <a:t>Padinjarethalackal</a:t>
-            </a:r>
-            <a:endParaRPr lang="en-US" sz="1800" dirty="0"/>
-          </a:p>
-          <a:p>
-            <a:pPr marL="0" indent="0">
-              <a:lnSpc>
-                <a:spcPct val="110000"/>
-              </a:lnSpc>
-              <a:spcBef>
-                <a:spcPts val="600"/>
-              </a:spcBef>
-              <a:buNone/>
-            </a:pPr>
-            <a:r>
-              <a:rPr lang="en-US" sz="1800" dirty="0" err="1"/>
-              <a:t>Ritu</a:t>
-            </a:r>
-            <a:r>
-              <a:rPr lang="en-US" sz="1800" dirty="0"/>
-              <a:t> Anna Jacob</a:t>
-            </a:r>
-          </a:p>
-          <a:p>
-            <a:pPr marL="0" indent="0">
-              <a:lnSpc>
-                <a:spcPct val="110000"/>
-              </a:lnSpc>
-              <a:spcBef>
-                <a:spcPts val="600"/>
-              </a:spcBef>
-              <a:buNone/>
-            </a:pPr>
-            <a:r>
-              <a:rPr lang="en-US" sz="1800" dirty="0"/>
-              <a:t>Mr. </a:t>
-            </a:r>
-            <a:r>
-              <a:rPr lang="en-US" sz="1800" dirty="0" err="1"/>
-              <a:t>Femin</a:t>
-            </a:r>
-            <a:r>
-              <a:rPr lang="en-US" sz="1800" dirty="0"/>
-              <a:t> John </a:t>
-            </a:r>
-            <a:r>
-              <a:rPr lang="en-US" sz="1800" dirty="0" err="1"/>
-              <a:t>Puthanmannil</a:t>
-            </a:r>
-            <a:endParaRPr lang="en-US" sz="1800" dirty="0"/>
-          </a:p>
-          <a:p>
-            <a:pPr marL="0" indent="0">
-              <a:lnSpc>
-                <a:spcPct val="110000"/>
-              </a:lnSpc>
-              <a:spcBef>
-                <a:spcPts val="600"/>
-              </a:spcBef>
-              <a:buNone/>
-            </a:pPr>
-            <a:r>
-              <a:rPr lang="en-US" sz="1800" dirty="0"/>
-              <a:t>Mr. Thomas Zacharias</a:t>
-            </a:r>
-          </a:p>
-          <a:p>
-            <a:pPr marL="0" indent="0">
-              <a:lnSpc>
-                <a:spcPct val="110000"/>
-              </a:lnSpc>
-              <a:spcBef>
-                <a:spcPts val="600"/>
-              </a:spcBef>
-              <a:buNone/>
-            </a:pPr>
-            <a:r>
-              <a:rPr lang="en-US" sz="1800" dirty="0"/>
-              <a:t>Mr. Isaac Varghese</a:t>
-            </a:r>
-          </a:p>
-          <a:p>
-            <a:pPr marL="0" indent="0">
-              <a:lnSpc>
-                <a:spcPct val="110000"/>
-              </a:lnSpc>
-              <a:spcBef>
-                <a:spcPts val="600"/>
-              </a:spcBef>
-              <a:buNone/>
-            </a:pPr>
-            <a:r>
-              <a:rPr lang="en-US" sz="1800" dirty="0"/>
-              <a:t>Rebecca Mary Thomas</a:t>
-            </a:r>
-          </a:p>
-        </p:txBody>
-      </p:sp>
-      <p:pic>
-        <p:nvPicPr>
-          <p:cNvPr id="8" name="Picture 7" descr="A picture containing drawing&#10;&#10;Description automatically generated">
-            <a:extLst>
-              <a:ext uri="{FF2B5EF4-FFF2-40B4-BE49-F238E27FC236}">
-                <a16:creationId xmlns:a16="http://schemas.microsoft.com/office/drawing/2014/main" id="{8A9DBF3B-9FD9-4ECA-BFD5-A0AB558D837B}"/>
+                <a16:creationId xmlns:a16="http://schemas.microsoft.com/office/drawing/2014/main" id="{DD6C8732-39BC-4949-B9E7-9BC7A77D9A3E}"/>
               </a:ext>
             </a:extLst>
           </p:cNvPr>
@@ -7069,14 +5671,488 @@
         </p:blipFill>
         <p:spPr>
           <a:xfrm>
-            <a:off x="1133077" y="41742"/>
-            <a:ext cx="4490002" cy="1975601"/>
+            <a:off x="2467526" y="-1"/>
+            <a:ext cx="4382733" cy="2695575"/>
           </a:xfrm>
           <a:prstGeom prst="rect">
             <a:avLst/>
           </a:prstGeom>
         </p:spPr>
       </p:pic>
+      <p:sp>
+        <p:nvSpPr>
+          <p:cNvPr id="3" name="Content Placeholder 2">
+            <a:extLst>
+              <a:ext uri="{FF2B5EF4-FFF2-40B4-BE49-F238E27FC236}">
+                <a16:creationId xmlns:a16="http://schemas.microsoft.com/office/drawing/2014/main" id="{E0A3B9B1-435F-41CA-83C5-21824DE95CFD}"/>
+              </a:ext>
+            </a:extLst>
+          </p:cNvPr>
+          <p:cNvSpPr>
+            <a:spLocks noGrp="1"/>
+          </p:cNvSpPr>
+          <p:nvPr>
+            <p:ph sz="half" idx="1"/>
+          </p:nvPr>
+        </p:nvSpPr>
+        <p:spPr>
+          <a:xfrm>
+            <a:off x="1009180" y="2010878"/>
+            <a:ext cx="5009879" cy="4056547"/>
+          </a:xfrm>
+        </p:spPr>
+        <p:txBody>
+          <a:bodyPr>
+            <a:noAutofit/>
+          </a:bodyPr>
+          <a:lstStyle/>
+          <a:p>
+            <a:pPr marL="0" indent="0">
+              <a:lnSpc>
+                <a:spcPct val="110000"/>
+              </a:lnSpc>
+              <a:spcBef>
+                <a:spcPts val="600"/>
+              </a:spcBef>
+              <a:buNone/>
+            </a:pPr>
+            <a:r>
+              <a:rPr lang="en-US" sz="1800" dirty="0"/>
+              <a:t>Mr. Jacob John</a:t>
+            </a:r>
+          </a:p>
+          <a:p>
+            <a:pPr marL="0" indent="0">
+              <a:lnSpc>
+                <a:spcPct val="110000"/>
+              </a:lnSpc>
+              <a:spcBef>
+                <a:spcPts val="600"/>
+              </a:spcBef>
+              <a:buNone/>
+            </a:pPr>
+            <a:r>
+              <a:rPr lang="en-US" sz="1800" dirty="0"/>
+              <a:t>Rohan George Koshy</a:t>
+            </a:r>
+          </a:p>
+          <a:p>
+            <a:pPr marL="0" indent="0">
+              <a:lnSpc>
+                <a:spcPct val="110000"/>
+              </a:lnSpc>
+              <a:spcBef>
+                <a:spcPts val="600"/>
+              </a:spcBef>
+              <a:buNone/>
+            </a:pPr>
+            <a:r>
+              <a:rPr lang="en-US" sz="1800" dirty="0"/>
+              <a:t>Anusha Maria Thomas</a:t>
+            </a:r>
+          </a:p>
+          <a:p>
+            <a:pPr marL="0" indent="0">
+              <a:lnSpc>
+                <a:spcPct val="110000"/>
+              </a:lnSpc>
+              <a:spcBef>
+                <a:spcPts val="600"/>
+              </a:spcBef>
+              <a:buNone/>
+            </a:pPr>
+            <a:r>
+              <a:rPr lang="en-US" sz="1800" dirty="0"/>
+              <a:t>Mr. Jacob Philip </a:t>
+            </a:r>
+            <a:r>
+              <a:rPr lang="en-US" sz="1800" dirty="0" err="1"/>
+              <a:t>Kanianthara</a:t>
+            </a:r>
+            <a:endParaRPr lang="en-US" sz="1800" dirty="0"/>
+          </a:p>
+          <a:p>
+            <a:pPr marL="0" indent="0">
+              <a:lnSpc>
+                <a:spcPct val="110000"/>
+              </a:lnSpc>
+              <a:spcBef>
+                <a:spcPts val="600"/>
+              </a:spcBef>
+              <a:buNone/>
+            </a:pPr>
+            <a:r>
+              <a:rPr lang="en-US" sz="1800" dirty="0"/>
+              <a:t>Mr. Mathai </a:t>
+            </a:r>
+            <a:r>
+              <a:rPr lang="en-US" sz="1800" dirty="0" err="1"/>
+              <a:t>Shaji</a:t>
+            </a:r>
+            <a:endParaRPr lang="en-US" sz="1800" dirty="0"/>
+          </a:p>
+          <a:p>
+            <a:pPr marL="0" indent="0">
+              <a:lnSpc>
+                <a:spcPct val="110000"/>
+              </a:lnSpc>
+              <a:spcBef>
+                <a:spcPts val="600"/>
+              </a:spcBef>
+              <a:buNone/>
+            </a:pPr>
+            <a:r>
+              <a:rPr lang="en-US" sz="1800" dirty="0"/>
+              <a:t>Eva</a:t>
+            </a:r>
+          </a:p>
+          <a:p>
+            <a:pPr marL="0" indent="0">
+              <a:lnSpc>
+                <a:spcPct val="110000"/>
+              </a:lnSpc>
+              <a:spcBef>
+                <a:spcPts val="600"/>
+              </a:spcBef>
+              <a:buNone/>
+            </a:pPr>
+            <a:r>
+              <a:rPr lang="en-US" sz="1800" dirty="0"/>
+              <a:t>Mr. Don Fernandez Lawrie Norbert</a:t>
+            </a:r>
+          </a:p>
+          <a:p>
+            <a:pPr marL="0" indent="0">
+              <a:lnSpc>
+                <a:spcPct val="110000"/>
+              </a:lnSpc>
+              <a:spcBef>
+                <a:spcPts val="600"/>
+              </a:spcBef>
+              <a:buNone/>
+            </a:pPr>
+            <a:r>
+              <a:rPr lang="en-US" sz="1800" dirty="0"/>
+              <a:t>Mrs. </a:t>
+            </a:r>
+            <a:r>
+              <a:rPr lang="en-US" sz="1800" dirty="0" err="1"/>
+              <a:t>Zerin</a:t>
+            </a:r>
+            <a:r>
+              <a:rPr lang="en-US" sz="1800" dirty="0"/>
+              <a:t> Maria Fernandez</a:t>
+            </a:r>
+          </a:p>
+          <a:p>
+            <a:pPr marL="0" indent="0">
+              <a:lnSpc>
+                <a:spcPct val="110000"/>
+              </a:lnSpc>
+              <a:spcBef>
+                <a:spcPts val="600"/>
+              </a:spcBef>
+              <a:buNone/>
+            </a:pPr>
+            <a:r>
+              <a:rPr lang="en-US" sz="1800" dirty="0" err="1"/>
+              <a:t>Annah</a:t>
+            </a:r>
+            <a:r>
+              <a:rPr lang="en-US" sz="1800" dirty="0"/>
+              <a:t> </a:t>
+            </a:r>
+            <a:r>
+              <a:rPr lang="en-US" sz="1800" dirty="0" err="1"/>
+              <a:t>Elza</a:t>
+            </a:r>
+            <a:r>
+              <a:rPr lang="en-US" sz="1800" dirty="0"/>
+              <a:t> Zachariah</a:t>
+            </a:r>
+          </a:p>
+          <a:p>
+            <a:pPr marL="0" indent="0">
+              <a:lnSpc>
+                <a:spcPct val="110000"/>
+              </a:lnSpc>
+              <a:spcBef>
+                <a:spcPts val="600"/>
+              </a:spcBef>
+              <a:buNone/>
+            </a:pPr>
+            <a:r>
+              <a:rPr lang="en-US" sz="1800" dirty="0"/>
+              <a:t>Mrs. </a:t>
+            </a:r>
+            <a:r>
+              <a:rPr lang="en-US" sz="1800" dirty="0" err="1"/>
+              <a:t>Madhuwanti</a:t>
+            </a:r>
+            <a:r>
+              <a:rPr lang="en-US" sz="1800" dirty="0"/>
+              <a:t> Joshi</a:t>
+            </a:r>
+          </a:p>
+          <a:p>
+            <a:pPr marL="0" indent="0">
+              <a:lnSpc>
+                <a:spcPct val="110000"/>
+              </a:lnSpc>
+              <a:spcBef>
+                <a:spcPts val="600"/>
+              </a:spcBef>
+              <a:buNone/>
+            </a:pPr>
+            <a:r>
+              <a:rPr lang="en-US" sz="1800" dirty="0"/>
+              <a:t>Mrs. Roshni Sam Mathews</a:t>
+            </a:r>
+          </a:p>
+        </p:txBody>
+      </p:sp>
+      <p:sp>
+        <p:nvSpPr>
+          <p:cNvPr id="4" name="Content Placeholder 3"/>
+          <p:cNvSpPr>
+            <a:spLocks noGrp="1"/>
+          </p:cNvSpPr>
+          <p:nvPr>
+            <p:ph sz="half" idx="2"/>
+          </p:nvPr>
+        </p:nvSpPr>
+        <p:spPr>
+          <a:xfrm>
+            <a:off x="6337055" y="2010878"/>
+            <a:ext cx="5541268" cy="4056547"/>
+          </a:xfrm>
+        </p:spPr>
+        <p:txBody>
+          <a:bodyPr>
+            <a:noAutofit/>
+          </a:bodyPr>
+          <a:lstStyle/>
+          <a:p>
+            <a:pPr marL="0" indent="0">
+              <a:lnSpc>
+                <a:spcPct val="110000"/>
+              </a:lnSpc>
+              <a:spcBef>
+                <a:spcPts val="600"/>
+              </a:spcBef>
+              <a:buNone/>
+            </a:pPr>
+            <a:r>
+              <a:rPr lang="en-US" sz="1800" dirty="0"/>
+              <a:t>Elizabeth Daniel</a:t>
+            </a:r>
+          </a:p>
+          <a:p>
+            <a:pPr marL="0" indent="0">
+              <a:lnSpc>
+                <a:spcPct val="110000"/>
+              </a:lnSpc>
+              <a:spcBef>
+                <a:spcPts val="600"/>
+              </a:spcBef>
+              <a:buNone/>
+            </a:pPr>
+            <a:r>
+              <a:rPr lang="en-US" sz="1800" dirty="0"/>
+              <a:t>Eva Elizabeth </a:t>
+            </a:r>
+            <a:r>
+              <a:rPr lang="en-US" sz="1800" dirty="0" err="1"/>
+              <a:t>Jagan</a:t>
+            </a:r>
+            <a:endParaRPr lang="en-US" sz="1800" dirty="0"/>
+          </a:p>
+          <a:p>
+            <a:pPr marL="0" indent="0">
+              <a:lnSpc>
+                <a:spcPct val="110000"/>
+              </a:lnSpc>
+              <a:spcBef>
+                <a:spcPts val="600"/>
+              </a:spcBef>
+              <a:buNone/>
+            </a:pPr>
+            <a:r>
+              <a:rPr lang="en-US" sz="1800" dirty="0"/>
+              <a:t>Master Darren Joshua Fernandez</a:t>
+            </a:r>
+          </a:p>
+          <a:p>
+            <a:pPr marL="0" indent="0">
+              <a:lnSpc>
+                <a:spcPct val="110000"/>
+              </a:lnSpc>
+              <a:spcBef>
+                <a:spcPts val="600"/>
+              </a:spcBef>
+              <a:buNone/>
+            </a:pPr>
+            <a:r>
+              <a:rPr lang="en-US" sz="1800" dirty="0"/>
+              <a:t>Susan Koruthu</a:t>
+            </a:r>
+          </a:p>
+          <a:p>
+            <a:pPr marL="0" indent="0">
+              <a:lnSpc>
+                <a:spcPct val="110000"/>
+              </a:lnSpc>
+              <a:spcBef>
+                <a:spcPts val="600"/>
+              </a:spcBef>
+              <a:buNone/>
+            </a:pPr>
+            <a:r>
+              <a:rPr lang="en-US" sz="1800" dirty="0"/>
+              <a:t>Mrs. </a:t>
+            </a:r>
+            <a:r>
+              <a:rPr lang="en-US" sz="1800" dirty="0" err="1"/>
+              <a:t>Meethu</a:t>
+            </a:r>
+            <a:r>
+              <a:rPr lang="en-US" sz="1800" dirty="0"/>
+              <a:t> Jacob</a:t>
+            </a:r>
+          </a:p>
+          <a:p>
+            <a:pPr marL="0" indent="0">
+              <a:lnSpc>
+                <a:spcPct val="110000"/>
+              </a:lnSpc>
+              <a:spcBef>
+                <a:spcPts val="600"/>
+              </a:spcBef>
+              <a:buNone/>
+            </a:pPr>
+            <a:r>
+              <a:rPr lang="en-US" sz="1800" dirty="0" err="1"/>
+              <a:t>Jeswin</a:t>
+            </a:r>
+            <a:r>
+              <a:rPr lang="en-US" sz="1800" dirty="0"/>
+              <a:t> John Mathew</a:t>
+            </a:r>
+          </a:p>
+          <a:p>
+            <a:pPr marL="0" indent="0">
+              <a:lnSpc>
+                <a:spcPct val="110000"/>
+              </a:lnSpc>
+              <a:spcBef>
+                <a:spcPts val="600"/>
+              </a:spcBef>
+              <a:buNone/>
+            </a:pPr>
+            <a:r>
+              <a:rPr lang="en-US" sz="1800" dirty="0"/>
+              <a:t>Mr. George Joseph </a:t>
+            </a:r>
+            <a:r>
+              <a:rPr lang="en-US" sz="1800" dirty="0" err="1"/>
+              <a:t>Padinjarethalackal</a:t>
+            </a:r>
+            <a:endParaRPr lang="en-US" sz="1800" dirty="0"/>
+          </a:p>
+          <a:p>
+            <a:pPr marL="0" indent="0">
+              <a:lnSpc>
+                <a:spcPct val="110000"/>
+              </a:lnSpc>
+              <a:spcBef>
+                <a:spcPts val="600"/>
+              </a:spcBef>
+              <a:buNone/>
+            </a:pPr>
+            <a:r>
+              <a:rPr lang="en-US" sz="1800" dirty="0" err="1"/>
+              <a:t>Ritu</a:t>
+            </a:r>
+            <a:r>
+              <a:rPr lang="en-US" sz="1800" dirty="0"/>
+              <a:t> Anna Jacob</a:t>
+            </a:r>
+          </a:p>
+          <a:p>
+            <a:pPr marL="0" indent="0">
+              <a:lnSpc>
+                <a:spcPct val="110000"/>
+              </a:lnSpc>
+              <a:spcBef>
+                <a:spcPts val="600"/>
+              </a:spcBef>
+              <a:buNone/>
+            </a:pPr>
+            <a:r>
+              <a:rPr lang="en-US" sz="1800" dirty="0"/>
+              <a:t>Mr. </a:t>
+            </a:r>
+            <a:r>
+              <a:rPr lang="en-US" sz="1800" dirty="0" err="1"/>
+              <a:t>Femin</a:t>
+            </a:r>
+            <a:r>
+              <a:rPr lang="en-US" sz="1800" dirty="0"/>
+              <a:t> John </a:t>
+            </a:r>
+            <a:r>
+              <a:rPr lang="en-US" sz="1800" dirty="0" err="1"/>
+              <a:t>Puthanmannil</a:t>
+            </a:r>
+            <a:endParaRPr lang="en-US" sz="1800" dirty="0"/>
+          </a:p>
+          <a:p>
+            <a:pPr marL="0" indent="0">
+              <a:lnSpc>
+                <a:spcPct val="110000"/>
+              </a:lnSpc>
+              <a:spcBef>
+                <a:spcPts val="600"/>
+              </a:spcBef>
+              <a:buNone/>
+            </a:pPr>
+            <a:r>
+              <a:rPr lang="en-US" sz="1800" dirty="0"/>
+              <a:t>Mr. Thomas Zacharias</a:t>
+            </a:r>
+          </a:p>
+          <a:p>
+            <a:pPr marL="0" indent="0">
+              <a:lnSpc>
+                <a:spcPct val="110000"/>
+              </a:lnSpc>
+              <a:spcBef>
+                <a:spcPts val="600"/>
+              </a:spcBef>
+              <a:buNone/>
+            </a:pPr>
+            <a:r>
+              <a:rPr lang="en-US" sz="1800" dirty="0"/>
+              <a:t>Mr. Isaac Varghese</a:t>
+            </a:r>
+          </a:p>
+          <a:p>
+            <a:pPr marL="0" indent="0">
+              <a:lnSpc>
+                <a:spcPct val="110000"/>
+              </a:lnSpc>
+              <a:spcBef>
+                <a:spcPts val="600"/>
+              </a:spcBef>
+              <a:buNone/>
+            </a:pPr>
+            <a:r>
+              <a:rPr lang="en-US" sz="1800" dirty="0"/>
+              <a:t>Rebecca Mary Thomas</a:t>
+            </a:r>
+          </a:p>
+        </p:txBody>
+      </p:sp>
       <p:sp>
         <p:nvSpPr>
           <p:cNvPr id="6" name="Title 1">
@@ -7348,36 +6424,6 @@
           </a:prstGeom>
         </p:spPr>
       </p:pic>
-      <p:pic>
-        <p:nvPicPr>
-          <p:cNvPr id="7" name="Picture 6" descr="A close up of a logo&#10;&#10;Description automatically generated">
-            <a:extLst>
-              <a:ext uri="{FF2B5EF4-FFF2-40B4-BE49-F238E27FC236}">
-                <a16:creationId xmlns:a16="http://schemas.microsoft.com/office/drawing/2014/main" id="{F22A2ECB-ED48-4C49-BD27-382CCC117B52}"/>
-              </a:ext>
-            </a:extLst>
-          </p:cNvPr>
-          <p:cNvPicPr>
-            <a:picLocks noChangeAspect="1"/>
-          </p:cNvPicPr>
-          <p:nvPr/>
-        </p:nvPicPr>
-        <p:blipFill>
-          <a:blip r:embed="rId3"/>
-          <a:stretch>
-            <a:fillRect/>
-          </a:stretch>
-        </p:blipFill>
-        <p:spPr>
-          <a:xfrm>
-            <a:off x="913775" y="268377"/>
-            <a:ext cx="5867400" cy="1593977"/>
-          </a:xfrm>
-          <a:prstGeom prst="rect">
-            <a:avLst/>
-          </a:prstGeom>
-        </p:spPr>
-      </p:pic>
       <p:sp>
         <p:nvSpPr>
           <p:cNvPr id="6" name="Title 1">
@@ -7403,7 +6449,7 @@
         </p:spPr>
         <p:txBody>
           <a:bodyPr vert="horz" lIns="91440" tIns="45720" rIns="91440" bIns="45720" rtlCol="0" anchor="ctr">
-            <a:normAutofit/>
+            <a:normAutofit lnSpcReduction="10000"/>
           </a:bodyPr>
           <a:lstStyle>
             <a:lvl1pPr algn="ctr" defTabSz="914400" rtl="0" eaLnBrk="1" latinLnBrk="0" hangingPunct="1">
@@ -7449,6 +6495,35 @@
           </a:p>
         </p:txBody>
       </p:sp>
+      <p:pic>
+        <p:nvPicPr>
+          <p:cNvPr id="4" name="Picture 3" descr="Text, logo&#10;&#10;Description automatically generated">
+            <a:extLst>
+              <a:ext uri="{FF2B5EF4-FFF2-40B4-BE49-F238E27FC236}">
+                <a16:creationId xmlns:a16="http://schemas.microsoft.com/office/drawing/2014/main" id="{29F1A78A-5294-4258-B6F6-49DD264D8CC6}"/>
+              </a:ext>
+            </a:extLst>
+          </p:cNvPr>
+          <p:cNvPicPr>
+            <a:picLocks noChangeAspect="1"/>
+          </p:cNvPicPr>
+          <p:nvPr/>
+        </p:nvPicPr>
+        <p:blipFill rotWithShape="1">
+          <a:blip r:embed="rId3"/>
+          <a:srcRect t="25814" b="29595"/>
+          <a:stretch/>
+        </p:blipFill>
+        <p:spPr>
+          <a:xfrm>
+            <a:off x="1493520" y="320528"/>
+            <a:ext cx="5527040" cy="1232264"/>
+          </a:xfrm>
+          <a:prstGeom prst="rect">
+            <a:avLst/>
+          </a:prstGeom>
+        </p:spPr>
+      </p:pic>
     </p:spTree>
     <p:extLst>
       <p:ext uri="{BB962C8B-B14F-4D97-AF65-F5344CB8AC3E}">
@@ -7463,9 +6538,9 @@
 </file>
 
 <file path=ppt/theme/theme1.xml><?xml version="1.0" encoding="utf-8"?>
-<a:theme xmlns:a="http://schemas.openxmlformats.org/drawingml/2006/main" name="Droplet">
+<a:theme xmlns:a="http://schemas.openxmlformats.org/drawingml/2006/main" name="Damask">
   <a:themeElements>
-    <a:clrScheme name="Droplet">
+    <a:clrScheme name="Damask">
       <a:dk1>
         <a:sysClr val="windowText" lastClr="000000"/>
       </a:dk1>
@@ -7473,39 +6548,39 @@
         <a:sysClr val="window" lastClr="FFFFFF"/>
       </a:lt1>
       <a:dk2>
-        <a:srgbClr val="355071"/>
+        <a:srgbClr val="2A5B7F"/>
       </a:dk2>
       <a:lt2>
-        <a:srgbClr val="AABED7"/>
+        <a:srgbClr val="ABDAFC"/>
       </a:lt2>
       <a:accent1>
-        <a:srgbClr val="2FA3EE"/>
+        <a:srgbClr val="9EC544"/>
       </a:accent1>
       <a:accent2>
-        <a:srgbClr val="4BCAAD"/>
+        <a:srgbClr val="50BEA3"/>
       </a:accent2>
       <a:accent3>
-        <a:srgbClr val="86C157"/>
+        <a:srgbClr val="4A9CCC"/>
       </a:accent3>
       <a:accent4>
-        <a:srgbClr val="D99C3F"/>
+        <a:srgbClr val="9A66CA"/>
       </a:accent4>
       <a:accent5>
-        <a:srgbClr val="CE6633"/>
+        <a:srgbClr val="C54F71"/>
       </a:accent5>
       <a:accent6>
-        <a:srgbClr val="A35DD1"/>
+        <a:srgbClr val="DE9C3C"/>
       </a:accent6>
       <a:hlink>
-        <a:srgbClr val="56BCFE"/>
+        <a:srgbClr val="6BA9DA"/>
       </a:hlink>
       <a:folHlink>
-        <a:srgbClr val="97C5E3"/>
+        <a:srgbClr val="A0BCD3"/>
       </a:folHlink>
     </a:clrScheme>
-    <a:fontScheme name="Droplet">
+    <a:fontScheme name="Damask">
       <a:majorFont>
-        <a:latin typeface="Tw Cen MT" panose="020B0602020104020603"/>
+        <a:latin typeface="Bookman Old Style" panose="02050604050505020204"/>
         <a:ea typeface=""/>
         <a:cs typeface=""/>
         <a:font script="Jpan" typeface="ＭＳ Ｐゴシック"/>
@@ -7540,7 +6615,7 @@
         <a:font script="Geor" typeface="Sylfaen"/>
       </a:majorFont>
       <a:minorFont>
-        <a:latin typeface="Tw Cen MT" panose="020B0602020104020603"/>
+        <a:latin typeface="Rockwell" panose="02060603020205020403"/>
         <a:ea typeface=""/>
         <a:cs typeface=""/>
         <a:font script="Jpan" typeface="ＭＳ Ｐゴシック"/>
@@ -7575,39 +6650,50 @@
         <a:font script="Geor" typeface="Sylfaen"/>
       </a:minorFont>
     </a:fontScheme>
-    <a:fmtScheme name="Droplet">
+    <a:fmtScheme name="Damask">
       <a:fillStyleLst>
         <a:solidFill>
           <a:schemeClr val="phClr"/>
         </a:solidFill>
-        <a:solidFill>
-          <a:schemeClr val="phClr">
-            <a:tint val="69000"/>
-            <a:satMod val="105000"/>
-            <a:lumMod val="110000"/>
-          </a:schemeClr>
-        </a:solidFill>
+        <a:gradFill rotWithShape="1">
+          <a:gsLst>
+            <a:gs pos="0">
+              <a:schemeClr val="phClr">
+                <a:tint val="48000"/>
+                <a:satMod val="105000"/>
+                <a:lumMod val="110000"/>
+              </a:schemeClr>
+            </a:gs>
+            <a:gs pos="100000">
+              <a:schemeClr val="phClr">
+                <a:tint val="78000"/>
+                <a:satMod val="109000"/>
+                <a:lumMod val="100000"/>
+              </a:schemeClr>
+            </a:gs>
+          </a:gsLst>
+          <a:lin ang="5400000" scaled="0"/>
+        </a:gradFill>
         <a:gradFill rotWithShape="1">
           <a:gsLst>
             <a:gs pos="0">
               <a:schemeClr val="phClr">
                 <a:tint val="94000"/>
                 <a:satMod val="100000"/>
-                <a:lumMod val="108000"/>
+                <a:lumMod val="104000"/>
               </a:schemeClr>
             </a:gs>
-            <a:gs pos="50000">
+            <a:gs pos="69000">
               <a:schemeClr val="phClr">
-                <a:tint val="98000"/>
-                <a:shade val="100000"/>
-                <a:satMod val="100000"/>
-                <a:lumMod val="100000"/>
+                <a:shade val="86000"/>
+                <a:satMod val="130000"/>
+                <a:lumMod val="102000"/>
               </a:schemeClr>
             </a:gs>
             <a:gs pos="100000">
               <a:schemeClr val="phClr">
                 <a:shade val="72000"/>
-                <a:satMod val="120000"/>
+                <a:satMod val="130000"/>
                 <a:lumMod val="100000"/>
               </a:schemeClr>
             </a:gs>
@@ -7616,21 +6702,19 @@
         </a:gradFill>
       </a:fillStyleLst>
       <a:lnStyleLst>
-        <a:ln w="9525" cap="flat" cmpd="sng" algn="ctr">
-          <a:solidFill>
-            <a:schemeClr val="phClr">
-              <a:shade val="60000"/>
-            </a:schemeClr>
-          </a:solidFill>
-          <a:prstDash val="solid"/>
-        </a:ln>
-        <a:ln w="15875" cap="flat" cmpd="sng" algn="ctr">
+        <a:ln w="12700" cap="flat" cmpd="sng" algn="ctr">
           <a:solidFill>
             <a:schemeClr val="phClr"/>
           </a:solidFill>
           <a:prstDash val="solid"/>
         </a:ln>
-        <a:ln w="22225" cap="flat" cmpd="sng" algn="ctr">
+        <a:ln w="19050" cap="flat" cmpd="sng" algn="ctr">
+          <a:solidFill>
+            <a:schemeClr val="phClr"/>
+          </a:solidFill>
+          <a:prstDash val="solid"/>
+        </a:ln>
+        <a:ln w="25400" cap="flat" cmpd="sng" algn="ctr">
           <a:solidFill>
             <a:schemeClr val="phClr"/>
           </a:solidFill>
@@ -7643,18 +6727,18 @@
         </a:effectStyle>
         <a:effectStyle>
           <a:effectLst>
-            <a:outerShdw blurRad="50800" dist="25400" dir="5400000" rotWithShape="0">
+            <a:outerShdw blurRad="50800" dist="38100" dir="5400000" sy="96000" rotWithShape="0">
               <a:srgbClr val="000000">
-                <a:alpha val="28000"/>
+                <a:alpha val="54000"/>
               </a:srgbClr>
             </a:outerShdw>
           </a:effectLst>
         </a:effectStyle>
         <a:effectStyle>
           <a:effectLst>
-            <a:outerShdw blurRad="63500" dist="25400" dir="5400000" algn="ctr" rotWithShape="0">
+            <a:outerShdw blurRad="76200" dist="38100" dir="5400000" algn="ctr" rotWithShape="0">
               <a:srgbClr val="000000">
-                <a:alpha val="69000"/>
+                <a:alpha val="76000"/>
               </a:srgbClr>
             </a:outerShdw>
           </a:effectLst>
@@ -7662,12 +6746,10 @@
             <a:camera prst="orthographicFront">
               <a:rot lat="0" lon="0" rev="0"/>
             </a:camera>
-            <a:lightRig rig="balanced" dir="t">
-              <a:rot lat="0" lon="0" rev="1200000"/>
-            </a:lightRig>
+            <a:lightRig rig="balanced" dir="t"/>
           </a:scene3d>
-          <a:sp3d prstMaterial="plastic">
-            <a:bevelT w="25400" h="25400"/>
+          <a:sp3d prstMaterial="matte">
+            <a:bevelT w="25400" h="25400" prst="relaxedInset"/>
           </a:sp3d>
         </a:effectStyle>
       </a:effectStyleLst>
@@ -7675,44 +6757,29 @@
         <a:solidFill>
           <a:schemeClr val="phClr"/>
         </a:solidFill>
-        <a:gradFill rotWithShape="1">
-          <a:gsLst>
-            <a:gs pos="0">
+        <a:solidFill>
+          <a:schemeClr val="phClr">
+            <a:tint val="95000"/>
+            <a:satMod val="170000"/>
+          </a:schemeClr>
+        </a:solidFill>
+        <a:blipFill rotWithShape="1">
+          <a:blip xmlns:r="http://schemas.openxmlformats.org/officeDocument/2006/relationships" r:embed="rId1">
+            <a:duotone>
               <a:schemeClr val="phClr">
-                <a:tint val="90000"/>
-                <a:lumMod val="110000"/>
+                <a:shade val="18000"/>
+                <a:satMod val="160000"/>
+                <a:lumMod val="28000"/>
               </a:schemeClr>
-            </a:gs>
-            <a:gs pos="100000">
               <a:schemeClr val="phClr">
-                <a:shade val="64000"/>
-                <a:lumMod val="88000"/>
+                <a:tint val="95000"/>
+                <a:satMod val="160000"/>
+                <a:lumMod val="116000"/>
               </a:schemeClr>
-            </a:gs>
-          </a:gsLst>
-          <a:lin ang="5400000" scaled="0"/>
-        </a:gradFill>
-        <a:gradFill rotWithShape="1">
-          <a:gsLst>
-            <a:gs pos="0">
-              <a:schemeClr val="phClr">
-                <a:tint val="84000"/>
-                <a:shade val="100000"/>
-                <a:hueMod val="130000"/>
-                <a:satMod val="150000"/>
-                <a:lumMod val="112000"/>
-              </a:schemeClr>
-            </a:gs>
-            <a:gs pos="100000">
-              <a:schemeClr val="phClr">
-                <a:shade val="92000"/>
-                <a:satMod val="140000"/>
-                <a:lumMod val="110000"/>
-              </a:schemeClr>
-            </a:gs>
-          </a:gsLst>
-          <a:lin ang="5400000" scaled="0"/>
-        </a:gradFill>
+            </a:duotone>
+          </a:blip>
+          <a:stretch/>
+        </a:blipFill>
       </a:bgFillStyleLst>
     </a:fmtScheme>
   </a:themeElements>
@@ -7720,7 +6787,7 @@
   <a:extraClrSchemeLst/>
   <a:extLst>
     <a:ext uri="{05A4C25C-085E-4340-85A3-A5531E510DB2}">
-      <thm15:themeFamily xmlns:thm15="http://schemas.microsoft.com/office/thememl/2012/main" name="Droplet" id="{8984A317-299A-4E50-B45D-BFC9EDE2337A}" vid="{A633B6A3-9E7F-4C10-9C98-2517A3134361}"/>
+      <thm15:themeFamily xmlns:thm15="http://schemas.microsoft.com/office/thememl/2012/main" name="Damask" id="{F9A299A0-33D0-4E0F-9F3F-7163E3744208}" vid="{746EEEEA-FB6A-406B-B510-531588D54811}"/>
     </a:ext>
   </a:extLst>
 </a:theme>

</xml_diff>

<commit_message>
Add KL Bdays too
</commit_message>
<xml_diff>
--- a/stosc_services/PPT/Birthday & Anniversaries.pptx
+++ b/stosc_services/PPT/Birthday & Anniversaries.pptx
@@ -248,7 +248,7 @@
           <a:p>
             <a:fld id="{48A87A34-81AB-432B-8DAE-1953F412C126}" type="datetimeFigureOut">
               <a:rPr lang="en-US" smtClean="0"/>
-              <a:t>5/29/2021</a:t>
+              <a:t>6/6/2021</a:t>
             </a:fld>
             <a:endParaRPr lang="en-US" dirty="0"/>
           </a:p>
@@ -536,7 +536,7 @@
             <a:fld id="{48A87A34-81AB-432B-8DAE-1953F412C126}" type="datetimeFigureOut">
               <a:rPr lang="en-US" smtClean="0"/>
               <a:pPr/>
-              <a:t>5/29/2021</a:t>
+              <a:t>6/6/2021</a:t>
             </a:fld>
             <a:endParaRPr lang="en-US" dirty="0"/>
           </a:p>
@@ -730,7 +730,7 @@
             <a:fld id="{48A87A34-81AB-432B-8DAE-1953F412C126}" type="datetimeFigureOut">
               <a:rPr lang="en-US" smtClean="0"/>
               <a:pPr/>
-              <a:t>5/29/2021</a:t>
+              <a:t>6/6/2021</a:t>
             </a:fld>
             <a:endParaRPr lang="en-US" dirty="0"/>
           </a:p>
@@ -993,7 +993,7 @@
             <a:fld id="{48A87A34-81AB-432B-8DAE-1953F412C126}" type="datetimeFigureOut">
               <a:rPr lang="en-US" smtClean="0"/>
               <a:pPr/>
-              <a:t>5/29/2021</a:t>
+              <a:t>6/6/2021</a:t>
             </a:fld>
             <a:endParaRPr lang="en-US" dirty="0"/>
           </a:p>
@@ -1419,7 +1419,7 @@
             <a:fld id="{48A87A34-81AB-432B-8DAE-1953F412C126}" type="datetimeFigureOut">
               <a:rPr lang="en-US" smtClean="0"/>
               <a:pPr/>
-              <a:t>5/29/2021</a:t>
+              <a:t>6/6/2021</a:t>
             </a:fld>
             <a:endParaRPr lang="en-US" dirty="0"/>
           </a:p>
@@ -1967,7 +1967,7 @@
             <a:fld id="{48A87A34-81AB-432B-8DAE-1953F412C126}" type="datetimeFigureOut">
               <a:rPr lang="en-US" smtClean="0"/>
               <a:pPr/>
-              <a:t>5/29/2021</a:t>
+              <a:t>6/6/2021</a:t>
             </a:fld>
             <a:endParaRPr lang="en-US" dirty="0"/>
           </a:p>
@@ -2809,7 +2809,7 @@
             <a:fld id="{48A87A34-81AB-432B-8DAE-1953F412C126}" type="datetimeFigureOut">
               <a:rPr lang="en-US" smtClean="0"/>
               <a:pPr/>
-              <a:t>5/29/2021</a:t>
+              <a:t>6/6/2021</a:t>
             </a:fld>
             <a:endParaRPr lang="en-US" dirty="0"/>
           </a:p>
@@ -2981,7 +2981,7 @@
             <a:fld id="{48A87A34-81AB-432B-8DAE-1953F412C126}" type="datetimeFigureOut">
               <a:rPr lang="en-US" smtClean="0"/>
               <a:pPr/>
-              <a:t>5/29/2021</a:t>
+              <a:t>6/6/2021</a:t>
             </a:fld>
             <a:endParaRPr lang="en-US" dirty="0"/>
           </a:p>
@@ -3167,7 +3167,7 @@
             <a:fld id="{48A87A34-81AB-432B-8DAE-1953F412C126}" type="datetimeFigureOut">
               <a:rPr lang="en-US" smtClean="0"/>
               <a:pPr/>
-              <a:t>5/29/2021</a:t>
+              <a:t>6/6/2021</a:t>
             </a:fld>
             <a:endParaRPr lang="en-US" dirty="0"/>
           </a:p>
@@ -3339,7 +3339,7 @@
             <a:fld id="{48A87A34-81AB-432B-8DAE-1953F412C126}" type="datetimeFigureOut">
               <a:rPr lang="en-US" smtClean="0"/>
               <a:pPr/>
-              <a:t>5/29/2021</a:t>
+              <a:t>6/6/2021</a:t>
             </a:fld>
             <a:endParaRPr lang="en-US" dirty="0"/>
           </a:p>
@@ -3588,7 +3588,7 @@
           <a:p>
             <a:fld id="{48A87A34-81AB-432B-8DAE-1953F412C126}" type="datetimeFigureOut">
               <a:rPr lang="en-US" smtClean="0"/>
-              <a:t>5/29/2021</a:t>
+              <a:t>6/6/2021</a:t>
             </a:fld>
             <a:endParaRPr lang="en-US" dirty="0"/>
           </a:p>
@@ -3826,7 +3826,7 @@
             <a:fld id="{48A87A34-81AB-432B-8DAE-1953F412C126}" type="datetimeFigureOut">
               <a:rPr lang="en-US" smtClean="0"/>
               <a:pPr/>
-              <a:t>5/29/2021</a:t>
+              <a:t>6/6/2021</a:t>
             </a:fld>
             <a:endParaRPr lang="en-US" dirty="0"/>
           </a:p>
@@ -4201,7 +4201,7 @@
             <a:fld id="{48A87A34-81AB-432B-8DAE-1953F412C126}" type="datetimeFigureOut">
               <a:rPr lang="en-US" smtClean="0"/>
               <a:pPr/>
-              <a:t>5/29/2021</a:t>
+              <a:t>6/6/2021</a:t>
             </a:fld>
             <a:endParaRPr lang="en-US" dirty="0"/>
           </a:p>
@@ -4320,7 +4320,7 @@
           <a:p>
             <a:fld id="{48A87A34-81AB-432B-8DAE-1953F412C126}" type="datetimeFigureOut">
               <a:rPr lang="en-US" smtClean="0"/>
-              <a:t>5/29/2021</a:t>
+              <a:t>6/6/2021</a:t>
             </a:fld>
             <a:endParaRPr lang="en-US" dirty="0"/>
           </a:p>
@@ -4415,7 +4415,7 @@
           <a:p>
             <a:fld id="{48A87A34-81AB-432B-8DAE-1953F412C126}" type="datetimeFigureOut">
               <a:rPr lang="en-US" smtClean="0"/>
-              <a:t>5/29/2021</a:t>
+              <a:t>6/6/2021</a:t>
             </a:fld>
             <a:endParaRPr lang="en-US" dirty="0"/>
           </a:p>
@@ -4667,7 +4667,7 @@
             <a:fld id="{48A87A34-81AB-432B-8DAE-1953F412C126}" type="datetimeFigureOut">
               <a:rPr lang="en-US" smtClean="0"/>
               <a:pPr/>
-              <a:t>5/29/2021</a:t>
+              <a:t>6/6/2021</a:t>
             </a:fld>
             <a:endParaRPr lang="en-US" dirty="0"/>
           </a:p>
@@ -4955,7 +4955,7 @@
           <a:p>
             <a:fld id="{48A87A34-81AB-432B-8DAE-1953F412C126}" type="datetimeFigureOut">
               <a:rPr lang="en-US" smtClean="0"/>
-              <a:t>5/29/2021</a:t>
+              <a:t>6/6/2021</a:t>
             </a:fld>
             <a:endParaRPr lang="en-US" dirty="0"/>
           </a:p>
@@ -5169,7 +5169,7 @@
             <a:fld id="{48A87A34-81AB-432B-8DAE-1953F412C126}" type="datetimeFigureOut">
               <a:rPr lang="en-US" smtClean="0"/>
               <a:pPr/>
-              <a:t>5/29/2021</a:t>
+              <a:t>6/6/2021</a:t>
             </a:fld>
             <a:endParaRPr lang="en-US" dirty="0"/>
           </a:p>
@@ -5720,7 +5720,15 @@
             </a:pPr>
             <a:r>
               <a:rPr lang="en-US" sz="2400" dirty="0"/>
-              <a:t>Mrs. Manju Abraham</a:t>
+              <a:t>• Mr. </a:t>
+            </a:r>
+            <a:r>
+              <a:rPr lang="en-US" sz="2400" dirty="0" err="1"/>
+              <a:t>Siby</a:t>
+            </a:r>
+            <a:r>
+              <a:rPr lang="en-US" sz="2400" dirty="0"/>
+              <a:t> Varghese (S053)</a:t>
             </a:r>
           </a:p>
           <a:p>
@@ -5735,15 +5743,7 @@
             </a:pPr>
             <a:r>
               <a:rPr lang="en-US" sz="2400" dirty="0"/>
-              <a:t>Mr. </a:t>
-            </a:r>
-            <a:r>
-              <a:rPr lang="en-US" sz="2400" dirty="0" err="1"/>
-              <a:t>Saji</a:t>
-            </a:r>
-            <a:r>
-              <a:rPr lang="en-US" sz="2400" dirty="0"/>
-              <a:t> Varghese</a:t>
+              <a:t>• Mrs. Belinda Khoo Min Li (S003)</a:t>
             </a:r>
           </a:p>
           <a:p>
@@ -5758,7 +5758,15 @@
             </a:pPr>
             <a:r>
               <a:rPr lang="en-US" sz="2400" dirty="0"/>
-              <a:t>Hannah Elsa John</a:t>
+              <a:t>• Dr. </a:t>
+            </a:r>
+            <a:r>
+              <a:rPr lang="en-US" sz="2400" dirty="0" err="1"/>
+              <a:t>Jobichen</a:t>
+            </a:r>
+            <a:r>
+              <a:rPr lang="en-US" sz="2400" dirty="0"/>
+              <a:t> Chacko (J035)</a:t>
             </a:r>
           </a:p>
           <a:p>
@@ -5773,15 +5781,15 @@
             </a:pPr>
             <a:r>
               <a:rPr lang="en-US" sz="2400" dirty="0"/>
-              <a:t>Mr. </a:t>
+              <a:t>• Mr. </a:t>
             </a:r>
             <a:r>
               <a:rPr lang="en-US" sz="2400" dirty="0" err="1"/>
-              <a:t>Varkey</a:t>
+              <a:t>Shajan</a:t>
             </a:r>
             <a:r>
               <a:rPr lang="en-US" sz="2400" dirty="0"/>
-              <a:t> Cherian</a:t>
+              <a:t> K Thomas (S073)</a:t>
             </a:r>
           </a:p>
           <a:p>
@@ -5796,15 +5804,7 @@
             </a:pPr>
             <a:r>
               <a:rPr lang="en-US" sz="2400" dirty="0"/>
-              <a:t>Mr. Joseph </a:t>
-            </a:r>
-            <a:r>
-              <a:rPr lang="en-US" sz="2400" dirty="0" err="1"/>
-              <a:t>Kalloopparampil</a:t>
-            </a:r>
-            <a:r>
-              <a:rPr lang="en-US" sz="2400" dirty="0"/>
-              <a:t> Mathew</a:t>
+              <a:t>• Nina Elizabeth Varghese (R004)</a:t>
             </a:r>
           </a:p>
           <a:p>
@@ -5819,15 +5819,7 @@
             </a:pPr>
             <a:r>
               <a:rPr lang="en-US" sz="2400" dirty="0"/>
-              <a:t>Dr. </a:t>
-            </a:r>
-            <a:r>
-              <a:rPr lang="en-US" sz="2400" dirty="0" err="1"/>
-              <a:t>Sibi</a:t>
-            </a:r>
-            <a:r>
-              <a:rPr lang="en-US" sz="2400" dirty="0"/>
-              <a:t> Sunny</a:t>
+              <a:t>• Mr. Robbin Mathew (R019)</a:t>
             </a:r>
           </a:p>
           <a:p>
@@ -5842,15 +5834,15 @@
             </a:pPr>
             <a:r>
               <a:rPr lang="en-US" sz="2400" dirty="0"/>
-              <a:t>Mrs. </a:t>
+              <a:t>• Mrs. </a:t>
             </a:r>
             <a:r>
               <a:rPr lang="en-US" sz="2400" dirty="0" err="1"/>
-              <a:t>Princy</a:t>
+              <a:t>Renu</a:t>
             </a:r>
             <a:r>
               <a:rPr lang="en-US" sz="2400" dirty="0"/>
-              <a:t> Abraham</a:t>
+              <a:t> Shaji (S066)</a:t>
             </a:r>
           </a:p>
           <a:p>
@@ -5865,7 +5857,15 @@
             </a:pPr>
             <a:r>
               <a:rPr lang="en-US" sz="2400" dirty="0"/>
-              <a:t>Christy Mariam George</a:t>
+              <a:t>• Mr. Abraham C </a:t>
+            </a:r>
+            <a:r>
+              <a:rPr lang="en-US" sz="2400" dirty="0" err="1"/>
+              <a:t>C</a:t>
+            </a:r>
+            <a:r>
+              <a:rPr lang="en-US" sz="2400" dirty="0"/>
+              <a:t> (A001)</a:t>
             </a:r>
           </a:p>
         </p:txBody>
@@ -5903,21 +5903,8 @@
             </a:pPr>
             <a:r>
               <a:rPr lang="en-US" sz="2400" dirty="0"/>
-              <a:t>Mrs. </a:t>
-            </a:r>
-            <a:r>
-              <a:rPr lang="en-US" sz="2400" dirty="0" err="1"/>
-              <a:t>Ronia</a:t>
-            </a:r>
-            <a:r>
-              <a:rPr lang="en-US" sz="2400" dirty="0"/>
-              <a:t> Sara </a:t>
-            </a:r>
-            <a:r>
-              <a:rPr lang="en-US" sz="2400" dirty="0" err="1"/>
-              <a:t>Rajan</a:t>
-            </a:r>
-            <a:endParaRPr lang="en-US" sz="2400" dirty="0"/>
+              <a:t>• Aaron Koshy Thomas (T039)</a:t>
+            </a:r>
           </a:p>
           <a:p>
             <a:pPr marL="0" indent="0">
@@ -5931,15 +5918,23 @@
             </a:pPr>
             <a:r>
               <a:rPr lang="en-US" sz="2400" dirty="0"/>
-              <a:t>Miss </a:t>
+              <a:t>• Mr. </a:t>
             </a:r>
             <a:r>
               <a:rPr lang="en-US" sz="2400" dirty="0" err="1"/>
-              <a:t>Aanchal</a:t>
+              <a:t>Bijwish</a:t>
             </a:r>
             <a:r>
               <a:rPr lang="en-US" sz="2400" dirty="0"/>
-              <a:t> Koshy</a:t>
+              <a:t> T. </a:t>
+            </a:r>
+            <a:r>
+              <a:rPr lang="en-US" sz="2400" dirty="0" err="1"/>
+              <a:t>Oommen</a:t>
+            </a:r>
+            <a:r>
+              <a:rPr lang="en-US" sz="2400" dirty="0"/>
+              <a:t> (B023)</a:t>
             </a:r>
           </a:p>
           <a:p>
@@ -5954,7 +5949,7 @@
             </a:pPr>
             <a:r>
               <a:rPr lang="en-US" sz="2400" dirty="0"/>
-              <a:t>Mrs. Grace Bobby</a:t>
+              <a:t>• Ann Varghese (V011)</a:t>
             </a:r>
           </a:p>
           <a:p>
@@ -5969,7 +5964,15 @@
             </a:pPr>
             <a:r>
               <a:rPr lang="en-US" sz="2400" dirty="0"/>
-              <a:t>Ayden Abraham Anish</a:t>
+              <a:t>• Mr. Thomas </a:t>
+            </a:r>
+            <a:r>
+              <a:rPr lang="en-US" sz="2400" dirty="0" err="1"/>
+              <a:t>Oommen</a:t>
+            </a:r>
+            <a:r>
+              <a:rPr lang="en-US" sz="2400" dirty="0"/>
+              <a:t> (T041)</a:t>
             </a:r>
           </a:p>
           <a:p>
@@ -5984,7 +5987,15 @@
             </a:pPr>
             <a:r>
               <a:rPr lang="en-US" sz="2400" dirty="0"/>
-              <a:t>Mr. Stephen John</a:t>
+              <a:t>• Mr. Thomas </a:t>
+            </a:r>
+            <a:r>
+              <a:rPr lang="en-US" sz="2400" dirty="0" err="1"/>
+              <a:t>Panicker</a:t>
+            </a:r>
+            <a:r>
+              <a:rPr lang="en-US" sz="2400" dirty="0"/>
+              <a:t> Sandy (T012)</a:t>
             </a:r>
           </a:p>
           <a:p>
@@ -5999,7 +6010,7 @@
             </a:pPr>
             <a:r>
               <a:rPr lang="en-US" sz="2400" dirty="0"/>
-              <a:t>Mr. Rubin Varughese</a:t>
+              <a:t>• Dr. Jaya Philip (B014)</a:t>
             </a:r>
           </a:p>
           <a:p>
@@ -6014,21 +6025,8 @@
             </a:pPr>
             <a:r>
               <a:rPr lang="en-US" sz="2400" dirty="0"/>
-              <a:t>Mrs. </a:t>
-            </a:r>
-            <a:r>
-              <a:rPr lang="en-US" sz="2400" dirty="0" err="1"/>
-              <a:t>Amala</a:t>
-            </a:r>
-            <a:r>
-              <a:rPr lang="en-US" sz="2400" dirty="0"/>
-              <a:t> Mary </a:t>
-            </a:r>
-            <a:r>
-              <a:rPr lang="en-US" sz="2400" dirty="0" err="1"/>
-              <a:t>Johny</a:t>
-            </a:r>
-            <a:endParaRPr lang="en-US" sz="2400" dirty="0"/>
+              <a:t>• Joanna Robbin (R019)</a:t>
+            </a:r>
           </a:p>
           <a:p>
             <a:pPr marL="0" indent="0">
@@ -6042,7 +6040,15 @@
             </a:pPr>
             <a:r>
               <a:rPr lang="en-US" sz="2400" dirty="0"/>
-              <a:t>Mr. Johnson P John</a:t>
+              <a:t>• Mrs. Vidya </a:t>
+            </a:r>
+            <a:r>
+              <a:rPr lang="en-US" sz="2400" dirty="0" err="1"/>
+              <a:t>Oommen</a:t>
+            </a:r>
+            <a:r>
+              <a:rPr lang="en-US" sz="2400" dirty="0"/>
+              <a:t> (O001)</a:t>
             </a:r>
           </a:p>
         </p:txBody>
@@ -6105,15 +6111,15 @@
             </a:r>
             <a:r>
               <a:rPr lang="en-US" sz="1800" b="1" dirty="0"/>
-              <a:t> 24</a:t>
+              <a:t> 31</a:t>
             </a:r>
             <a:r>
               <a:rPr lang="en-US" sz="1800" b="1" baseline="30000" dirty="0"/>
-              <a:t>th </a:t>
+              <a:t>st</a:t>
             </a:r>
             <a:r>
               <a:rPr lang="en-US" sz="1800" b="1" dirty="0"/>
-              <a:t>– MAY 30</a:t>
+              <a:t>– JUNE 6</a:t>
             </a:r>
             <a:r>
               <a:rPr lang="en-US" sz="1800" b="1" baseline="30000" dirty="0"/>
@@ -6268,7 +6274,15 @@
             </a:pPr>
             <a:r>
               <a:rPr lang="en-US" sz="2400" dirty="0"/>
-              <a:t>Mr. Roby Varghese</a:t>
+              <a:t>• Mrs. </a:t>
+            </a:r>
+            <a:r>
+              <a:rPr lang="en-US" sz="2400" dirty="0" err="1"/>
+              <a:t>Shyja</a:t>
+            </a:r>
+            <a:r>
+              <a:rPr lang="en-US" sz="2400" dirty="0"/>
+              <a:t> Samuel (S078)</a:t>
             </a:r>
           </a:p>
           <a:p>
@@ -6283,7 +6297,7 @@
             </a:pPr>
             <a:r>
               <a:rPr lang="en-US" sz="2400" dirty="0"/>
-              <a:t>Mrs. Lizzy John</a:t>
+              <a:t>• Ashley Thomas Philip (T014)</a:t>
             </a:r>
           </a:p>
           <a:p>
@@ -6298,15 +6312,15 @@
             </a:pPr>
             <a:r>
               <a:rPr lang="en-US" sz="2400" dirty="0"/>
-              <a:t>Mr. </a:t>
+              <a:t>• </a:t>
             </a:r>
             <a:r>
               <a:rPr lang="en-US" sz="2400" dirty="0" err="1"/>
-              <a:t>Shiju</a:t>
+              <a:t>Dhanya</a:t>
             </a:r>
             <a:r>
               <a:rPr lang="en-US" sz="2400" dirty="0"/>
-              <a:t> Varghese Joyce</a:t>
+              <a:t> John (J010)</a:t>
             </a:r>
           </a:p>
           <a:p>
@@ -6321,7 +6335,7 @@
             </a:pPr>
             <a:r>
               <a:rPr lang="en-US" sz="2400" dirty="0"/>
-              <a:t>Ashlyn Mathew</a:t>
+              <a:t>• Amil Joshua Philip (P015)</a:t>
             </a:r>
           </a:p>
           <a:p>
@@ -6336,15 +6350,23 @@
             </a:pPr>
             <a:r>
               <a:rPr lang="en-US" sz="2400" dirty="0"/>
-              <a:t>Mrs. </a:t>
+              <a:t>• Mrs. </a:t>
             </a:r>
             <a:r>
               <a:rPr lang="en-US" sz="2400" dirty="0" err="1"/>
-              <a:t>Rency</a:t>
+              <a:t>Saramma</a:t>
             </a:r>
             <a:r>
               <a:rPr lang="en-US" sz="2400" dirty="0"/>
-              <a:t> Manoj</a:t>
+              <a:t> </a:t>
+            </a:r>
+            <a:r>
+              <a:rPr lang="en-US" sz="2400" dirty="0" err="1"/>
+              <a:t>Mathen</a:t>
+            </a:r>
+            <a:r>
+              <a:rPr lang="en-US" sz="2400" dirty="0"/>
+              <a:t> (M008)</a:t>
             </a:r>
           </a:p>
           <a:p>
@@ -6359,13 +6381,61 @@
             </a:pPr>
             <a:r>
               <a:rPr lang="en-US" sz="2400" dirty="0"/>
-              <a:t>Mr. John </a:t>
+              <a:t>• Mr. George Thomas (G010)</a:t>
+            </a:r>
+          </a:p>
+          <a:p>
+            <a:pPr marL="0" indent="0">
+              <a:lnSpc>
+                <a:spcPct val="110000"/>
+              </a:lnSpc>
+              <a:spcBef>
+                <a:spcPts val="600"/>
+              </a:spcBef>
+              <a:buNone/>
+            </a:pPr>
+            <a:r>
+              <a:rPr lang="en-US" sz="2400" dirty="0"/>
+              <a:t>• Ravi Abraham Varghese (R004)</a:t>
+            </a:r>
+          </a:p>
+          <a:p>
+            <a:pPr marL="0" indent="0">
+              <a:lnSpc>
+                <a:spcPct val="110000"/>
+              </a:lnSpc>
+              <a:spcBef>
+                <a:spcPts val="600"/>
+              </a:spcBef>
+              <a:buNone/>
+            </a:pPr>
+            <a:r>
+              <a:rPr lang="en-US" sz="2400" dirty="0"/>
+              <a:t>• Chris </a:t>
             </a:r>
             <a:r>
               <a:rPr lang="en-US" sz="2400" dirty="0" err="1"/>
-              <a:t>Kunchandy</a:t>
-            </a:r>
-            <a:endParaRPr lang="en-US" sz="2400" dirty="0"/>
+              <a:t>Panackamittathu</a:t>
+            </a:r>
+            <a:r>
+              <a:rPr lang="en-US" sz="2400" dirty="0"/>
+              <a:t> Alex (T035)</a:t>
+            </a:r>
+          </a:p>
+          <a:p>
+            <a:pPr marL="0" indent="0">
+              <a:lnSpc>
+                <a:spcPct val="110000"/>
+              </a:lnSpc>
+              <a:spcBef>
+                <a:spcPts val="600"/>
+              </a:spcBef>
+              <a:buNone/>
+            </a:pPr>
+            <a:r>
+              <a:rPr lang="en-US" sz="2400" dirty="0"/>
+              <a:t>• Tina Jacob (T006)</a:t>
+            </a:r>
           </a:p>
         </p:txBody>
       </p:sp>
@@ -6427,15 +6497,15 @@
             </a:r>
             <a:r>
               <a:rPr lang="en-US" sz="1800" b="1" dirty="0"/>
-              <a:t> 24</a:t>
+              <a:t> 31</a:t>
             </a:r>
             <a:r>
               <a:rPr lang="en-US" sz="1800" b="1" baseline="30000" dirty="0"/>
-              <a:t>th </a:t>
+              <a:t>st</a:t>
             </a:r>
             <a:r>
               <a:rPr lang="en-US" sz="1800" b="1" dirty="0"/>
-              <a:t>– MAY 30</a:t>
+              <a:t>– JUNE 6</a:t>
             </a:r>
             <a:r>
               <a:rPr lang="en-US" sz="1800" b="1" baseline="30000" dirty="0"/>
@@ -7028,86 +7098,7 @@
             </a:pPr>
             <a:r>
               <a:rPr lang="en-US" sz="2800" dirty="0"/>
-              <a:t>Mr. George Daniel AND Mrs. Emil Sunny</a:t>
-            </a:r>
-          </a:p>
-          <a:p>
-            <a:pPr>
-              <a:lnSpc>
-                <a:spcPct val="110000"/>
-              </a:lnSpc>
-              <a:spcBef>
-                <a:spcPts val="600"/>
-              </a:spcBef>
-            </a:pPr>
-            <a:r>
-              <a:rPr lang="en-US" sz="2800" dirty="0"/>
-              <a:t>Mr. </a:t>
-            </a:r>
-            <a:r>
-              <a:rPr lang="en-US" sz="2800" dirty="0" err="1"/>
-              <a:t>Clifferd</a:t>
-            </a:r>
-            <a:r>
-              <a:rPr lang="en-US" sz="2800" dirty="0"/>
-              <a:t> Noronha AND Mrs. Maria </a:t>
-            </a:r>
-            <a:r>
-              <a:rPr lang="en-US" sz="2800" dirty="0" err="1"/>
-              <a:t>Solomy</a:t>
-            </a:r>
-            <a:r>
-              <a:rPr lang="en-US" sz="2800" dirty="0"/>
-              <a:t> </a:t>
-            </a:r>
-            <a:r>
-              <a:rPr lang="en-US" sz="2800" dirty="0" err="1"/>
-              <a:t>Dsilva</a:t>
-            </a:r>
-            <a:endParaRPr lang="en-US" sz="2800" dirty="0"/>
-          </a:p>
-          <a:p>
-            <a:pPr>
-              <a:lnSpc>
-                <a:spcPct val="110000"/>
-              </a:lnSpc>
-              <a:spcBef>
-                <a:spcPts val="600"/>
-              </a:spcBef>
-            </a:pPr>
-            <a:r>
-              <a:rPr lang="en-US" sz="2800" dirty="0"/>
-              <a:t>Mr. </a:t>
-            </a:r>
-            <a:r>
-              <a:rPr lang="en-US" sz="2800" dirty="0" err="1"/>
-              <a:t>Renol</a:t>
-            </a:r>
-            <a:r>
-              <a:rPr lang="en-US" sz="2800" dirty="0"/>
-              <a:t> Thomas Mathew AND Mrs. Reena </a:t>
-            </a:r>
-            <a:r>
-              <a:rPr lang="en-US" sz="2800" dirty="0" err="1"/>
-              <a:t>Renol</a:t>
-            </a:r>
-            <a:r>
-              <a:rPr lang="en-US" sz="2800" dirty="0"/>
-              <a:t> Thomas</a:t>
-            </a:r>
-          </a:p>
-          <a:p>
-            <a:pPr>
-              <a:lnSpc>
-                <a:spcPct val="110000"/>
-              </a:lnSpc>
-              <a:spcBef>
-                <a:spcPts val="600"/>
-              </a:spcBef>
-            </a:pPr>
-            <a:r>
-              <a:rPr lang="en-US" sz="2800" dirty="0"/>
-              <a:t>Mr. Alexander George AND Mrs. Bindu Alexander</a:t>
+              <a:t>Mr. Sunny K Paul AND Mrs. Moly Sunny (S006)</a:t>
             </a:r>
           </a:p>
         </p:txBody>
@@ -7229,15 +7220,15 @@
             </a:r>
             <a:r>
               <a:rPr lang="en-US" sz="1800" b="1" dirty="0"/>
-              <a:t> 24</a:t>
+              <a:t> 31</a:t>
             </a:r>
             <a:r>
               <a:rPr lang="en-US" sz="1800" b="1" baseline="30000" dirty="0"/>
-              <a:t>th </a:t>
+              <a:t>st</a:t>
             </a:r>
             <a:r>
               <a:rPr lang="en-US" sz="1800" b="1" dirty="0"/>
-              <a:t>– MAY 30</a:t>
+              <a:t>– JUNE 6</a:t>
             </a:r>
             <a:r>
               <a:rPr lang="en-US" sz="1800" b="1" baseline="30000" dirty="0"/>

</xml_diff>

<commit_message>
Local updates from church pc
</commit_message>
<xml_diff>
--- a/stosc_services/PPT/Birthday & Anniversaries.pptx
+++ b/stosc_services/PPT/Birthday & Anniversaries.pptx
@@ -6,9 +6,8 @@
   </p:sldMasterIdLst>
   <p:sldIdLst>
     <p:sldId id="263" r:id="rId2"/>
-    <p:sldId id="261" r:id="rId3"/>
+    <p:sldId id="258" r:id="rId3"/>
     <p:sldId id="264" r:id="rId4"/>
-    <p:sldId id="258" r:id="rId5"/>
   </p:sldIdLst>
   <p:sldSz cx="12192000" cy="6858000"/>
   <p:notesSz cx="6858000" cy="9144000"/>
@@ -248,7 +247,7 @@
           <a:p>
             <a:fld id="{48A87A34-81AB-432B-8DAE-1953F412C126}" type="datetimeFigureOut">
               <a:rPr lang="en-US" smtClean="0"/>
-              <a:t>6/6/2021</a:t>
+              <a:t>8/1/2021</a:t>
             </a:fld>
             <a:endParaRPr lang="en-US" dirty="0"/>
           </a:p>
@@ -536,7 +535,7 @@
             <a:fld id="{48A87A34-81AB-432B-8DAE-1953F412C126}" type="datetimeFigureOut">
               <a:rPr lang="en-US" smtClean="0"/>
               <a:pPr/>
-              <a:t>6/6/2021</a:t>
+              <a:t>8/1/2021</a:t>
             </a:fld>
             <a:endParaRPr lang="en-US" dirty="0"/>
           </a:p>
@@ -730,7 +729,7 @@
             <a:fld id="{48A87A34-81AB-432B-8DAE-1953F412C126}" type="datetimeFigureOut">
               <a:rPr lang="en-US" smtClean="0"/>
               <a:pPr/>
-              <a:t>6/6/2021</a:t>
+              <a:t>8/1/2021</a:t>
             </a:fld>
             <a:endParaRPr lang="en-US" dirty="0"/>
           </a:p>
@@ -993,7 +992,7 @@
             <a:fld id="{48A87A34-81AB-432B-8DAE-1953F412C126}" type="datetimeFigureOut">
               <a:rPr lang="en-US" smtClean="0"/>
               <a:pPr/>
-              <a:t>6/6/2021</a:t>
+              <a:t>8/1/2021</a:t>
             </a:fld>
             <a:endParaRPr lang="en-US" dirty="0"/>
           </a:p>
@@ -1419,7 +1418,7 @@
             <a:fld id="{48A87A34-81AB-432B-8DAE-1953F412C126}" type="datetimeFigureOut">
               <a:rPr lang="en-US" smtClean="0"/>
               <a:pPr/>
-              <a:t>6/6/2021</a:t>
+              <a:t>8/1/2021</a:t>
             </a:fld>
             <a:endParaRPr lang="en-US" dirty="0"/>
           </a:p>
@@ -1967,7 +1966,7 @@
             <a:fld id="{48A87A34-81AB-432B-8DAE-1953F412C126}" type="datetimeFigureOut">
               <a:rPr lang="en-US" smtClean="0"/>
               <a:pPr/>
-              <a:t>6/6/2021</a:t>
+              <a:t>8/1/2021</a:t>
             </a:fld>
             <a:endParaRPr lang="en-US" dirty="0"/>
           </a:p>
@@ -2809,7 +2808,7 @@
             <a:fld id="{48A87A34-81AB-432B-8DAE-1953F412C126}" type="datetimeFigureOut">
               <a:rPr lang="en-US" smtClean="0"/>
               <a:pPr/>
-              <a:t>6/6/2021</a:t>
+              <a:t>8/1/2021</a:t>
             </a:fld>
             <a:endParaRPr lang="en-US" dirty="0"/>
           </a:p>
@@ -2981,7 +2980,7 @@
             <a:fld id="{48A87A34-81AB-432B-8DAE-1953F412C126}" type="datetimeFigureOut">
               <a:rPr lang="en-US" smtClean="0"/>
               <a:pPr/>
-              <a:t>6/6/2021</a:t>
+              <a:t>8/1/2021</a:t>
             </a:fld>
             <a:endParaRPr lang="en-US" dirty="0"/>
           </a:p>
@@ -3167,7 +3166,7 @@
             <a:fld id="{48A87A34-81AB-432B-8DAE-1953F412C126}" type="datetimeFigureOut">
               <a:rPr lang="en-US" smtClean="0"/>
               <a:pPr/>
-              <a:t>6/6/2021</a:t>
+              <a:t>8/1/2021</a:t>
             </a:fld>
             <a:endParaRPr lang="en-US" dirty="0"/>
           </a:p>
@@ -3339,7 +3338,7 @@
             <a:fld id="{48A87A34-81AB-432B-8DAE-1953F412C126}" type="datetimeFigureOut">
               <a:rPr lang="en-US" smtClean="0"/>
               <a:pPr/>
-              <a:t>6/6/2021</a:t>
+              <a:t>8/1/2021</a:t>
             </a:fld>
             <a:endParaRPr lang="en-US" dirty="0"/>
           </a:p>
@@ -3588,7 +3587,7 @@
           <a:p>
             <a:fld id="{48A87A34-81AB-432B-8DAE-1953F412C126}" type="datetimeFigureOut">
               <a:rPr lang="en-US" smtClean="0"/>
-              <a:t>6/6/2021</a:t>
+              <a:t>8/1/2021</a:t>
             </a:fld>
             <a:endParaRPr lang="en-US" dirty="0"/>
           </a:p>
@@ -3826,7 +3825,7 @@
             <a:fld id="{48A87A34-81AB-432B-8DAE-1953F412C126}" type="datetimeFigureOut">
               <a:rPr lang="en-US" smtClean="0"/>
               <a:pPr/>
-              <a:t>6/6/2021</a:t>
+              <a:t>8/1/2021</a:t>
             </a:fld>
             <a:endParaRPr lang="en-US" dirty="0"/>
           </a:p>
@@ -4201,7 +4200,7 @@
             <a:fld id="{48A87A34-81AB-432B-8DAE-1953F412C126}" type="datetimeFigureOut">
               <a:rPr lang="en-US" smtClean="0"/>
               <a:pPr/>
-              <a:t>6/6/2021</a:t>
+              <a:t>8/1/2021</a:t>
             </a:fld>
             <a:endParaRPr lang="en-US" dirty="0"/>
           </a:p>
@@ -4320,7 +4319,7 @@
           <a:p>
             <a:fld id="{48A87A34-81AB-432B-8DAE-1953F412C126}" type="datetimeFigureOut">
               <a:rPr lang="en-US" smtClean="0"/>
-              <a:t>6/6/2021</a:t>
+              <a:t>8/1/2021</a:t>
             </a:fld>
             <a:endParaRPr lang="en-US" dirty="0"/>
           </a:p>
@@ -4415,7 +4414,7 @@
           <a:p>
             <a:fld id="{48A87A34-81AB-432B-8DAE-1953F412C126}" type="datetimeFigureOut">
               <a:rPr lang="en-US" smtClean="0"/>
-              <a:t>6/6/2021</a:t>
+              <a:t>8/1/2021</a:t>
             </a:fld>
             <a:endParaRPr lang="en-US" dirty="0"/>
           </a:p>
@@ -4667,7 +4666,7 @@
             <a:fld id="{48A87A34-81AB-432B-8DAE-1953F412C126}" type="datetimeFigureOut">
               <a:rPr lang="en-US" smtClean="0"/>
               <a:pPr/>
-              <a:t>6/6/2021</a:t>
+              <a:t>8/1/2021</a:t>
             </a:fld>
             <a:endParaRPr lang="en-US" dirty="0"/>
           </a:p>
@@ -4955,7 +4954,7 @@
           <a:p>
             <a:fld id="{48A87A34-81AB-432B-8DAE-1953F412C126}" type="datetimeFigureOut">
               <a:rPr lang="en-US" smtClean="0"/>
-              <a:t>6/6/2021</a:t>
+              <a:t>8/1/2021</a:t>
             </a:fld>
             <a:endParaRPr lang="en-US" dirty="0"/>
           </a:p>
@@ -5169,7 +5168,7 @@
             <a:fld id="{48A87A34-81AB-432B-8DAE-1953F412C126}" type="datetimeFigureOut">
               <a:rPr lang="en-US" smtClean="0"/>
               <a:pPr/>
-              <a:t>6/6/2021</a:t>
+              <a:t>8/1/2021</a:t>
             </a:fld>
             <a:endParaRPr lang="en-US" dirty="0"/>
           </a:p>
@@ -5720,15 +5719,7 @@
             </a:pPr>
             <a:r>
               <a:rPr lang="en-US" sz="2400" dirty="0"/>
-              <a:t>• Mr. </a:t>
-            </a:r>
-            <a:r>
-              <a:rPr lang="en-US" sz="2400" dirty="0" err="1"/>
-              <a:t>Siby</a:t>
-            </a:r>
-            <a:r>
-              <a:rPr lang="en-US" sz="2400" dirty="0"/>
-              <a:t> Varghese (S053)</a:t>
+              <a:t>Mr. Robin Thomas (R033)</a:t>
             </a:r>
           </a:p>
           <a:p>
@@ -5743,7 +5734,7 @@
             </a:pPr>
             <a:r>
               <a:rPr lang="en-US" sz="2400" dirty="0"/>
-              <a:t>• Mrs. Belinda Khoo Min Li (S003)</a:t>
+              <a:t>Miriam (A005)</a:t>
             </a:r>
           </a:p>
           <a:p>
@@ -5758,15 +5749,7 @@
             </a:pPr>
             <a:r>
               <a:rPr lang="en-US" sz="2400" dirty="0"/>
-              <a:t>• Dr. </a:t>
-            </a:r>
-            <a:r>
-              <a:rPr lang="en-US" sz="2400" dirty="0" err="1"/>
-              <a:t>Jobichen</a:t>
-            </a:r>
-            <a:r>
-              <a:rPr lang="en-US" sz="2400" dirty="0"/>
-              <a:t> Chacko (J035)</a:t>
+              <a:t>Mrs. Susan Joseph (J027)</a:t>
             </a:r>
           </a:p>
           <a:p>
@@ -5781,15 +5764,7 @@
             </a:pPr>
             <a:r>
               <a:rPr lang="en-US" sz="2400" dirty="0"/>
-              <a:t>• Mr. </a:t>
-            </a:r>
-            <a:r>
-              <a:rPr lang="en-US" sz="2400" dirty="0" err="1"/>
-              <a:t>Shajan</a:t>
-            </a:r>
-            <a:r>
-              <a:rPr lang="en-US" sz="2400" dirty="0"/>
-              <a:t> K Thomas (S073)</a:t>
+              <a:t>Mathew Abraham (B005)</a:t>
             </a:r>
           </a:p>
           <a:p>
@@ -5804,7 +5779,7 @@
             </a:pPr>
             <a:r>
               <a:rPr lang="en-US" sz="2400" dirty="0"/>
-              <a:t>• Nina Elizabeth Varghese (R004)</a:t>
+              <a:t>Mrs. Sonia Sabu (S027)</a:t>
             </a:r>
           </a:p>
           <a:p>
@@ -5819,7 +5794,7 @@
             </a:pPr>
             <a:r>
               <a:rPr lang="en-US" sz="2400" dirty="0"/>
-              <a:t>• Mr. Robbin Mathew (R019)</a:t>
+              <a:t>Mrs. Baby Charles (B002)</a:t>
             </a:r>
           </a:p>
           <a:p>
@@ -5834,15 +5809,7 @@
             </a:pPr>
             <a:r>
               <a:rPr lang="en-US" sz="2400" dirty="0"/>
-              <a:t>• Mrs. </a:t>
-            </a:r>
-            <a:r>
-              <a:rPr lang="en-US" sz="2400" dirty="0" err="1"/>
-              <a:t>Renu</a:t>
-            </a:r>
-            <a:r>
-              <a:rPr lang="en-US" sz="2400" dirty="0"/>
-              <a:t> Shaji (S066)</a:t>
+              <a:t>Mr. Manoj Abraham (M023)</a:t>
             </a:r>
           </a:p>
           <a:p>
@@ -5857,15 +5824,15 @@
             </a:pPr>
             <a:r>
               <a:rPr lang="en-US" sz="2400" dirty="0"/>
-              <a:t>• Mr. Abraham C </a:t>
+              <a:t>Mr. </a:t>
             </a:r>
             <a:r>
               <a:rPr lang="en-US" sz="2400" dirty="0" err="1"/>
-              <a:t>C</a:t>
+              <a:t>Ajish</a:t>
             </a:r>
             <a:r>
               <a:rPr lang="en-US" sz="2400" dirty="0"/>
-              <a:t> (A001)</a:t>
+              <a:t> P I (A038)</a:t>
             </a:r>
           </a:p>
         </p:txBody>
@@ -5903,7 +5870,7 @@
             </a:pPr>
             <a:r>
               <a:rPr lang="en-US" sz="2400" dirty="0"/>
-              <a:t>• Aaron Koshy Thomas (T039)</a:t>
+              <a:t>Mr. Dennis George Varghese (D012)</a:t>
             </a:r>
           </a:p>
           <a:p>
@@ -5918,23 +5885,7 @@
             </a:pPr>
             <a:r>
               <a:rPr lang="en-US" sz="2400" dirty="0"/>
-              <a:t>• Mr. </a:t>
-            </a:r>
-            <a:r>
-              <a:rPr lang="en-US" sz="2400" dirty="0" err="1"/>
-              <a:t>Bijwish</a:t>
-            </a:r>
-            <a:r>
-              <a:rPr lang="en-US" sz="2400" dirty="0"/>
-              <a:t> T. </a:t>
-            </a:r>
-            <a:r>
-              <a:rPr lang="en-US" sz="2400" dirty="0" err="1"/>
-              <a:t>Oommen</a:t>
-            </a:r>
-            <a:r>
-              <a:rPr lang="en-US" sz="2400" dirty="0"/>
-              <a:t> (B023)</a:t>
+              <a:t>Mrs. Renee Susan Jacob (T006)</a:t>
             </a:r>
           </a:p>
           <a:p>
@@ -5949,7 +5900,7 @@
             </a:pPr>
             <a:r>
               <a:rPr lang="en-US" sz="2400" dirty="0"/>
-              <a:t>• Ann Varghese (V011)</a:t>
+              <a:t>Mr. Deepak Thomas (D016)</a:t>
             </a:r>
           </a:p>
           <a:p>
@@ -5964,15 +5915,7 @@
             </a:pPr>
             <a:r>
               <a:rPr lang="en-US" sz="2400" dirty="0"/>
-              <a:t>• Mr. Thomas </a:t>
-            </a:r>
-            <a:r>
-              <a:rPr lang="en-US" sz="2400" dirty="0" err="1"/>
-              <a:t>Oommen</a:t>
-            </a:r>
-            <a:r>
-              <a:rPr lang="en-US" sz="2400" dirty="0"/>
-              <a:t> (T041)</a:t>
+              <a:t>Alex Varghese (V001)</a:t>
             </a:r>
           </a:p>
           <a:p>
@@ -5987,68 +5930,7 @@
             </a:pPr>
             <a:r>
               <a:rPr lang="en-US" sz="2400" dirty="0"/>
-              <a:t>• Mr. Thomas </a:t>
-            </a:r>
-            <a:r>
-              <a:rPr lang="en-US" sz="2400" dirty="0" err="1"/>
-              <a:t>Panicker</a:t>
-            </a:r>
-            <a:r>
-              <a:rPr lang="en-US" sz="2400" dirty="0"/>
-              <a:t> Sandy (T012)</a:t>
-            </a:r>
-          </a:p>
-          <a:p>
-            <a:pPr marL="0" indent="0">
-              <a:lnSpc>
-                <a:spcPct val="110000"/>
-              </a:lnSpc>
-              <a:spcBef>
-                <a:spcPts val="600"/>
-              </a:spcBef>
-              <a:buNone/>
-            </a:pPr>
-            <a:r>
-              <a:rPr lang="en-US" sz="2400" dirty="0"/>
-              <a:t>• Dr. Jaya Philip (B014)</a:t>
-            </a:r>
-          </a:p>
-          <a:p>
-            <a:pPr marL="0" indent="0">
-              <a:lnSpc>
-                <a:spcPct val="110000"/>
-              </a:lnSpc>
-              <a:spcBef>
-                <a:spcPts val="600"/>
-              </a:spcBef>
-              <a:buNone/>
-            </a:pPr>
-            <a:r>
-              <a:rPr lang="en-US" sz="2400" dirty="0"/>
-              <a:t>• Joanna Robbin (R019)</a:t>
-            </a:r>
-          </a:p>
-          <a:p>
-            <a:pPr marL="0" indent="0">
-              <a:lnSpc>
-                <a:spcPct val="110000"/>
-              </a:lnSpc>
-              <a:spcBef>
-                <a:spcPts val="600"/>
-              </a:spcBef>
-              <a:buNone/>
-            </a:pPr>
-            <a:r>
-              <a:rPr lang="en-US" sz="2400" dirty="0"/>
-              <a:t>• Mrs. Vidya </a:t>
-            </a:r>
-            <a:r>
-              <a:rPr lang="en-US" sz="2400" dirty="0" err="1"/>
-              <a:t>Oommen</a:t>
-            </a:r>
-            <a:r>
-              <a:rPr lang="en-US" sz="2400" dirty="0"/>
-              <a:t> (O001)</a:t>
+              <a:t>Mr. Francis Xavier (B027)</a:t>
             </a:r>
           </a:p>
         </p:txBody>
@@ -6103,27 +5985,19 @@
           <a:p>
             <a:r>
               <a:rPr lang="en-US" sz="1800" b="1" dirty="0"/>
-              <a:t>(</a:t>
-            </a:r>
-            <a:r>
-              <a:rPr lang="en-US" sz="1800" b="1" dirty="0" err="1"/>
-              <a:t>MaY</a:t>
+              <a:t>(JUL 26</a:t>
+            </a:r>
+            <a:r>
+              <a:rPr lang="en-US" sz="1800" b="1" baseline="30000" dirty="0"/>
+              <a:t>th </a:t>
             </a:r>
             <a:r>
               <a:rPr lang="en-US" sz="1800" b="1" dirty="0"/>
-              <a:t> 31</a:t>
+              <a:t>– AUG 1</a:t>
             </a:r>
             <a:r>
               <a:rPr lang="en-US" sz="1800" b="1" baseline="30000" dirty="0"/>
               <a:t>st</a:t>
-            </a:r>
-            <a:r>
-              <a:rPr lang="en-US" sz="1800" b="1" dirty="0"/>
-              <a:t>– JUNE 6</a:t>
-            </a:r>
-            <a:r>
-              <a:rPr lang="en-US" sz="1800" b="1" baseline="30000" dirty="0"/>
-              <a:t>th</a:t>
             </a:r>
             <a:r>
               <a:rPr lang="en-US" sz="1800" b="1" dirty="0"/>
@@ -6205,36 +6079,6 @@
           <a:chExt cx="0" cy="0"/>
         </a:xfrm>
       </p:grpSpPr>
-      <p:pic>
-        <p:nvPicPr>
-          <p:cNvPr id="11" name="Picture 10" descr="A picture containing object, light, traffic, bunch&#10;&#10;Description automatically generated">
-            <a:extLst>
-              <a:ext uri="{FF2B5EF4-FFF2-40B4-BE49-F238E27FC236}">
-                <a16:creationId xmlns:a16="http://schemas.microsoft.com/office/drawing/2014/main" id="{DD6C8732-39BC-4949-B9E7-9BC7A77D9A3E}"/>
-              </a:ext>
-            </a:extLst>
-          </p:cNvPr>
-          <p:cNvPicPr>
-            <a:picLocks noChangeAspect="1"/>
-          </p:cNvPicPr>
-          <p:nvPr/>
-        </p:nvPicPr>
-        <p:blipFill>
-          <a:blip r:embed="rId2"/>
-          <a:stretch>
-            <a:fillRect/>
-          </a:stretch>
-        </p:blipFill>
-        <p:spPr>
-          <a:xfrm>
-            <a:off x="2467526" y="-1"/>
-            <a:ext cx="4382733" cy="2695575"/>
-          </a:xfrm>
-          <a:prstGeom prst="rect">
-            <a:avLst/>
-          </a:prstGeom>
-        </p:spPr>
-      </p:pic>
       <p:sp>
         <p:nvSpPr>
           <p:cNvPr id="3" name="Content Placeholder 2">
@@ -6248,13 +6092,13 @@
             <a:spLocks noGrp="1"/>
           </p:cNvSpPr>
           <p:nvPr>
-            <p:ph sz="half" idx="1"/>
+            <p:ph idx="1"/>
           </p:nvPr>
         </p:nvSpPr>
         <p:spPr>
           <a:xfrm>
-            <a:off x="605767" y="2450147"/>
-            <a:ext cx="5490233" cy="4056547"/>
+            <a:off x="502024" y="2627070"/>
+            <a:ext cx="11356601" cy="3424107"/>
           </a:xfrm>
         </p:spPr>
         <p:txBody>
@@ -6273,16 +6117,16 @@
               <a:buNone/>
             </a:pPr>
             <a:r>
-              <a:rPr lang="en-US" sz="2400" dirty="0"/>
-              <a:t>• Mrs. </a:t>
-            </a:r>
-            <a:r>
-              <a:rPr lang="en-US" sz="2400" dirty="0" err="1"/>
-              <a:t>Shyja</a:t>
-            </a:r>
-            <a:r>
-              <a:rPr lang="en-US" sz="2400" dirty="0"/>
-              <a:t> Samuel (S078)</a:t>
+              <a:rPr lang="en-US" sz="2800" dirty="0"/>
+              <a:t>Mr. Ajay </a:t>
+            </a:r>
+            <a:r>
+              <a:rPr lang="en-US" sz="2800" dirty="0" err="1"/>
+              <a:t>Elanjickal</a:t>
+            </a:r>
+            <a:r>
+              <a:rPr lang="en-US" sz="2800" dirty="0"/>
+              <a:t> Mathew AND Mrs. Nishan Mathew (A057)</a:t>
             </a:r>
           </a:p>
           <a:p>
@@ -6296,8 +6140,16 @@
               <a:buNone/>
             </a:pPr>
             <a:r>
-              <a:rPr lang="en-US" sz="2400" dirty="0"/>
-              <a:t>• Ashley Thomas Philip (T014)</a:t>
+              <a:rPr lang="en-US" sz="2800" dirty="0"/>
+              <a:t>Mr. Mathew E Joseph AND Mrs. </a:t>
+            </a:r>
+            <a:r>
+              <a:rPr lang="en-US" sz="2800" dirty="0" err="1"/>
+              <a:t>Pon</a:t>
+            </a:r>
+            <a:r>
+              <a:rPr lang="en-US" sz="2800" dirty="0"/>
+              <a:t> Mei Wan (M036)</a:t>
             </a:r>
           </a:p>
           <a:p>
@@ -6311,16 +6163,8 @@
               <a:buNone/>
             </a:pPr>
             <a:r>
-              <a:rPr lang="en-US" sz="2400" dirty="0"/>
-              <a:t>• </a:t>
-            </a:r>
-            <a:r>
-              <a:rPr lang="en-US" sz="2400" dirty="0" err="1"/>
-              <a:t>Dhanya</a:t>
-            </a:r>
-            <a:r>
-              <a:rPr lang="en-US" sz="2400" dirty="0"/>
-              <a:t> John (J010)</a:t>
+              <a:rPr lang="en-US" sz="2800" dirty="0"/>
+              <a:t>Mr. Johnson P John AND Mrs. Suni K Thomas (J032)</a:t>
             </a:r>
           </a:p>
           <a:p>
@@ -6334,8 +6178,16 @@
               <a:buNone/>
             </a:pPr>
             <a:r>
-              <a:rPr lang="en-US" sz="2400" dirty="0"/>
-              <a:t>• Amil Joshua Philip (P015)</a:t>
+              <a:rPr lang="en-US" sz="2800" dirty="0"/>
+              <a:t>Mr. </a:t>
+            </a:r>
+            <a:r>
+              <a:rPr lang="en-US" sz="2800" dirty="0" err="1"/>
+              <a:t>Georgekutty</a:t>
+            </a:r>
+            <a:r>
+              <a:rPr lang="en-US" sz="2800" dirty="0"/>
+              <a:t> Yohannan AND Mrs. Mini Varghese (G015)</a:t>
             </a:r>
           </a:p>
           <a:p>
@@ -6349,24 +6201,16 @@
               <a:buNone/>
             </a:pPr>
             <a:r>
-              <a:rPr lang="en-US" sz="2400" dirty="0"/>
-              <a:t>• Mrs. </a:t>
-            </a:r>
-            <a:r>
-              <a:rPr lang="en-US" sz="2400" dirty="0" err="1"/>
-              <a:t>Saramma</a:t>
-            </a:r>
-            <a:r>
-              <a:rPr lang="en-US" sz="2400" dirty="0"/>
-              <a:t> </a:t>
-            </a:r>
-            <a:r>
-              <a:rPr lang="en-US" sz="2400" dirty="0" err="1"/>
-              <a:t>Mathen</a:t>
-            </a:r>
-            <a:r>
-              <a:rPr lang="en-US" sz="2400" dirty="0"/>
-              <a:t> (M008)</a:t>
+              <a:rPr lang="en-US" sz="2800" dirty="0"/>
+              <a:t>Mr. Koshy </a:t>
+            </a:r>
+            <a:r>
+              <a:rPr lang="en-US" sz="2800" dirty="0" err="1"/>
+              <a:t>Puthenpurackal</a:t>
+            </a:r>
+            <a:r>
+              <a:rPr lang="en-US" sz="2800" dirty="0"/>
+              <a:t> Kuruvilla AND Mrs. Daisy Koshy (K003)</a:t>
             </a:r>
           </a:p>
           <a:p>
@@ -6380,725 +6224,24 @@
               <a:buNone/>
             </a:pPr>
             <a:r>
-              <a:rPr lang="en-US" sz="2400" dirty="0"/>
-              <a:t>• Mr. George Thomas (G010)</a:t>
-            </a:r>
-          </a:p>
-          <a:p>
-            <a:pPr marL="0" indent="0">
-              <a:lnSpc>
-                <a:spcPct val="110000"/>
-              </a:lnSpc>
-              <a:spcBef>
-                <a:spcPts val="600"/>
-              </a:spcBef>
-              <a:buNone/>
-            </a:pPr>
-            <a:r>
-              <a:rPr lang="en-US" sz="2400" dirty="0"/>
-              <a:t>• Ravi Abraham Varghese (R004)</a:t>
-            </a:r>
-          </a:p>
-          <a:p>
-            <a:pPr marL="0" indent="0">
-              <a:lnSpc>
-                <a:spcPct val="110000"/>
-              </a:lnSpc>
-              <a:spcBef>
-                <a:spcPts val="600"/>
-              </a:spcBef>
-              <a:buNone/>
-            </a:pPr>
-            <a:r>
-              <a:rPr lang="en-US" sz="2400" dirty="0"/>
-              <a:t>• Chris </a:t>
-            </a:r>
-            <a:r>
-              <a:rPr lang="en-US" sz="2400" dirty="0" err="1"/>
-              <a:t>Panackamittathu</a:t>
-            </a:r>
-            <a:r>
-              <a:rPr lang="en-US" sz="2400" dirty="0"/>
-              <a:t> Alex (T035)</a:t>
-            </a:r>
-          </a:p>
-          <a:p>
-            <a:pPr marL="0" indent="0">
-              <a:lnSpc>
-                <a:spcPct val="110000"/>
-              </a:lnSpc>
-              <a:spcBef>
-                <a:spcPts val="600"/>
-              </a:spcBef>
-              <a:buNone/>
-            </a:pPr>
-            <a:r>
-              <a:rPr lang="en-US" sz="2400" dirty="0"/>
-              <a:t>• Tina Jacob (T006)</a:t>
-            </a:r>
-          </a:p>
-        </p:txBody>
-      </p:sp>
-      <p:sp>
-        <p:nvSpPr>
-          <p:cNvPr id="8" name="Title 1">
-            <a:extLst>
-              <a:ext uri="{FF2B5EF4-FFF2-40B4-BE49-F238E27FC236}">
-                <a16:creationId xmlns:a16="http://schemas.microsoft.com/office/drawing/2014/main" id="{DC183D5F-6492-4F31-BBEE-25B6E9E994A2}"/>
-              </a:ext>
-            </a:extLst>
-          </p:cNvPr>
-          <p:cNvSpPr txBox="1">
-            <a:spLocks/>
-          </p:cNvSpPr>
-          <p:nvPr/>
-        </p:nvSpPr>
-        <p:spPr>
-          <a:xfrm>
-            <a:off x="7937500" y="156857"/>
-            <a:ext cx="4061584" cy="581633"/>
-          </a:xfrm>
-          <a:prstGeom prst="rect">
-            <a:avLst/>
-          </a:prstGeom>
-        </p:spPr>
-        <p:txBody>
-          <a:bodyPr vert="horz" lIns="91440" tIns="45720" rIns="91440" bIns="45720" rtlCol="0" anchor="ctr">
-            <a:normAutofit/>
-          </a:bodyPr>
-          <a:lstStyle>
-            <a:lvl1pPr algn="ctr" defTabSz="914400" rtl="0" eaLnBrk="1" latinLnBrk="0" hangingPunct="1">
-              <a:lnSpc>
-                <a:spcPct val="90000"/>
-              </a:lnSpc>
-              <a:spcBef>
-                <a:spcPct val="0"/>
-              </a:spcBef>
-              <a:buNone/>
-              <a:defRPr sz="3600" kern="1200" cap="all" baseline="0">
-                <a:solidFill>
-                  <a:schemeClr val="tx1"/>
-                </a:solidFill>
-                <a:effectLst/>
-                <a:latin typeface="+mj-lt"/>
-                <a:ea typeface="+mj-ea"/>
-                <a:cs typeface="+mj-cs"/>
-              </a:defRPr>
-            </a:lvl1pPr>
-          </a:lstStyle>
-          <a:p>
-            <a:r>
-              <a:rPr lang="en-US" sz="1800" b="1" dirty="0"/>
-              <a:t>(</a:t>
-            </a:r>
-            <a:r>
-              <a:rPr lang="en-US" sz="1800" b="1" dirty="0" err="1"/>
-              <a:t>MaY</a:t>
-            </a:r>
-            <a:r>
-              <a:rPr lang="en-US" sz="1800" b="1" dirty="0"/>
-              <a:t> 31</a:t>
-            </a:r>
-            <a:r>
-              <a:rPr lang="en-US" sz="1800" b="1" baseline="30000" dirty="0"/>
-              <a:t>st</a:t>
-            </a:r>
-            <a:r>
-              <a:rPr lang="en-US" sz="1800" b="1" dirty="0"/>
-              <a:t>– JUNE 6</a:t>
-            </a:r>
-            <a:r>
-              <a:rPr lang="en-US" sz="1800" b="1" baseline="30000" dirty="0"/>
-              <a:t>th</a:t>
-            </a:r>
-            <a:r>
-              <a:rPr lang="en-US" sz="1800" b="1" dirty="0"/>
-              <a:t> 2021)</a:t>
-            </a:r>
-          </a:p>
-        </p:txBody>
-      </p:sp>
-      <p:sp>
-        <p:nvSpPr>
-          <p:cNvPr id="6" name="TextBox 5">
-            <a:extLst>
-              <a:ext uri="{FF2B5EF4-FFF2-40B4-BE49-F238E27FC236}">
-                <a16:creationId xmlns:a16="http://schemas.microsoft.com/office/drawing/2014/main" id="{B0D601C3-1C0D-423E-82D1-6759F009D604}"/>
-              </a:ext>
-            </a:extLst>
-          </p:cNvPr>
-          <p:cNvSpPr txBox="1"/>
-          <p:nvPr/>
-        </p:nvSpPr>
-        <p:spPr>
-          <a:xfrm>
-            <a:off x="7776925" y="553824"/>
-            <a:ext cx="4382733" cy="584775"/>
-          </a:xfrm>
-          <a:prstGeom prst="rect">
-            <a:avLst/>
-          </a:prstGeom>
-          <a:noFill/>
-        </p:spPr>
-        <p:txBody>
-          <a:bodyPr wrap="square" rtlCol="0">
-            <a:spAutoFit/>
-          </a:bodyPr>
-          <a:lstStyle/>
-          <a:p>
-            <a:pPr algn="ctr"/>
-            <a:r>
-              <a:rPr lang="en-US" sz="1600" dirty="0">
-                <a:solidFill>
-                  <a:schemeClr val="accent5">
-                    <a:lumMod val="20000"/>
-                    <a:lumOff val="80000"/>
-                  </a:schemeClr>
-                </a:solidFill>
-              </a:rPr>
-              <a:t>St. Thomas Orthodox Syrian Cathedral, Singapore</a:t>
-            </a:r>
-          </a:p>
-        </p:txBody>
-      </p:sp>
-    </p:spTree>
-    <p:extLst>
-      <p:ext uri="{BB962C8B-B14F-4D97-AF65-F5344CB8AC3E}">
-        <p14:creationId xmlns:p14="http://schemas.microsoft.com/office/powerpoint/2010/main" val="4181690887"/>
-      </p:ext>
-    </p:extLst>
-  </p:cSld>
-  <p:clrMapOvr>
-    <a:masterClrMapping/>
-  </p:clrMapOvr>
-</p:sld>
-</file>
-
-<file path=ppt/slides/slide3.xml><?xml version="1.0" encoding="utf-8"?>
-<p:sld xmlns:a="http://schemas.openxmlformats.org/drawingml/2006/main" xmlns:r="http://schemas.openxmlformats.org/officeDocument/2006/relationships" xmlns:p="http://schemas.openxmlformats.org/presentationml/2006/main">
-  <p:cSld>
-    <p:bg>
-      <p:bgPr>
-        <a:gradFill flip="none" rotWithShape="1">
-          <a:gsLst>
-            <a:gs pos="0">
-              <a:srgbClr val="8B4EC2"/>
-            </a:gs>
-            <a:gs pos="97000">
-              <a:srgbClr val="1E0F2B"/>
-            </a:gs>
-          </a:gsLst>
-          <a:path path="circle">
-            <a:fillToRect l="50000" t="50000" r="50000" b="50000"/>
-          </a:path>
-          <a:tileRect/>
-        </a:gradFill>
-        <a:effectLst/>
-      </p:bgPr>
-    </p:bg>
-    <p:spTree>
-      <p:nvGrpSpPr>
-        <p:cNvPr id="1" name=""/>
-        <p:cNvGrpSpPr/>
-        <p:nvPr/>
-      </p:nvGrpSpPr>
-      <p:grpSpPr>
-        <a:xfrm>
-          <a:off x="0" y="0"/>
-          <a:ext cx="0" cy="0"/>
-          <a:chOff x="0" y="0"/>
-          <a:chExt cx="0" cy="0"/>
-        </a:xfrm>
-      </p:grpSpPr>
-      <p:pic>
-        <p:nvPicPr>
-          <p:cNvPr id="11" name="Picture 10" descr="A picture containing object, light, traffic, bunch&#10;&#10;Description automatically generated">
-            <a:extLst>
-              <a:ext uri="{FF2B5EF4-FFF2-40B4-BE49-F238E27FC236}">
-                <a16:creationId xmlns:a16="http://schemas.microsoft.com/office/drawing/2014/main" id="{DD6C8732-39BC-4949-B9E7-9BC7A77D9A3E}"/>
-              </a:ext>
-            </a:extLst>
-          </p:cNvPr>
-          <p:cNvPicPr>
-            <a:picLocks noChangeAspect="1"/>
-          </p:cNvPicPr>
-          <p:nvPr/>
-        </p:nvPicPr>
-        <p:blipFill>
-          <a:blip r:embed="rId2"/>
-          <a:stretch>
-            <a:fillRect/>
-          </a:stretch>
-        </p:blipFill>
-        <p:spPr>
-          <a:xfrm>
-            <a:off x="2467526" y="-1"/>
-            <a:ext cx="4382733" cy="2695575"/>
-          </a:xfrm>
-          <a:prstGeom prst="rect">
-            <a:avLst/>
-          </a:prstGeom>
-        </p:spPr>
-      </p:pic>
-      <p:sp>
-        <p:nvSpPr>
-          <p:cNvPr id="3" name="Content Placeholder 2">
-            <a:extLst>
-              <a:ext uri="{FF2B5EF4-FFF2-40B4-BE49-F238E27FC236}">
-                <a16:creationId xmlns:a16="http://schemas.microsoft.com/office/drawing/2014/main" id="{E0A3B9B1-435F-41CA-83C5-21824DE95CFD}"/>
-              </a:ext>
-            </a:extLst>
-          </p:cNvPr>
-          <p:cNvSpPr>
-            <a:spLocks noGrp="1"/>
-          </p:cNvSpPr>
-          <p:nvPr>
-            <p:ph sz="half" idx="1"/>
-          </p:nvPr>
-        </p:nvSpPr>
-        <p:spPr>
-          <a:xfrm>
-            <a:off x="605767" y="2450147"/>
-            <a:ext cx="5490233" cy="4056547"/>
-          </a:xfrm>
-        </p:spPr>
-        <p:txBody>
-          <a:bodyPr>
-            <a:noAutofit/>
-          </a:bodyPr>
-          <a:lstStyle/>
-          <a:p>
-            <a:pPr marL="0" indent="0">
-              <a:lnSpc>
-                <a:spcPct val="110000"/>
-              </a:lnSpc>
-              <a:spcBef>
-                <a:spcPts val="600"/>
-              </a:spcBef>
-              <a:buNone/>
-            </a:pPr>
-            <a:r>
-              <a:rPr lang="en-US" sz="2400" dirty="0" err="1"/>
-              <a:t>Mrs</a:t>
-            </a:r>
-            <a:r>
-              <a:rPr lang="en-US" sz="2400" dirty="0"/>
-              <a:t> Rebecca Vimala John </a:t>
-            </a:r>
-          </a:p>
-          <a:p>
-            <a:pPr marL="0" indent="0">
-              <a:lnSpc>
-                <a:spcPct val="110000"/>
-              </a:lnSpc>
-              <a:spcBef>
-                <a:spcPts val="600"/>
-              </a:spcBef>
-              <a:buNone/>
-            </a:pPr>
-            <a:r>
-              <a:rPr lang="en-US" sz="2400" dirty="0" err="1"/>
-              <a:t>Mr</a:t>
-            </a:r>
-            <a:r>
-              <a:rPr lang="en-US" sz="2400" dirty="0"/>
-              <a:t> John </a:t>
-            </a:r>
-            <a:r>
-              <a:rPr lang="en-US" sz="2400" dirty="0" err="1"/>
-              <a:t>Tharakan</a:t>
-            </a:r>
-            <a:r>
-              <a:rPr lang="en-US" sz="2400" dirty="0"/>
-              <a:t> </a:t>
-            </a:r>
-          </a:p>
-          <a:p>
-            <a:pPr marL="0" indent="0">
-              <a:lnSpc>
-                <a:spcPct val="110000"/>
-              </a:lnSpc>
-              <a:spcBef>
-                <a:spcPts val="600"/>
-              </a:spcBef>
-              <a:buNone/>
-            </a:pPr>
-            <a:r>
-              <a:rPr lang="en-US" sz="2400" dirty="0" err="1"/>
-              <a:t>Mrs</a:t>
-            </a:r>
-            <a:r>
-              <a:rPr lang="en-US" sz="2400" dirty="0"/>
-              <a:t> Jolly George Kurian </a:t>
-            </a:r>
-          </a:p>
-          <a:p>
-            <a:pPr marL="0" indent="0">
-              <a:lnSpc>
-                <a:spcPct val="110000"/>
-              </a:lnSpc>
-              <a:spcBef>
-                <a:spcPts val="600"/>
-              </a:spcBef>
-              <a:buNone/>
-            </a:pPr>
-            <a:r>
-              <a:rPr lang="en-US" sz="2400" dirty="0" err="1"/>
-              <a:t>Mr</a:t>
-            </a:r>
-            <a:r>
-              <a:rPr lang="en-US" sz="2400" dirty="0"/>
-              <a:t> Mathew George Cherian </a:t>
-            </a:r>
-          </a:p>
-          <a:p>
-            <a:pPr marL="0" indent="0">
-              <a:lnSpc>
-                <a:spcPct val="110000"/>
-              </a:lnSpc>
-              <a:spcBef>
-                <a:spcPts val="600"/>
-              </a:spcBef>
-              <a:buNone/>
-            </a:pPr>
-            <a:r>
-              <a:rPr lang="en-US" sz="2400" dirty="0" err="1"/>
-              <a:t>Mr</a:t>
-            </a:r>
-            <a:r>
-              <a:rPr lang="en-US" sz="2400" dirty="0"/>
-              <a:t> Nathaniel Joseph George </a:t>
-            </a:r>
-          </a:p>
-          <a:p>
-            <a:pPr marL="0" indent="0">
-              <a:lnSpc>
-                <a:spcPct val="110000"/>
-              </a:lnSpc>
-              <a:spcBef>
-                <a:spcPts val="600"/>
-              </a:spcBef>
-              <a:buNone/>
-            </a:pPr>
-            <a:r>
-              <a:rPr lang="en-US" sz="2400" dirty="0"/>
-              <a:t>Dr </a:t>
-            </a:r>
-            <a:r>
-              <a:rPr lang="en-US" sz="2400" dirty="0" err="1"/>
-              <a:t>Rahel</a:t>
-            </a:r>
-            <a:r>
-              <a:rPr lang="en-US" sz="2400" dirty="0"/>
-              <a:t> Mathew </a:t>
-            </a:r>
-          </a:p>
-          <a:p>
-            <a:pPr marL="0" indent="0">
-              <a:lnSpc>
-                <a:spcPct val="110000"/>
-              </a:lnSpc>
-              <a:spcBef>
-                <a:spcPts val="600"/>
-              </a:spcBef>
-              <a:buNone/>
-            </a:pPr>
-            <a:r>
-              <a:rPr lang="en-US" sz="2400" dirty="0"/>
-              <a:t>Dr Mathew Alexander </a:t>
-            </a:r>
-          </a:p>
-          <a:p>
-            <a:pPr marL="0" indent="0">
-              <a:lnSpc>
-                <a:spcPct val="110000"/>
-              </a:lnSpc>
-              <a:spcBef>
-                <a:spcPts val="600"/>
-              </a:spcBef>
-              <a:buNone/>
-            </a:pPr>
-            <a:r>
-              <a:rPr lang="en-US" sz="2400" dirty="0" err="1"/>
-              <a:t>Mr</a:t>
-            </a:r>
-            <a:r>
-              <a:rPr lang="en-US" sz="2400" dirty="0"/>
-              <a:t> Jacob George</a:t>
-            </a:r>
-          </a:p>
-        </p:txBody>
-      </p:sp>
-      <p:sp>
-        <p:nvSpPr>
-          <p:cNvPr id="4" name="Content Placeholder 3"/>
-          <p:cNvSpPr>
-            <a:spLocks noGrp="1"/>
-          </p:cNvSpPr>
-          <p:nvPr>
-            <p:ph sz="half" idx="2"/>
-          </p:nvPr>
-        </p:nvSpPr>
-        <p:spPr>
-          <a:xfrm>
-            <a:off x="6319125" y="2450147"/>
-            <a:ext cx="5541268" cy="4056547"/>
-          </a:xfrm>
-        </p:spPr>
-        <p:txBody>
-          <a:bodyPr>
-            <a:noAutofit/>
-          </a:bodyPr>
-          <a:lstStyle/>
-          <a:p>
-            <a:pPr marL="0" indent="0">
-              <a:lnSpc>
-                <a:spcPct val="110000"/>
-              </a:lnSpc>
-              <a:spcBef>
-                <a:spcPts val="600"/>
-              </a:spcBef>
-              <a:buNone/>
-            </a:pPr>
-            <a:r>
-              <a:rPr lang="en-US" sz="2400" dirty="0" err="1"/>
-              <a:t>Ms</a:t>
-            </a:r>
-            <a:r>
-              <a:rPr lang="en-US" sz="2400" dirty="0"/>
-              <a:t> Anne Rachel George </a:t>
-            </a:r>
-          </a:p>
-          <a:p>
-            <a:pPr marL="0" indent="0">
-              <a:lnSpc>
-                <a:spcPct val="110000"/>
-              </a:lnSpc>
-              <a:spcBef>
-                <a:spcPts val="600"/>
-              </a:spcBef>
-              <a:buNone/>
-            </a:pPr>
-            <a:r>
-              <a:rPr lang="en-US" sz="2400" dirty="0"/>
-              <a:t> </a:t>
-            </a:r>
-            <a:r>
-              <a:rPr lang="en-US" sz="2400" dirty="0" err="1"/>
-              <a:t>Ms</a:t>
-            </a:r>
-            <a:r>
-              <a:rPr lang="en-US" sz="2400" dirty="0"/>
-              <a:t> Marianne Simon</a:t>
-            </a:r>
-          </a:p>
-        </p:txBody>
-      </p:sp>
-      <p:sp>
-        <p:nvSpPr>
-          <p:cNvPr id="8" name="Title 1">
-            <a:extLst>
-              <a:ext uri="{FF2B5EF4-FFF2-40B4-BE49-F238E27FC236}">
-                <a16:creationId xmlns:a16="http://schemas.microsoft.com/office/drawing/2014/main" id="{DC183D5F-6492-4F31-BBEE-25B6E9E994A2}"/>
-              </a:ext>
-            </a:extLst>
-          </p:cNvPr>
-          <p:cNvSpPr txBox="1">
-            <a:spLocks/>
-          </p:cNvSpPr>
-          <p:nvPr/>
-        </p:nvSpPr>
-        <p:spPr>
-          <a:xfrm>
-            <a:off x="7937500" y="156857"/>
-            <a:ext cx="4061584" cy="581633"/>
-          </a:xfrm>
-          <a:prstGeom prst="rect">
-            <a:avLst/>
-          </a:prstGeom>
-        </p:spPr>
-        <p:txBody>
-          <a:bodyPr vert="horz" lIns="91440" tIns="45720" rIns="91440" bIns="45720" rtlCol="0" anchor="ctr">
-            <a:normAutofit/>
-          </a:bodyPr>
-          <a:lstStyle>
-            <a:lvl1pPr algn="ctr" defTabSz="914400" rtl="0" eaLnBrk="1" latinLnBrk="0" hangingPunct="1">
-              <a:lnSpc>
-                <a:spcPct val="90000"/>
-              </a:lnSpc>
-              <a:spcBef>
-                <a:spcPct val="0"/>
-              </a:spcBef>
-              <a:buNone/>
-              <a:defRPr sz="3600" kern="1200" cap="all" baseline="0">
-                <a:solidFill>
-                  <a:schemeClr val="tx1"/>
-                </a:solidFill>
-                <a:effectLst/>
-                <a:latin typeface="+mj-lt"/>
-                <a:ea typeface="+mj-ea"/>
-                <a:cs typeface="+mj-cs"/>
-              </a:defRPr>
-            </a:lvl1pPr>
-          </a:lstStyle>
-          <a:p>
-            <a:r>
-              <a:rPr lang="en-US" sz="1800" b="1" dirty="0"/>
-              <a:t>(</a:t>
-            </a:r>
-            <a:r>
-              <a:rPr lang="en-US" sz="1800" b="1" dirty="0" err="1"/>
-              <a:t>MaY</a:t>
-            </a:r>
-            <a:r>
-              <a:rPr lang="en-US" sz="1800" b="1" dirty="0"/>
-              <a:t> 30</a:t>
-            </a:r>
-            <a:r>
-              <a:rPr lang="en-US" sz="1800" b="1" baseline="30000" dirty="0"/>
-              <a:t>th </a:t>
-            </a:r>
-            <a:r>
-              <a:rPr lang="en-US" sz="1800" b="1" dirty="0"/>
-              <a:t>– JUN 05</a:t>
-            </a:r>
-            <a:r>
-              <a:rPr lang="en-US" sz="1800" b="1" baseline="30000" dirty="0"/>
-              <a:t>th</a:t>
-            </a:r>
-            <a:r>
-              <a:rPr lang="en-US" sz="1800" b="1" dirty="0"/>
-              <a:t> 2021)</a:t>
-            </a:r>
-          </a:p>
-        </p:txBody>
-      </p:sp>
-      <p:sp>
-        <p:nvSpPr>
-          <p:cNvPr id="7" name="TextBox 6">
-            <a:extLst>
-              <a:ext uri="{FF2B5EF4-FFF2-40B4-BE49-F238E27FC236}">
-                <a16:creationId xmlns:a16="http://schemas.microsoft.com/office/drawing/2014/main" id="{653B7B0E-412C-4DC5-9D7E-3B76EF1C0FF9}"/>
-              </a:ext>
-            </a:extLst>
-          </p:cNvPr>
-          <p:cNvSpPr txBox="1"/>
-          <p:nvPr/>
-        </p:nvSpPr>
-        <p:spPr>
-          <a:xfrm>
-            <a:off x="7776925" y="553824"/>
-            <a:ext cx="4382733" cy="584775"/>
-          </a:xfrm>
-          <a:prstGeom prst="rect">
-            <a:avLst/>
-          </a:prstGeom>
-          <a:noFill/>
-        </p:spPr>
-        <p:txBody>
-          <a:bodyPr wrap="square" rtlCol="0">
-            <a:spAutoFit/>
-          </a:bodyPr>
-          <a:lstStyle/>
-          <a:p>
-            <a:pPr algn="ctr"/>
-            <a:r>
-              <a:rPr lang="en-US" sz="1600" dirty="0">
-                <a:solidFill>
-                  <a:schemeClr val="accent5">
-                    <a:lumMod val="20000"/>
-                    <a:lumOff val="80000"/>
-                  </a:schemeClr>
-                </a:solidFill>
-              </a:rPr>
-              <a:t>St. Mary’s Orthodox Cathedral, </a:t>
-            </a:r>
-          </a:p>
-          <a:p>
-            <a:pPr algn="ctr"/>
-            <a:r>
-              <a:rPr lang="en-US" sz="1600" dirty="0">
-                <a:solidFill>
-                  <a:schemeClr val="accent5">
-                    <a:lumMod val="20000"/>
-                    <a:lumOff val="80000"/>
-                  </a:schemeClr>
-                </a:solidFill>
-              </a:rPr>
-              <a:t>Kuala Lumpur</a:t>
-            </a:r>
-          </a:p>
-        </p:txBody>
-      </p:sp>
-    </p:spTree>
-    <p:extLst>
-      <p:ext uri="{BB962C8B-B14F-4D97-AF65-F5344CB8AC3E}">
-        <p14:creationId xmlns:p14="http://schemas.microsoft.com/office/powerpoint/2010/main" val="2301807204"/>
-      </p:ext>
-    </p:extLst>
-  </p:cSld>
-  <p:clrMapOvr>
-    <a:masterClrMapping/>
-  </p:clrMapOvr>
-</p:sld>
-</file>
-
-<file path=ppt/slides/slide4.xml><?xml version="1.0" encoding="utf-8"?>
-<p:sld xmlns:a="http://schemas.openxmlformats.org/drawingml/2006/main" xmlns:r="http://schemas.openxmlformats.org/officeDocument/2006/relationships" xmlns:p="http://schemas.openxmlformats.org/presentationml/2006/main">
-  <p:cSld>
-    <p:spTree>
-      <p:nvGrpSpPr>
-        <p:cNvPr id="1" name=""/>
-        <p:cNvGrpSpPr/>
-        <p:nvPr/>
-      </p:nvGrpSpPr>
-      <p:grpSpPr>
-        <a:xfrm>
-          <a:off x="0" y="0"/>
-          <a:ext cx="0" cy="0"/>
-          <a:chOff x="0" y="0"/>
-          <a:chExt cx="0" cy="0"/>
-        </a:xfrm>
-      </p:grpSpPr>
-      <p:sp>
-        <p:nvSpPr>
-          <p:cNvPr id="3" name="Content Placeholder 2">
-            <a:extLst>
-              <a:ext uri="{FF2B5EF4-FFF2-40B4-BE49-F238E27FC236}">
-                <a16:creationId xmlns:a16="http://schemas.microsoft.com/office/drawing/2014/main" id="{E0A3B9B1-435F-41CA-83C5-21824DE95CFD}"/>
-              </a:ext>
-            </a:extLst>
-          </p:cNvPr>
-          <p:cNvSpPr>
-            <a:spLocks noGrp="1"/>
-          </p:cNvSpPr>
-          <p:nvPr>
-            <p:ph idx="1"/>
-          </p:nvPr>
-        </p:nvSpPr>
-        <p:spPr>
-          <a:xfrm>
-            <a:off x="502024" y="2627070"/>
-            <a:ext cx="11356601" cy="3424107"/>
-          </a:xfrm>
-        </p:spPr>
-        <p:txBody>
-          <a:bodyPr>
-            <a:noAutofit/>
-          </a:bodyPr>
-          <a:lstStyle/>
-          <a:p>
-            <a:pPr>
-              <a:lnSpc>
-                <a:spcPct val="110000"/>
-              </a:lnSpc>
-              <a:spcBef>
-                <a:spcPts val="600"/>
-              </a:spcBef>
-            </a:pPr>
-            <a:r>
               <a:rPr lang="en-US" sz="2800" dirty="0"/>
-              <a:t>Mr. Sunny K Paul AND Mrs. Moly Sunny (S006)</a:t>
+              <a:t>Mr. </a:t>
+            </a:r>
+            <a:r>
+              <a:rPr lang="en-US" sz="2800" dirty="0" err="1"/>
+              <a:t>Bibin</a:t>
+            </a:r>
+            <a:r>
+              <a:rPr lang="en-US" sz="2800" dirty="0"/>
+              <a:t> Thomas Abraham AND Mrs. </a:t>
+            </a:r>
+            <a:r>
+              <a:rPr lang="en-US" sz="2800" dirty="0" err="1"/>
+              <a:t>Chinchu</a:t>
+            </a:r>
+            <a:r>
+              <a:rPr lang="en-US" sz="2800" dirty="0"/>
+              <a:t> Babu (B025)</a:t>
             </a:r>
           </a:p>
         </p:txBody>
@@ -7212,27 +6355,19 @@
           <a:p>
             <a:r>
               <a:rPr lang="en-US" sz="1800" b="1" dirty="0"/>
-              <a:t>(</a:t>
-            </a:r>
-            <a:r>
-              <a:rPr lang="en-US" sz="1800" b="1" dirty="0" err="1"/>
-              <a:t>MaY</a:t>
+              <a:t>(JUL 26</a:t>
+            </a:r>
+            <a:r>
+              <a:rPr lang="en-US" sz="1800" b="1" baseline="30000" dirty="0"/>
+              <a:t>th </a:t>
             </a:r>
             <a:r>
               <a:rPr lang="en-US" sz="1800" b="1" dirty="0"/>
-              <a:t> 31</a:t>
+              <a:t>– AUG 1</a:t>
             </a:r>
             <a:r>
               <a:rPr lang="en-US" sz="1800" b="1" baseline="30000" dirty="0"/>
               <a:t>st</a:t>
-            </a:r>
-            <a:r>
-              <a:rPr lang="en-US" sz="1800" b="1" dirty="0"/>
-              <a:t>– JUNE 6</a:t>
-            </a:r>
-            <a:r>
-              <a:rPr lang="en-US" sz="1800" b="1" baseline="30000" dirty="0"/>
-              <a:t>th</a:t>
             </a:r>
             <a:r>
               <a:rPr lang="en-US" sz="1800" b="1" dirty="0"/>
@@ -7288,6 +6423,331 @@
     <p:extLst>
       <p:ext uri="{BB962C8B-B14F-4D97-AF65-F5344CB8AC3E}">
         <p14:creationId xmlns:p14="http://schemas.microsoft.com/office/powerpoint/2010/main" val="1881118211"/>
+      </p:ext>
+    </p:extLst>
+  </p:cSld>
+  <p:clrMapOvr>
+    <a:masterClrMapping/>
+  </p:clrMapOvr>
+</p:sld>
+</file>
+
+<file path=ppt/slides/slide3.xml><?xml version="1.0" encoding="utf-8"?>
+<p:sld xmlns:a="http://schemas.openxmlformats.org/drawingml/2006/main" xmlns:r="http://schemas.openxmlformats.org/officeDocument/2006/relationships" xmlns:p="http://schemas.openxmlformats.org/presentationml/2006/main">
+  <p:cSld>
+    <p:spTree>
+      <p:nvGrpSpPr>
+        <p:cNvPr id="1" name=""/>
+        <p:cNvGrpSpPr/>
+        <p:nvPr/>
+      </p:nvGrpSpPr>
+      <p:grpSpPr>
+        <a:xfrm>
+          <a:off x="0" y="0"/>
+          <a:ext cx="0" cy="0"/>
+          <a:chOff x="0" y="0"/>
+          <a:chExt cx="0" cy="0"/>
+        </a:xfrm>
+      </p:grpSpPr>
+      <p:sp>
+        <p:nvSpPr>
+          <p:cNvPr id="3" name="Content Placeholder 2">
+            <a:extLst>
+              <a:ext uri="{FF2B5EF4-FFF2-40B4-BE49-F238E27FC236}">
+                <a16:creationId xmlns:a16="http://schemas.microsoft.com/office/drawing/2014/main" id="{E0A3B9B1-435F-41CA-83C5-21824DE95CFD}"/>
+              </a:ext>
+            </a:extLst>
+          </p:cNvPr>
+          <p:cNvSpPr>
+            <a:spLocks noGrp="1"/>
+          </p:cNvSpPr>
+          <p:nvPr>
+            <p:ph idx="1"/>
+          </p:nvPr>
+        </p:nvSpPr>
+        <p:spPr>
+          <a:xfrm>
+            <a:off x="502024" y="2627070"/>
+            <a:ext cx="11356601" cy="3424107"/>
+          </a:xfrm>
+        </p:spPr>
+        <p:txBody>
+          <a:bodyPr>
+            <a:noAutofit/>
+          </a:bodyPr>
+          <a:lstStyle/>
+          <a:p>
+            <a:pPr marL="0" indent="0">
+              <a:lnSpc>
+                <a:spcPct val="110000"/>
+              </a:lnSpc>
+              <a:spcBef>
+                <a:spcPts val="600"/>
+              </a:spcBef>
+              <a:buNone/>
+            </a:pPr>
+            <a:r>
+              <a:rPr lang="en-US" sz="2800" dirty="0"/>
+              <a:t>Mr. </a:t>
+            </a:r>
+            <a:r>
+              <a:rPr lang="en-US" sz="2800" dirty="0" err="1"/>
+              <a:t>Tojimon</a:t>
+            </a:r>
+            <a:r>
+              <a:rPr lang="en-US" sz="2800" dirty="0"/>
+              <a:t> </a:t>
+            </a:r>
+            <a:r>
+              <a:rPr lang="en-US" sz="2800" dirty="0" err="1"/>
+              <a:t>Kochuveettill</a:t>
+            </a:r>
+            <a:r>
+              <a:rPr lang="en-US" sz="2800" dirty="0"/>
+              <a:t> Thomas AND Mrs. </a:t>
+            </a:r>
+            <a:r>
+              <a:rPr lang="en-US" sz="2800" dirty="0" err="1"/>
+              <a:t>Divya</a:t>
+            </a:r>
+            <a:r>
+              <a:rPr lang="en-US" sz="2800" dirty="0"/>
+              <a:t> P David (T029)</a:t>
+            </a:r>
+          </a:p>
+          <a:p>
+            <a:pPr marL="0" indent="0">
+              <a:lnSpc>
+                <a:spcPct val="110000"/>
+              </a:lnSpc>
+              <a:spcBef>
+                <a:spcPts val="600"/>
+              </a:spcBef>
+              <a:buNone/>
+            </a:pPr>
+            <a:r>
+              <a:rPr lang="en-US" sz="2800" dirty="0"/>
+              <a:t>Dr. Thommen </a:t>
+            </a:r>
+            <a:r>
+              <a:rPr lang="en-US" sz="2800" dirty="0" err="1"/>
+              <a:t>Thamarapally</a:t>
+            </a:r>
+            <a:r>
+              <a:rPr lang="en-US" sz="2800" dirty="0"/>
+              <a:t> Kuruvilla AND Mrs. </a:t>
+            </a:r>
+            <a:r>
+              <a:rPr lang="en-US" sz="2800" dirty="0" err="1"/>
+              <a:t>Mintu</a:t>
+            </a:r>
+            <a:r>
+              <a:rPr lang="en-US" sz="2800" dirty="0"/>
+              <a:t> </a:t>
+            </a:r>
+            <a:r>
+              <a:rPr lang="en-US" sz="2800" dirty="0" err="1"/>
+              <a:t>Lukose</a:t>
+            </a:r>
+            <a:r>
+              <a:rPr lang="en-US" sz="2800" dirty="0"/>
+              <a:t> (T050)</a:t>
+            </a:r>
+          </a:p>
+          <a:p>
+            <a:pPr marL="0" indent="0">
+              <a:lnSpc>
+                <a:spcPct val="110000"/>
+              </a:lnSpc>
+              <a:spcBef>
+                <a:spcPts val="600"/>
+              </a:spcBef>
+              <a:buNone/>
+            </a:pPr>
+            <a:r>
+              <a:rPr lang="en-US" sz="2800" dirty="0"/>
+              <a:t>Mr. Milton M Augustine AND Mrs. Ani Milton (M016)</a:t>
+            </a:r>
+          </a:p>
+        </p:txBody>
+      </p:sp>
+      <p:pic>
+        <p:nvPicPr>
+          <p:cNvPr id="9" name="Picture 8" descr="A close up of a flower&#10;&#10;Description automatically generated">
+            <a:extLst>
+              <a:ext uri="{FF2B5EF4-FFF2-40B4-BE49-F238E27FC236}">
+                <a16:creationId xmlns:a16="http://schemas.microsoft.com/office/drawing/2014/main" id="{A517633D-E682-4AAD-B02B-0F2DE2FE359B}"/>
+              </a:ext>
+            </a:extLst>
+          </p:cNvPr>
+          <p:cNvPicPr>
+            <a:picLocks noChangeAspect="1"/>
+          </p:cNvPicPr>
+          <p:nvPr/>
+        </p:nvPicPr>
+        <p:blipFill>
+          <a:blip r:embed="rId2"/>
+          <a:stretch>
+            <a:fillRect/>
+          </a:stretch>
+        </p:blipFill>
+        <p:spPr>
+          <a:xfrm>
+            <a:off x="2170166" y="1132192"/>
+            <a:ext cx="3925834" cy="1460323"/>
+          </a:xfrm>
+          <a:prstGeom prst="rect">
+            <a:avLst/>
+          </a:prstGeom>
+        </p:spPr>
+      </p:pic>
+      <p:pic>
+        <p:nvPicPr>
+          <p:cNvPr id="4" name="Picture 3" descr="Text, logo&#10;&#10;Description automatically generated">
+            <a:extLst>
+              <a:ext uri="{FF2B5EF4-FFF2-40B4-BE49-F238E27FC236}">
+                <a16:creationId xmlns:a16="http://schemas.microsoft.com/office/drawing/2014/main" id="{29F1A78A-5294-4258-B6F6-49DD264D8CC6}"/>
+              </a:ext>
+            </a:extLst>
+          </p:cNvPr>
+          <p:cNvPicPr>
+            <a:picLocks noChangeAspect="1"/>
+          </p:cNvPicPr>
+          <p:nvPr/>
+        </p:nvPicPr>
+        <p:blipFill rotWithShape="1">
+          <a:blip r:embed="rId3"/>
+          <a:srcRect t="25814" b="29595"/>
+          <a:stretch/>
+        </p:blipFill>
+        <p:spPr>
+          <a:xfrm>
+            <a:off x="1493520" y="320528"/>
+            <a:ext cx="5527040" cy="1232264"/>
+          </a:xfrm>
+          <a:prstGeom prst="rect">
+            <a:avLst/>
+          </a:prstGeom>
+        </p:spPr>
+      </p:pic>
+      <p:sp>
+        <p:nvSpPr>
+          <p:cNvPr id="7" name="Title 1">
+            <a:extLst>
+              <a:ext uri="{FF2B5EF4-FFF2-40B4-BE49-F238E27FC236}">
+                <a16:creationId xmlns:a16="http://schemas.microsoft.com/office/drawing/2014/main" id="{9FA7BBC4-6B6A-48BA-9FDB-BA909B208FA3}"/>
+              </a:ext>
+            </a:extLst>
+          </p:cNvPr>
+          <p:cNvSpPr txBox="1">
+            <a:spLocks/>
+          </p:cNvSpPr>
+          <p:nvPr/>
+        </p:nvSpPr>
+        <p:spPr>
+          <a:xfrm>
+            <a:off x="7937500" y="156857"/>
+            <a:ext cx="4061584" cy="581633"/>
+          </a:xfrm>
+          <a:prstGeom prst="rect">
+            <a:avLst/>
+          </a:prstGeom>
+        </p:spPr>
+        <p:txBody>
+          <a:bodyPr vert="horz" lIns="91440" tIns="45720" rIns="91440" bIns="45720" rtlCol="0" anchor="ctr">
+            <a:normAutofit/>
+          </a:bodyPr>
+          <a:lstStyle>
+            <a:lvl1pPr algn="ctr" defTabSz="914400" rtl="0" eaLnBrk="1" latinLnBrk="0" hangingPunct="1">
+              <a:lnSpc>
+                <a:spcPct val="90000"/>
+              </a:lnSpc>
+              <a:spcBef>
+                <a:spcPct val="0"/>
+              </a:spcBef>
+              <a:buNone/>
+              <a:defRPr sz="3600" kern="1200" cap="all" baseline="0">
+                <a:solidFill>
+                  <a:schemeClr val="tx1"/>
+                </a:solidFill>
+                <a:effectLst/>
+                <a:latin typeface="+mj-lt"/>
+                <a:ea typeface="+mj-ea"/>
+                <a:cs typeface="+mj-cs"/>
+              </a:defRPr>
+            </a:lvl1pPr>
+          </a:lstStyle>
+          <a:p>
+            <a:r>
+              <a:rPr lang="en-US" sz="1800" b="1" dirty="0"/>
+              <a:t>(JUL 26</a:t>
+            </a:r>
+            <a:r>
+              <a:rPr lang="en-US" sz="1800" b="1" baseline="30000" dirty="0"/>
+              <a:t>th </a:t>
+            </a:r>
+            <a:r>
+              <a:rPr lang="en-US" sz="1800" b="1" dirty="0"/>
+              <a:t>– AUG 1</a:t>
+            </a:r>
+            <a:r>
+              <a:rPr lang="en-US" sz="1800" b="1" baseline="30000" dirty="0"/>
+              <a:t>st</a:t>
+            </a:r>
+            <a:r>
+              <a:rPr lang="en-US" sz="1800" b="1" dirty="0"/>
+              <a:t> 2021)</a:t>
+            </a:r>
+          </a:p>
+        </p:txBody>
+      </p:sp>
+      <p:sp>
+        <p:nvSpPr>
+          <p:cNvPr id="8" name="TextBox 7">
+            <a:extLst>
+              <a:ext uri="{FF2B5EF4-FFF2-40B4-BE49-F238E27FC236}">
+                <a16:creationId xmlns:a16="http://schemas.microsoft.com/office/drawing/2014/main" id="{B7E48F53-F01E-418E-A08E-7DAEF9CB2760}"/>
+              </a:ext>
+            </a:extLst>
+          </p:cNvPr>
+          <p:cNvSpPr txBox="1"/>
+          <p:nvPr/>
+        </p:nvSpPr>
+        <p:spPr>
+          <a:xfrm>
+            <a:off x="7776925" y="553824"/>
+            <a:ext cx="4382733" cy="584775"/>
+          </a:xfrm>
+          <a:prstGeom prst="rect">
+            <a:avLst/>
+          </a:prstGeom>
+          <a:noFill/>
+        </p:spPr>
+        <p:txBody>
+          <a:bodyPr wrap="square" rtlCol="0">
+            <a:spAutoFit/>
+          </a:bodyPr>
+          <a:lstStyle/>
+          <a:p>
+            <a:pPr algn="ctr"/>
+            <a:r>
+              <a:rPr lang="en-US" sz="1600" dirty="0">
+                <a:solidFill>
+                  <a:schemeClr val="accent5">
+                    <a:lumMod val="20000"/>
+                    <a:lumOff val="80000"/>
+                  </a:schemeClr>
+                </a:solidFill>
+              </a:rPr>
+              <a:t>St. Thomas Orthodox Syrian Cathedral, Singapore</a:t>
+            </a:r>
+          </a:p>
+        </p:txBody>
+      </p:sp>
+    </p:spTree>
+    <p:extLst>
+      <p:ext uri="{BB962C8B-B14F-4D97-AF65-F5344CB8AC3E}">
+        <p14:creationId xmlns:p14="http://schemas.microsoft.com/office/powerpoint/2010/main" val="2987735523"/>
       </p:ext>
     </p:extLst>
   </p:cSld>

</xml_diff>